<commit_message>
Update the read me file.
</commit_message>
<xml_diff>
--- a/doc/designDoc.pptx
+++ b/doc/designDoc.pptx
@@ -5,11 +5,12 @@
     <p:sldMasterId id="2147483648" r:id="rId1"/>
   </p:sldMasterIdLst>
   <p:notesMasterIdLst>
-    <p:notesMasterId r:id="rId4"/>
+    <p:notesMasterId r:id="rId5"/>
   </p:notesMasterIdLst>
   <p:sldIdLst>
     <p:sldId id="256" r:id="rId2"/>
     <p:sldId id="257" r:id="rId3"/>
+    <p:sldId id="258" r:id="rId4"/>
   </p:sldIdLst>
   <p:sldSz cx="12192000" cy="6858000"/>
   <p:notesSz cx="6858000" cy="9144000"/>
@@ -198,7 +199,7 @@
           <a:p>
             <a:fld id="{D869F5A2-FB33-43AA-9FB4-F58392D514B0}" type="datetimeFigureOut">
               <a:rPr lang="en-SG" smtClean="0"/>
-              <a:t>19/3/2023</a:t>
+              <a:t>22/3/2023</a:t>
             </a:fld>
             <a:endParaRPr lang="en-SG"/>
           </a:p>
@@ -699,7 +700,7 @@
           <a:p>
             <a:fld id="{7E4C12AF-1699-436B-92E4-CBB1E278C05C}" type="datetimeFigureOut">
               <a:rPr lang="en-SG" smtClean="0"/>
-              <a:t>19/3/2023</a:t>
+              <a:t>22/3/2023</a:t>
             </a:fld>
             <a:endParaRPr lang="en-SG"/>
           </a:p>
@@ -899,7 +900,7 @@
           <a:p>
             <a:fld id="{7E4C12AF-1699-436B-92E4-CBB1E278C05C}" type="datetimeFigureOut">
               <a:rPr lang="en-SG" smtClean="0"/>
-              <a:t>19/3/2023</a:t>
+              <a:t>22/3/2023</a:t>
             </a:fld>
             <a:endParaRPr lang="en-SG"/>
           </a:p>
@@ -1109,7 +1110,7 @@
           <a:p>
             <a:fld id="{7E4C12AF-1699-436B-92E4-CBB1E278C05C}" type="datetimeFigureOut">
               <a:rPr lang="en-SG" smtClean="0"/>
-              <a:t>19/3/2023</a:t>
+              <a:t>22/3/2023</a:t>
             </a:fld>
             <a:endParaRPr lang="en-SG"/>
           </a:p>
@@ -1309,7 +1310,7 @@
           <a:p>
             <a:fld id="{7E4C12AF-1699-436B-92E4-CBB1E278C05C}" type="datetimeFigureOut">
               <a:rPr lang="en-SG" smtClean="0"/>
-              <a:t>19/3/2023</a:t>
+              <a:t>22/3/2023</a:t>
             </a:fld>
             <a:endParaRPr lang="en-SG"/>
           </a:p>
@@ -1585,7 +1586,7 @@
           <a:p>
             <a:fld id="{7E4C12AF-1699-436B-92E4-CBB1E278C05C}" type="datetimeFigureOut">
               <a:rPr lang="en-SG" smtClean="0"/>
-              <a:t>19/3/2023</a:t>
+              <a:t>22/3/2023</a:t>
             </a:fld>
             <a:endParaRPr lang="en-SG"/>
           </a:p>
@@ -1853,7 +1854,7 @@
           <a:p>
             <a:fld id="{7E4C12AF-1699-436B-92E4-CBB1E278C05C}" type="datetimeFigureOut">
               <a:rPr lang="en-SG" smtClean="0"/>
-              <a:t>19/3/2023</a:t>
+              <a:t>22/3/2023</a:t>
             </a:fld>
             <a:endParaRPr lang="en-SG"/>
           </a:p>
@@ -2268,7 +2269,7 @@
           <a:p>
             <a:fld id="{7E4C12AF-1699-436B-92E4-CBB1E278C05C}" type="datetimeFigureOut">
               <a:rPr lang="en-SG" smtClean="0"/>
-              <a:t>19/3/2023</a:t>
+              <a:t>22/3/2023</a:t>
             </a:fld>
             <a:endParaRPr lang="en-SG"/>
           </a:p>
@@ -2410,7 +2411,7 @@
           <a:p>
             <a:fld id="{7E4C12AF-1699-436B-92E4-CBB1E278C05C}" type="datetimeFigureOut">
               <a:rPr lang="en-SG" smtClean="0"/>
-              <a:t>19/3/2023</a:t>
+              <a:t>22/3/2023</a:t>
             </a:fld>
             <a:endParaRPr lang="en-SG"/>
           </a:p>
@@ -2523,7 +2524,7 @@
           <a:p>
             <a:fld id="{7E4C12AF-1699-436B-92E4-CBB1E278C05C}" type="datetimeFigureOut">
               <a:rPr lang="en-SG" smtClean="0"/>
-              <a:t>19/3/2023</a:t>
+              <a:t>22/3/2023</a:t>
             </a:fld>
             <a:endParaRPr lang="en-SG"/>
           </a:p>
@@ -2836,7 +2837,7 @@
           <a:p>
             <a:fld id="{7E4C12AF-1699-436B-92E4-CBB1E278C05C}" type="datetimeFigureOut">
               <a:rPr lang="en-SG" smtClean="0"/>
-              <a:t>19/3/2023</a:t>
+              <a:t>22/3/2023</a:t>
             </a:fld>
             <a:endParaRPr lang="en-SG"/>
           </a:p>
@@ -3125,7 +3126,7 @@
           <a:p>
             <a:fld id="{7E4C12AF-1699-436B-92E4-CBB1E278C05C}" type="datetimeFigureOut">
               <a:rPr lang="en-SG" smtClean="0"/>
-              <a:t>19/3/2023</a:t>
+              <a:t>22/3/2023</a:t>
             </a:fld>
             <a:endParaRPr lang="en-SG"/>
           </a:p>
@@ -3368,7 +3369,7 @@
           <a:p>
             <a:fld id="{7E4C12AF-1699-436B-92E4-CBB1E278C05C}" type="datetimeFigureOut">
               <a:rPr lang="en-SG" smtClean="0"/>
-              <a:t>19/3/2023</a:t>
+              <a:t>22/3/2023</a:t>
             </a:fld>
             <a:endParaRPr lang="en-SG"/>
           </a:p>
@@ -9866,6 +9867,2630 @@
     <p:extLst>
       <p:ext uri="{BB962C8B-B14F-4D97-AF65-F5344CB8AC3E}">
         <p14:creationId xmlns:p14="http://schemas.microsoft.com/office/powerpoint/2010/main" val="901957628"/>
+      </p:ext>
+    </p:extLst>
+  </p:cSld>
+  <p:clrMapOvr>
+    <a:masterClrMapping/>
+  </p:clrMapOvr>
+</p:sld>
+</file>
+
+<file path=ppt/slides/slide3.xml><?xml version="1.0" encoding="utf-8"?>
+<p:sld xmlns:a="http://schemas.openxmlformats.org/drawingml/2006/main" xmlns:r="http://schemas.openxmlformats.org/officeDocument/2006/relationships" xmlns:p="http://schemas.openxmlformats.org/presentationml/2006/main">
+  <p:cSld>
+    <p:spTree>
+      <p:nvGrpSpPr>
+        <p:cNvPr id="1" name=""/>
+        <p:cNvGrpSpPr/>
+        <p:nvPr/>
+      </p:nvGrpSpPr>
+      <p:grpSpPr>
+        <a:xfrm>
+          <a:off x="0" y="0"/>
+          <a:ext cx="0" cy="0"/>
+          <a:chOff x="0" y="0"/>
+          <a:chExt cx="0" cy="0"/>
+        </a:xfrm>
+      </p:grpSpPr>
+      <p:sp>
+        <p:nvSpPr>
+          <p:cNvPr id="27" name="Rectangle 26">
+            <a:extLst>
+              <a:ext uri="{FF2B5EF4-FFF2-40B4-BE49-F238E27FC236}">
+                <a16:creationId xmlns:a16="http://schemas.microsoft.com/office/drawing/2014/main" id="{B6FAF3C9-5F10-CE98-63DB-B085542D9489}"/>
+              </a:ext>
+            </a:extLst>
+          </p:cNvPr>
+          <p:cNvSpPr/>
+          <p:nvPr/>
+        </p:nvSpPr>
+        <p:spPr>
+          <a:xfrm>
+            <a:off x="6217921" y="1892808"/>
+            <a:ext cx="2011586" cy="1139201"/>
+          </a:xfrm>
+          <a:prstGeom prst="rect">
+            <a:avLst/>
+          </a:prstGeom>
+          <a:noFill/>
+          <a:ln>
+            <a:prstDash val="sysDash"/>
+          </a:ln>
+        </p:spPr>
+        <p:style>
+          <a:lnRef idx="2">
+            <a:schemeClr val="accent1">
+              <a:shade val="50000"/>
+            </a:schemeClr>
+          </a:lnRef>
+          <a:fillRef idx="1">
+            <a:schemeClr val="accent1"/>
+          </a:fillRef>
+          <a:effectRef idx="0">
+            <a:schemeClr val="accent1"/>
+          </a:effectRef>
+          <a:fontRef idx="minor">
+            <a:schemeClr val="lt1"/>
+          </a:fontRef>
+        </p:style>
+        <p:txBody>
+          <a:bodyPr rtlCol="0" anchor="ctr"/>
+          <a:lstStyle/>
+          <a:p>
+            <a:pPr algn="ctr"/>
+            <a:endParaRPr lang="en-SG" dirty="0"/>
+          </a:p>
+        </p:txBody>
+      </p:sp>
+      <p:pic>
+        <p:nvPicPr>
+          <p:cNvPr id="4" name="Picture 4">
+            <a:extLst>
+              <a:ext uri="{FF2B5EF4-FFF2-40B4-BE49-F238E27FC236}">
+                <a16:creationId xmlns:a16="http://schemas.microsoft.com/office/drawing/2014/main" id="{3F3B911A-98E4-AFFC-5CBF-4A300D037B3C}"/>
+              </a:ext>
+            </a:extLst>
+          </p:cNvPr>
+          <p:cNvPicPr>
+            <a:picLocks noChangeAspect="1" noChangeArrowheads="1"/>
+          </p:cNvPicPr>
+          <p:nvPr/>
+        </p:nvPicPr>
+        <p:blipFill>
+          <a:blip r:embed="rId2">
+            <a:extLst>
+              <a:ext uri="{28A0092B-C50C-407E-A947-70E740481C1C}">
+                <a14:useLocalDpi xmlns:a14="http://schemas.microsoft.com/office/drawing/2010/main" val="0"/>
+              </a:ext>
+            </a:extLst>
+          </a:blip>
+          <a:srcRect/>
+          <a:stretch>
+            <a:fillRect/>
+          </a:stretch>
+        </p:blipFill>
+        <p:spPr bwMode="auto">
+          <a:xfrm>
+            <a:off x="650593" y="1697841"/>
+            <a:ext cx="802247" cy="356554"/>
+          </a:xfrm>
+          <a:prstGeom prst="rect">
+            <a:avLst/>
+          </a:prstGeom>
+          <a:noFill/>
+          <a:ln w="9525">
+            <a:solidFill>
+              <a:schemeClr val="tx1"/>
+            </a:solidFill>
+          </a:ln>
+          <a:extLst>
+            <a:ext uri="{909E8E84-426E-40DD-AFC4-6F175D3DCCD1}">
+              <a14:hiddenFill xmlns:a14="http://schemas.microsoft.com/office/drawing/2010/main">
+                <a:solidFill>
+                  <a:srgbClr val="FFFFFF"/>
+                </a:solidFill>
+              </a14:hiddenFill>
+            </a:ext>
+          </a:extLst>
+        </p:spPr>
+      </p:pic>
+      <p:pic>
+        <p:nvPicPr>
+          <p:cNvPr id="5" name="Picture 4">
+            <a:extLst>
+              <a:ext uri="{FF2B5EF4-FFF2-40B4-BE49-F238E27FC236}">
+                <a16:creationId xmlns:a16="http://schemas.microsoft.com/office/drawing/2014/main" id="{C86EFC47-75E5-8A90-58E4-7721376CB976}"/>
+              </a:ext>
+            </a:extLst>
+          </p:cNvPr>
+          <p:cNvPicPr>
+            <a:picLocks noChangeAspect="1"/>
+          </p:cNvPicPr>
+          <p:nvPr/>
+        </p:nvPicPr>
+        <p:blipFill>
+          <a:blip r:embed="rId3"/>
+          <a:stretch>
+            <a:fillRect/>
+          </a:stretch>
+        </p:blipFill>
+        <p:spPr>
+          <a:xfrm>
+            <a:off x="2792495" y="3020369"/>
+            <a:ext cx="607351" cy="600149"/>
+          </a:xfrm>
+          <a:prstGeom prst="rect">
+            <a:avLst/>
+          </a:prstGeom>
+        </p:spPr>
+      </p:pic>
+      <p:sp>
+        <p:nvSpPr>
+          <p:cNvPr id="6" name="TextBox 5">
+            <a:extLst>
+              <a:ext uri="{FF2B5EF4-FFF2-40B4-BE49-F238E27FC236}">
+                <a16:creationId xmlns:a16="http://schemas.microsoft.com/office/drawing/2014/main" id="{2A5525AD-80FC-2C28-418E-4102DFFC939E}"/>
+              </a:ext>
+            </a:extLst>
+          </p:cNvPr>
+          <p:cNvSpPr txBox="1"/>
+          <p:nvPr/>
+        </p:nvSpPr>
+        <p:spPr>
+          <a:xfrm>
+            <a:off x="3365268" y="2981213"/>
+            <a:ext cx="1424476" cy="261610"/>
+          </a:xfrm>
+          <a:prstGeom prst="rect">
+            <a:avLst/>
+          </a:prstGeom>
+          <a:noFill/>
+        </p:spPr>
+        <p:txBody>
+          <a:bodyPr wrap="square" rtlCol="0">
+            <a:spAutoFit/>
+          </a:bodyPr>
+          <a:lstStyle/>
+          <a:p>
+            <a:r>
+              <a:rPr lang="en-US" sz="1100" dirty="0">
+                <a:solidFill>
+                  <a:srgbClr val="002060"/>
+                </a:solidFill>
+              </a:rPr>
+              <a:t>Score database </a:t>
+            </a:r>
+            <a:endParaRPr lang="en-SG" sz="1100" dirty="0">
+              <a:solidFill>
+                <a:srgbClr val="002060"/>
+              </a:solidFill>
+            </a:endParaRPr>
+          </a:p>
+        </p:txBody>
+      </p:sp>
+      <p:sp>
+        <p:nvSpPr>
+          <p:cNvPr id="9" name="TextBox 8">
+            <a:extLst>
+              <a:ext uri="{FF2B5EF4-FFF2-40B4-BE49-F238E27FC236}">
+                <a16:creationId xmlns:a16="http://schemas.microsoft.com/office/drawing/2014/main" id="{63E1D503-1021-08FE-C991-DED47E1CC675}"/>
+              </a:ext>
+            </a:extLst>
+          </p:cNvPr>
+          <p:cNvSpPr txBox="1"/>
+          <p:nvPr/>
+        </p:nvSpPr>
+        <p:spPr>
+          <a:xfrm>
+            <a:off x="1565397" y="5855736"/>
+            <a:ext cx="1069977" cy="261610"/>
+          </a:xfrm>
+          <a:prstGeom prst="rect">
+            <a:avLst/>
+          </a:prstGeom>
+          <a:noFill/>
+        </p:spPr>
+        <p:txBody>
+          <a:bodyPr wrap="square" rtlCol="0">
+            <a:spAutoFit/>
+          </a:bodyPr>
+          <a:lstStyle/>
+          <a:p>
+            <a:r>
+              <a:rPr lang="en-US" sz="1100" dirty="0">
+                <a:solidFill>
+                  <a:srgbClr val="002060"/>
+                </a:solidFill>
+              </a:rPr>
+              <a:t>Raw database </a:t>
+            </a:r>
+            <a:endParaRPr lang="en-SG" sz="1100" dirty="0">
+              <a:solidFill>
+                <a:srgbClr val="002060"/>
+              </a:solidFill>
+            </a:endParaRPr>
+          </a:p>
+        </p:txBody>
+      </p:sp>
+      <p:sp>
+        <p:nvSpPr>
+          <p:cNvPr id="10" name="Rectangle 9">
+            <a:extLst>
+              <a:ext uri="{FF2B5EF4-FFF2-40B4-BE49-F238E27FC236}">
+                <a16:creationId xmlns:a16="http://schemas.microsoft.com/office/drawing/2014/main" id="{EC5439E4-07F4-F109-9B62-5D0C37EC928A}"/>
+              </a:ext>
+            </a:extLst>
+          </p:cNvPr>
+          <p:cNvSpPr/>
+          <p:nvPr/>
+        </p:nvSpPr>
+        <p:spPr>
+          <a:xfrm>
+            <a:off x="633422" y="2235578"/>
+            <a:ext cx="1176072" cy="448862"/>
+          </a:xfrm>
+          <a:prstGeom prst="rect">
+            <a:avLst/>
+          </a:prstGeom>
+        </p:spPr>
+        <p:style>
+          <a:lnRef idx="2">
+            <a:schemeClr val="accent1">
+              <a:shade val="50000"/>
+            </a:schemeClr>
+          </a:lnRef>
+          <a:fillRef idx="1">
+            <a:schemeClr val="accent1"/>
+          </a:fillRef>
+          <a:effectRef idx="0">
+            <a:schemeClr val="accent1"/>
+          </a:effectRef>
+          <a:fontRef idx="minor">
+            <a:schemeClr val="lt1"/>
+          </a:fontRef>
+        </p:style>
+        <p:txBody>
+          <a:bodyPr rtlCol="0" anchor="ctr"/>
+          <a:lstStyle/>
+          <a:p>
+            <a:r>
+              <a:rPr lang="en-US" sz="1000" b="1" dirty="0"/>
+              <a:t>Network topology State Panel</a:t>
+            </a:r>
+            <a:endParaRPr lang="en-SG" sz="1000" b="1" dirty="0"/>
+          </a:p>
+        </p:txBody>
+      </p:sp>
+      <p:sp>
+        <p:nvSpPr>
+          <p:cNvPr id="13" name="TextBox 12">
+            <a:extLst>
+              <a:ext uri="{FF2B5EF4-FFF2-40B4-BE49-F238E27FC236}">
+                <a16:creationId xmlns:a16="http://schemas.microsoft.com/office/drawing/2014/main" id="{55D42BA9-088E-1F68-E710-654EBEDD505C}"/>
+              </a:ext>
+            </a:extLst>
+          </p:cNvPr>
+          <p:cNvSpPr txBox="1"/>
+          <p:nvPr/>
+        </p:nvSpPr>
+        <p:spPr>
+          <a:xfrm>
+            <a:off x="554609" y="1126861"/>
+            <a:ext cx="1176072" cy="230832"/>
+          </a:xfrm>
+          <a:prstGeom prst="rect">
+            <a:avLst/>
+          </a:prstGeom>
+        </p:spPr>
+        <p:style>
+          <a:lnRef idx="2">
+            <a:schemeClr val="dk1"/>
+          </a:lnRef>
+          <a:fillRef idx="1">
+            <a:schemeClr val="lt1"/>
+          </a:fillRef>
+          <a:effectRef idx="0">
+            <a:schemeClr val="dk1"/>
+          </a:effectRef>
+          <a:fontRef idx="minor">
+            <a:schemeClr val="dk1"/>
+          </a:fontRef>
+        </p:style>
+        <p:txBody>
+          <a:bodyPr wrap="square" rtlCol="0">
+            <a:spAutoFit/>
+          </a:bodyPr>
+          <a:lstStyle/>
+          <a:p>
+            <a:r>
+              <a:rPr lang="en-US" altLang="zh-CN" sz="900" b="1" dirty="0"/>
+              <a:t>Web-Browser </a:t>
+            </a:r>
+            <a:endParaRPr lang="zh-CN" altLang="en-US" sz="1600" dirty="0"/>
+          </a:p>
+        </p:txBody>
+      </p:sp>
+      <p:pic>
+        <p:nvPicPr>
+          <p:cNvPr id="14" name="Picture 4">
+            <a:extLst>
+              <a:ext uri="{FF2B5EF4-FFF2-40B4-BE49-F238E27FC236}">
+                <a16:creationId xmlns:a16="http://schemas.microsoft.com/office/drawing/2014/main" id="{5F616F32-087A-224F-5364-36D874784B17}"/>
+              </a:ext>
+            </a:extLst>
+          </p:cNvPr>
+          <p:cNvPicPr>
+            <a:picLocks noChangeAspect="1" noChangeArrowheads="1"/>
+          </p:cNvPicPr>
+          <p:nvPr/>
+        </p:nvPicPr>
+        <p:blipFill>
+          <a:blip r:embed="rId4">
+            <a:extLst>
+              <a:ext uri="{28A0092B-C50C-407E-A947-70E740481C1C}">
+                <a14:useLocalDpi xmlns:a14="http://schemas.microsoft.com/office/drawing/2010/main" val="0"/>
+              </a:ext>
+            </a:extLst>
+          </a:blip>
+          <a:srcRect/>
+          <a:stretch>
+            <a:fillRect/>
+          </a:stretch>
+        </p:blipFill>
+        <p:spPr bwMode="auto">
+          <a:xfrm>
+            <a:off x="885529" y="782944"/>
+            <a:ext cx="257116" cy="257116"/>
+          </a:xfrm>
+          <a:prstGeom prst="rect">
+            <a:avLst/>
+          </a:prstGeom>
+          <a:noFill/>
+          <a:extLst>
+            <a:ext uri="{909E8E84-426E-40DD-AFC4-6F175D3DCCD1}">
+              <a14:hiddenFill xmlns:a14="http://schemas.microsoft.com/office/drawing/2010/main">
+                <a:solidFill>
+                  <a:srgbClr val="FFFFFF"/>
+                </a:solidFill>
+              </a14:hiddenFill>
+            </a:ext>
+          </a:extLst>
+        </p:spPr>
+      </p:pic>
+      <p:cxnSp>
+        <p:nvCxnSpPr>
+          <p:cNvPr id="17" name="Straight Arrow Connector 16">
+            <a:extLst>
+              <a:ext uri="{FF2B5EF4-FFF2-40B4-BE49-F238E27FC236}">
+                <a16:creationId xmlns:a16="http://schemas.microsoft.com/office/drawing/2014/main" id="{F01C3ECF-092D-7B88-7803-AA2E5F1AB329}"/>
+              </a:ext>
+            </a:extLst>
+          </p:cNvPr>
+          <p:cNvCxnSpPr>
+            <a:cxnSpLocks/>
+          </p:cNvCxnSpPr>
+          <p:nvPr/>
+        </p:nvCxnSpPr>
+        <p:spPr>
+          <a:xfrm flipV="1">
+            <a:off x="3102195" y="2732564"/>
+            <a:ext cx="0" cy="259362"/>
+          </a:xfrm>
+          <a:prstGeom prst="straightConnector1">
+            <a:avLst/>
+          </a:prstGeom>
+          <a:ln w="19050">
+            <a:tailEnd type="triangle"/>
+          </a:ln>
+        </p:spPr>
+        <p:style>
+          <a:lnRef idx="1">
+            <a:schemeClr val="dk1"/>
+          </a:lnRef>
+          <a:fillRef idx="0">
+            <a:schemeClr val="dk1"/>
+          </a:fillRef>
+          <a:effectRef idx="0">
+            <a:schemeClr val="dk1"/>
+          </a:effectRef>
+          <a:fontRef idx="minor">
+            <a:schemeClr val="tx1"/>
+          </a:fontRef>
+        </p:style>
+      </p:cxnSp>
+      <p:cxnSp>
+        <p:nvCxnSpPr>
+          <p:cNvPr id="19" name="Straight Arrow Connector 18">
+            <a:extLst>
+              <a:ext uri="{FF2B5EF4-FFF2-40B4-BE49-F238E27FC236}">
+                <a16:creationId xmlns:a16="http://schemas.microsoft.com/office/drawing/2014/main" id="{92FA5621-00CA-7595-3EE1-9ADE1B5BCCD7}"/>
+              </a:ext>
+            </a:extLst>
+          </p:cNvPr>
+          <p:cNvCxnSpPr>
+            <a:cxnSpLocks/>
+          </p:cNvCxnSpPr>
+          <p:nvPr/>
+        </p:nvCxnSpPr>
+        <p:spPr>
+          <a:xfrm flipV="1">
+            <a:off x="1051717" y="2760577"/>
+            <a:ext cx="0" cy="668423"/>
+          </a:xfrm>
+          <a:prstGeom prst="straightConnector1">
+            <a:avLst/>
+          </a:prstGeom>
+          <a:ln w="19050">
+            <a:tailEnd type="triangle"/>
+          </a:ln>
+        </p:spPr>
+        <p:style>
+          <a:lnRef idx="1">
+            <a:schemeClr val="dk1"/>
+          </a:lnRef>
+          <a:fillRef idx="0">
+            <a:schemeClr val="dk1"/>
+          </a:fillRef>
+          <a:effectRef idx="0">
+            <a:schemeClr val="dk1"/>
+          </a:effectRef>
+          <a:fontRef idx="minor">
+            <a:schemeClr val="tx1"/>
+          </a:fontRef>
+        </p:style>
+      </p:cxnSp>
+      <p:sp>
+        <p:nvSpPr>
+          <p:cNvPr id="20" name="Rectangle 19">
+            <a:extLst>
+              <a:ext uri="{FF2B5EF4-FFF2-40B4-BE49-F238E27FC236}">
+                <a16:creationId xmlns:a16="http://schemas.microsoft.com/office/drawing/2014/main" id="{6515EBA3-9885-200C-A7E3-BE221B2F8ED1}"/>
+              </a:ext>
+            </a:extLst>
+          </p:cNvPr>
+          <p:cNvSpPr/>
+          <p:nvPr/>
+        </p:nvSpPr>
+        <p:spPr>
+          <a:xfrm>
+            <a:off x="6499506" y="4132429"/>
+            <a:ext cx="1213101" cy="296183"/>
+          </a:xfrm>
+          <a:prstGeom prst="rect">
+            <a:avLst/>
+          </a:prstGeom>
+        </p:spPr>
+        <p:style>
+          <a:lnRef idx="2">
+            <a:schemeClr val="accent1">
+              <a:shade val="50000"/>
+            </a:schemeClr>
+          </a:lnRef>
+          <a:fillRef idx="1">
+            <a:schemeClr val="accent1"/>
+          </a:fillRef>
+          <a:effectRef idx="0">
+            <a:schemeClr val="accent1"/>
+          </a:effectRef>
+          <a:fontRef idx="minor">
+            <a:schemeClr val="lt1"/>
+          </a:fontRef>
+        </p:style>
+        <p:txBody>
+          <a:bodyPr rtlCol="0" anchor="ctr"/>
+          <a:lstStyle/>
+          <a:p>
+            <a:r>
+              <a:rPr lang="en-US" sz="1100" b="1" dirty="0"/>
+              <a:t>Prober Agent </a:t>
+            </a:r>
+            <a:endParaRPr lang="en-SG" sz="1100" b="1" dirty="0"/>
+          </a:p>
+        </p:txBody>
+      </p:sp>
+      <p:cxnSp>
+        <p:nvCxnSpPr>
+          <p:cNvPr id="22" name="Straight Arrow Connector 21">
+            <a:extLst>
+              <a:ext uri="{FF2B5EF4-FFF2-40B4-BE49-F238E27FC236}">
+                <a16:creationId xmlns:a16="http://schemas.microsoft.com/office/drawing/2014/main" id="{C8BE9C73-B15A-5847-0B9F-4926827DDAE5}"/>
+              </a:ext>
+            </a:extLst>
+          </p:cNvPr>
+          <p:cNvCxnSpPr>
+            <a:cxnSpLocks/>
+          </p:cNvCxnSpPr>
+          <p:nvPr/>
+        </p:nvCxnSpPr>
+        <p:spPr>
+          <a:xfrm>
+            <a:off x="1062261" y="1399494"/>
+            <a:ext cx="0" cy="310113"/>
+          </a:xfrm>
+          <a:prstGeom prst="straightConnector1">
+            <a:avLst/>
+          </a:prstGeom>
+          <a:ln>
+            <a:tailEnd type="triangle"/>
+          </a:ln>
+        </p:spPr>
+        <p:style>
+          <a:lnRef idx="1">
+            <a:schemeClr val="accent1"/>
+          </a:lnRef>
+          <a:fillRef idx="0">
+            <a:schemeClr val="accent1"/>
+          </a:fillRef>
+          <a:effectRef idx="0">
+            <a:schemeClr val="accent1"/>
+          </a:effectRef>
+          <a:fontRef idx="minor">
+            <a:schemeClr val="tx1"/>
+          </a:fontRef>
+        </p:style>
+      </p:cxnSp>
+      <p:sp>
+        <p:nvSpPr>
+          <p:cNvPr id="23" name="TextBox 22">
+            <a:extLst>
+              <a:ext uri="{FF2B5EF4-FFF2-40B4-BE49-F238E27FC236}">
+                <a16:creationId xmlns:a16="http://schemas.microsoft.com/office/drawing/2014/main" id="{772CFBBF-D3D8-69BD-2CBC-15AABE2057F9}"/>
+              </a:ext>
+            </a:extLst>
+          </p:cNvPr>
+          <p:cNvSpPr txBox="1"/>
+          <p:nvPr/>
+        </p:nvSpPr>
+        <p:spPr>
+          <a:xfrm>
+            <a:off x="1086726" y="789748"/>
+            <a:ext cx="802249" cy="230832"/>
+          </a:xfrm>
+          <a:prstGeom prst="rect">
+            <a:avLst/>
+          </a:prstGeom>
+          <a:noFill/>
+        </p:spPr>
+        <p:txBody>
+          <a:bodyPr wrap="square" rtlCol="0">
+            <a:spAutoFit/>
+          </a:bodyPr>
+          <a:lstStyle/>
+          <a:p>
+            <a:r>
+              <a:rPr lang="en-US" sz="900" dirty="0">
+                <a:solidFill>
+                  <a:srgbClr val="002060"/>
+                </a:solidFill>
+              </a:rPr>
+              <a:t>User </a:t>
+            </a:r>
+            <a:endParaRPr lang="en-SG" sz="900" dirty="0">
+              <a:solidFill>
+                <a:srgbClr val="002060"/>
+              </a:solidFill>
+            </a:endParaRPr>
+          </a:p>
+        </p:txBody>
+      </p:sp>
+      <p:sp>
+        <p:nvSpPr>
+          <p:cNvPr id="30" name="Rectangle 29">
+            <a:extLst>
+              <a:ext uri="{FF2B5EF4-FFF2-40B4-BE49-F238E27FC236}">
+                <a16:creationId xmlns:a16="http://schemas.microsoft.com/office/drawing/2014/main" id="{3F1C0B48-1D42-45AA-B718-9586D847F45C}"/>
+              </a:ext>
+            </a:extLst>
+          </p:cNvPr>
+          <p:cNvSpPr/>
+          <p:nvPr/>
+        </p:nvSpPr>
+        <p:spPr>
+          <a:xfrm>
+            <a:off x="2573700" y="2222178"/>
+            <a:ext cx="1077470" cy="448862"/>
+          </a:xfrm>
+          <a:prstGeom prst="rect">
+            <a:avLst/>
+          </a:prstGeom>
+        </p:spPr>
+        <p:style>
+          <a:lnRef idx="2">
+            <a:schemeClr val="accent1">
+              <a:shade val="50000"/>
+            </a:schemeClr>
+          </a:lnRef>
+          <a:fillRef idx="1">
+            <a:schemeClr val="accent1"/>
+          </a:fillRef>
+          <a:effectRef idx="0">
+            <a:schemeClr val="accent1"/>
+          </a:effectRef>
+          <a:fontRef idx="minor">
+            <a:schemeClr val="lt1"/>
+          </a:fontRef>
+        </p:style>
+        <p:txBody>
+          <a:bodyPr rtlCol="0" anchor="ctr"/>
+          <a:lstStyle/>
+          <a:p>
+            <a:r>
+              <a:rPr lang="en-US" sz="1000" b="1" dirty="0"/>
+              <a:t>Grafana build-in plugin Panels</a:t>
+            </a:r>
+            <a:endParaRPr lang="en-SG" sz="1000" b="1" dirty="0"/>
+          </a:p>
+        </p:txBody>
+      </p:sp>
+      <p:sp>
+        <p:nvSpPr>
+          <p:cNvPr id="31" name="Rectangle 30">
+            <a:extLst>
+              <a:ext uri="{FF2B5EF4-FFF2-40B4-BE49-F238E27FC236}">
+                <a16:creationId xmlns:a16="http://schemas.microsoft.com/office/drawing/2014/main" id="{A87802A6-755C-A94D-FA55-D69223C1508E}"/>
+              </a:ext>
+            </a:extLst>
+          </p:cNvPr>
+          <p:cNvSpPr/>
+          <p:nvPr/>
+        </p:nvSpPr>
+        <p:spPr>
+          <a:xfrm>
+            <a:off x="1940044" y="2233069"/>
+            <a:ext cx="547123" cy="448862"/>
+          </a:xfrm>
+          <a:prstGeom prst="rect">
+            <a:avLst/>
+          </a:prstGeom>
+        </p:spPr>
+        <p:style>
+          <a:lnRef idx="2">
+            <a:schemeClr val="accent1">
+              <a:shade val="50000"/>
+            </a:schemeClr>
+          </a:lnRef>
+          <a:fillRef idx="1">
+            <a:schemeClr val="accent1"/>
+          </a:fillRef>
+          <a:effectRef idx="0">
+            <a:schemeClr val="accent1"/>
+          </a:effectRef>
+          <a:fontRef idx="minor">
+            <a:schemeClr val="lt1"/>
+          </a:fontRef>
+        </p:style>
+        <p:txBody>
+          <a:bodyPr rtlCol="0" anchor="ctr"/>
+          <a:lstStyle/>
+          <a:p>
+            <a:r>
+              <a:rPr lang="en-US" sz="1000" b="1" dirty="0"/>
+              <a:t>Ajax Panels</a:t>
+            </a:r>
+            <a:endParaRPr lang="en-SG" sz="1000" b="1" dirty="0"/>
+          </a:p>
+        </p:txBody>
+      </p:sp>
+      <p:sp>
+        <p:nvSpPr>
+          <p:cNvPr id="33" name="Rectangle 32">
+            <a:extLst>
+              <a:ext uri="{FF2B5EF4-FFF2-40B4-BE49-F238E27FC236}">
+                <a16:creationId xmlns:a16="http://schemas.microsoft.com/office/drawing/2014/main" id="{A28F8E92-1AA6-63F2-FA59-D9744C1A716B}"/>
+              </a:ext>
+            </a:extLst>
+          </p:cNvPr>
+          <p:cNvSpPr/>
+          <p:nvPr/>
+        </p:nvSpPr>
+        <p:spPr>
+          <a:xfrm>
+            <a:off x="1627072" y="4409780"/>
+            <a:ext cx="946628" cy="445739"/>
+          </a:xfrm>
+          <a:prstGeom prst="rect">
+            <a:avLst/>
+          </a:prstGeom>
+        </p:spPr>
+        <p:style>
+          <a:lnRef idx="2">
+            <a:schemeClr val="accent1">
+              <a:shade val="50000"/>
+            </a:schemeClr>
+          </a:lnRef>
+          <a:fillRef idx="1">
+            <a:schemeClr val="accent1"/>
+          </a:fillRef>
+          <a:effectRef idx="0">
+            <a:schemeClr val="accent1"/>
+          </a:effectRef>
+          <a:fontRef idx="minor">
+            <a:schemeClr val="lt1"/>
+          </a:fontRef>
+        </p:style>
+        <p:txBody>
+          <a:bodyPr rtlCol="0" anchor="ctr"/>
+          <a:lstStyle/>
+          <a:p>
+            <a:r>
+              <a:rPr lang="en-US" sz="1100" b="1" dirty="0"/>
+              <a:t>Data manager </a:t>
+            </a:r>
+            <a:endParaRPr lang="en-SG" sz="1100" b="1" dirty="0"/>
+          </a:p>
+        </p:txBody>
+      </p:sp>
+      <p:sp>
+        <p:nvSpPr>
+          <p:cNvPr id="34" name="Rectangle 33">
+            <a:extLst>
+              <a:ext uri="{FF2B5EF4-FFF2-40B4-BE49-F238E27FC236}">
+                <a16:creationId xmlns:a16="http://schemas.microsoft.com/office/drawing/2014/main" id="{AB40E8FF-C71C-A63C-A563-9311C2A83E6E}"/>
+              </a:ext>
+            </a:extLst>
+          </p:cNvPr>
+          <p:cNvSpPr/>
+          <p:nvPr/>
+        </p:nvSpPr>
+        <p:spPr>
+          <a:xfrm>
+            <a:off x="931570" y="3429000"/>
+            <a:ext cx="816374" cy="274021"/>
+          </a:xfrm>
+          <a:prstGeom prst="rect">
+            <a:avLst/>
+          </a:prstGeom>
+        </p:spPr>
+        <p:style>
+          <a:lnRef idx="2">
+            <a:schemeClr val="accent1">
+              <a:shade val="50000"/>
+            </a:schemeClr>
+          </a:lnRef>
+          <a:fillRef idx="1">
+            <a:schemeClr val="accent1"/>
+          </a:fillRef>
+          <a:effectRef idx="0">
+            <a:schemeClr val="accent1"/>
+          </a:effectRef>
+          <a:fontRef idx="minor">
+            <a:schemeClr val="lt1"/>
+          </a:fontRef>
+        </p:style>
+        <p:txBody>
+          <a:bodyPr rtlCol="0" anchor="ctr"/>
+          <a:lstStyle/>
+          <a:p>
+            <a:r>
+              <a:rPr lang="en-US" sz="1100" b="1" dirty="0"/>
+              <a:t>Panel host </a:t>
+            </a:r>
+            <a:endParaRPr lang="en-SG" sz="1100" b="1" dirty="0"/>
+          </a:p>
+        </p:txBody>
+      </p:sp>
+      <p:cxnSp>
+        <p:nvCxnSpPr>
+          <p:cNvPr id="36" name="Connector: Elbow 35">
+            <a:extLst>
+              <a:ext uri="{FF2B5EF4-FFF2-40B4-BE49-F238E27FC236}">
+                <a16:creationId xmlns:a16="http://schemas.microsoft.com/office/drawing/2014/main" id="{A305D0D7-0717-3F6E-3321-9EDBAC646E3B}"/>
+              </a:ext>
+            </a:extLst>
+          </p:cNvPr>
+          <p:cNvCxnSpPr>
+            <a:cxnSpLocks/>
+            <a:stCxn id="34" idx="0"/>
+            <a:endCxn id="31" idx="2"/>
+          </p:cNvCxnSpPr>
+          <p:nvPr/>
+        </p:nvCxnSpPr>
+        <p:spPr>
+          <a:xfrm rot="5400000" flipH="1" flipV="1">
+            <a:off x="1403147" y="2618542"/>
+            <a:ext cx="747069" cy="873849"/>
+          </a:xfrm>
+          <a:prstGeom prst="bentConnector3">
+            <a:avLst/>
+          </a:prstGeom>
+          <a:ln w="19050">
+            <a:tailEnd type="triangle"/>
+          </a:ln>
+        </p:spPr>
+        <p:style>
+          <a:lnRef idx="1">
+            <a:schemeClr val="dk1"/>
+          </a:lnRef>
+          <a:fillRef idx="0">
+            <a:schemeClr val="dk1"/>
+          </a:fillRef>
+          <a:effectRef idx="0">
+            <a:schemeClr val="dk1"/>
+          </a:effectRef>
+          <a:fontRef idx="minor">
+            <a:schemeClr val="tx1"/>
+          </a:fontRef>
+        </p:style>
+      </p:cxnSp>
+      <p:sp>
+        <p:nvSpPr>
+          <p:cNvPr id="38" name="Rectangle 37">
+            <a:extLst>
+              <a:ext uri="{FF2B5EF4-FFF2-40B4-BE49-F238E27FC236}">
+                <a16:creationId xmlns:a16="http://schemas.microsoft.com/office/drawing/2014/main" id="{3EA1AFEB-938E-D99F-AB1B-AB175C55925C}"/>
+              </a:ext>
+            </a:extLst>
+          </p:cNvPr>
+          <p:cNvSpPr/>
+          <p:nvPr/>
+        </p:nvSpPr>
+        <p:spPr>
+          <a:xfrm>
+            <a:off x="3130878" y="4409779"/>
+            <a:ext cx="946628" cy="445739"/>
+          </a:xfrm>
+          <a:prstGeom prst="rect">
+            <a:avLst/>
+          </a:prstGeom>
+        </p:spPr>
+        <p:style>
+          <a:lnRef idx="2">
+            <a:schemeClr val="accent1">
+              <a:shade val="50000"/>
+            </a:schemeClr>
+          </a:lnRef>
+          <a:fillRef idx="1">
+            <a:schemeClr val="accent1"/>
+          </a:fillRef>
+          <a:effectRef idx="0">
+            <a:schemeClr val="accent1"/>
+          </a:effectRef>
+          <a:fontRef idx="minor">
+            <a:schemeClr val="lt1"/>
+          </a:fontRef>
+        </p:style>
+        <p:txBody>
+          <a:bodyPr rtlCol="0" anchor="ctr"/>
+          <a:lstStyle/>
+          <a:p>
+            <a:r>
+              <a:rPr lang="en-US" sz="1100" b="1" dirty="0"/>
+              <a:t>Comm manager</a:t>
+            </a:r>
+            <a:endParaRPr lang="en-SG" sz="1100" b="1" dirty="0"/>
+          </a:p>
+        </p:txBody>
+      </p:sp>
+      <p:cxnSp>
+        <p:nvCxnSpPr>
+          <p:cNvPr id="40" name="Straight Arrow Connector 39">
+            <a:extLst>
+              <a:ext uri="{FF2B5EF4-FFF2-40B4-BE49-F238E27FC236}">
+                <a16:creationId xmlns:a16="http://schemas.microsoft.com/office/drawing/2014/main" id="{5D55806E-ADED-BFFE-8DD3-6621AD74CD56}"/>
+              </a:ext>
+            </a:extLst>
+          </p:cNvPr>
+          <p:cNvCxnSpPr>
+            <a:cxnSpLocks/>
+            <a:stCxn id="38" idx="1"/>
+          </p:cNvCxnSpPr>
+          <p:nvPr/>
+        </p:nvCxnSpPr>
+        <p:spPr>
+          <a:xfrm flipH="1" flipV="1">
+            <a:off x="2573700" y="4626664"/>
+            <a:ext cx="557178" cy="5985"/>
+          </a:xfrm>
+          <a:prstGeom prst="straightConnector1">
+            <a:avLst/>
+          </a:prstGeom>
+          <a:ln w="19050">
+            <a:tailEnd type="triangle"/>
+          </a:ln>
+        </p:spPr>
+        <p:style>
+          <a:lnRef idx="1">
+            <a:schemeClr val="dk1"/>
+          </a:lnRef>
+          <a:fillRef idx="0">
+            <a:schemeClr val="dk1"/>
+          </a:fillRef>
+          <a:effectRef idx="0">
+            <a:schemeClr val="dk1"/>
+          </a:effectRef>
+          <a:fontRef idx="minor">
+            <a:schemeClr val="tx1"/>
+          </a:fontRef>
+        </p:style>
+      </p:cxnSp>
+      <p:pic>
+        <p:nvPicPr>
+          <p:cNvPr id="42" name="Picture 41">
+            <a:extLst>
+              <a:ext uri="{FF2B5EF4-FFF2-40B4-BE49-F238E27FC236}">
+                <a16:creationId xmlns:a16="http://schemas.microsoft.com/office/drawing/2014/main" id="{5A3D4054-CA87-3297-85AD-857AA685007A}"/>
+              </a:ext>
+            </a:extLst>
+          </p:cNvPr>
+          <p:cNvPicPr>
+            <a:picLocks noChangeAspect="1"/>
+          </p:cNvPicPr>
+          <p:nvPr/>
+        </p:nvPicPr>
+        <p:blipFill>
+          <a:blip r:embed="rId5"/>
+          <a:stretch>
+            <a:fillRect/>
+          </a:stretch>
+        </p:blipFill>
+        <p:spPr>
+          <a:xfrm>
+            <a:off x="1783564" y="5262203"/>
+            <a:ext cx="511536" cy="600149"/>
+          </a:xfrm>
+          <a:prstGeom prst="rect">
+            <a:avLst/>
+          </a:prstGeom>
+          <a:ln w="9525">
+            <a:solidFill>
+              <a:schemeClr val="tx1"/>
+            </a:solidFill>
+          </a:ln>
+        </p:spPr>
+      </p:pic>
+      <p:cxnSp>
+        <p:nvCxnSpPr>
+          <p:cNvPr id="44" name="Straight Arrow Connector 43">
+            <a:extLst>
+              <a:ext uri="{FF2B5EF4-FFF2-40B4-BE49-F238E27FC236}">
+                <a16:creationId xmlns:a16="http://schemas.microsoft.com/office/drawing/2014/main" id="{DED127D9-12D6-34A1-5728-410B3BEEC57D}"/>
+              </a:ext>
+            </a:extLst>
+          </p:cNvPr>
+          <p:cNvCxnSpPr>
+            <a:cxnSpLocks/>
+          </p:cNvCxnSpPr>
+          <p:nvPr/>
+        </p:nvCxnSpPr>
+        <p:spPr>
+          <a:xfrm>
+            <a:off x="2030188" y="4888347"/>
+            <a:ext cx="0" cy="355568"/>
+          </a:xfrm>
+          <a:prstGeom prst="straightConnector1">
+            <a:avLst/>
+          </a:prstGeom>
+          <a:ln w="19050">
+            <a:headEnd type="triangle"/>
+            <a:tailEnd type="triangle"/>
+          </a:ln>
+        </p:spPr>
+        <p:style>
+          <a:lnRef idx="1">
+            <a:schemeClr val="dk1"/>
+          </a:lnRef>
+          <a:fillRef idx="0">
+            <a:schemeClr val="dk1"/>
+          </a:fillRef>
+          <a:effectRef idx="0">
+            <a:schemeClr val="dk1"/>
+          </a:effectRef>
+          <a:fontRef idx="minor">
+            <a:schemeClr val="tx1"/>
+          </a:fontRef>
+        </p:style>
+      </p:cxnSp>
+      <p:sp>
+        <p:nvSpPr>
+          <p:cNvPr id="46" name="Rectangle 45">
+            <a:extLst>
+              <a:ext uri="{FF2B5EF4-FFF2-40B4-BE49-F238E27FC236}">
+                <a16:creationId xmlns:a16="http://schemas.microsoft.com/office/drawing/2014/main" id="{68470823-7137-D543-55FE-C45E1CCCD9EC}"/>
+              </a:ext>
+            </a:extLst>
+          </p:cNvPr>
+          <p:cNvSpPr/>
+          <p:nvPr/>
+        </p:nvSpPr>
+        <p:spPr>
+          <a:xfrm>
+            <a:off x="2803095" y="3861981"/>
+            <a:ext cx="1158737" cy="261610"/>
+          </a:xfrm>
+          <a:prstGeom prst="rect">
+            <a:avLst/>
+          </a:prstGeom>
+        </p:spPr>
+        <p:style>
+          <a:lnRef idx="2">
+            <a:schemeClr val="accent1">
+              <a:shade val="50000"/>
+            </a:schemeClr>
+          </a:lnRef>
+          <a:fillRef idx="1">
+            <a:schemeClr val="accent1"/>
+          </a:fillRef>
+          <a:effectRef idx="0">
+            <a:schemeClr val="accent1"/>
+          </a:effectRef>
+          <a:fontRef idx="minor">
+            <a:schemeClr val="lt1"/>
+          </a:fontRef>
+        </p:style>
+        <p:txBody>
+          <a:bodyPr rtlCol="0" anchor="ctr"/>
+          <a:lstStyle/>
+          <a:p>
+            <a:r>
+              <a:rPr lang="en-US" sz="1100" b="1" dirty="0"/>
+              <a:t>Score calculator </a:t>
+            </a:r>
+            <a:endParaRPr lang="en-SG" sz="1100" b="1" dirty="0"/>
+          </a:p>
+        </p:txBody>
+      </p:sp>
+      <p:pic>
+        <p:nvPicPr>
+          <p:cNvPr id="50" name="Picture 49">
+            <a:extLst>
+              <a:ext uri="{FF2B5EF4-FFF2-40B4-BE49-F238E27FC236}">
+                <a16:creationId xmlns:a16="http://schemas.microsoft.com/office/drawing/2014/main" id="{5967D2B7-BAF1-7D71-ED66-8E5CD3554267}"/>
+              </a:ext>
+            </a:extLst>
+          </p:cNvPr>
+          <p:cNvPicPr>
+            <a:picLocks noChangeAspect="1"/>
+          </p:cNvPicPr>
+          <p:nvPr/>
+        </p:nvPicPr>
+        <p:blipFill>
+          <a:blip r:embed="rId6"/>
+          <a:stretch>
+            <a:fillRect/>
+          </a:stretch>
+        </p:blipFill>
+        <p:spPr>
+          <a:xfrm>
+            <a:off x="4350105" y="3647114"/>
+            <a:ext cx="245699" cy="281620"/>
+          </a:xfrm>
+          <a:prstGeom prst="rect">
+            <a:avLst/>
+          </a:prstGeom>
+        </p:spPr>
+      </p:pic>
+      <p:sp>
+        <p:nvSpPr>
+          <p:cNvPr id="51" name="TextBox 50">
+            <a:extLst>
+              <a:ext uri="{FF2B5EF4-FFF2-40B4-BE49-F238E27FC236}">
+                <a16:creationId xmlns:a16="http://schemas.microsoft.com/office/drawing/2014/main" id="{529F9F77-7F6F-340C-17E1-AA129D4B9B4B}"/>
+              </a:ext>
+            </a:extLst>
+          </p:cNvPr>
+          <p:cNvSpPr txBox="1"/>
+          <p:nvPr/>
+        </p:nvSpPr>
+        <p:spPr>
+          <a:xfrm>
+            <a:off x="3935226" y="3216227"/>
+            <a:ext cx="1424476" cy="430887"/>
+          </a:xfrm>
+          <a:prstGeom prst="rect">
+            <a:avLst/>
+          </a:prstGeom>
+          <a:noFill/>
+        </p:spPr>
+        <p:txBody>
+          <a:bodyPr wrap="square" rtlCol="0">
+            <a:spAutoFit/>
+          </a:bodyPr>
+          <a:lstStyle/>
+          <a:p>
+            <a:r>
+              <a:rPr lang="en-US" sz="1100" dirty="0">
+                <a:solidFill>
+                  <a:srgbClr val="002060"/>
+                </a:solidFill>
+              </a:rPr>
+              <a:t>Customer’s score calculation formular</a:t>
+            </a:r>
+            <a:endParaRPr lang="en-SG" sz="1100" dirty="0">
+              <a:solidFill>
+                <a:srgbClr val="002060"/>
+              </a:solidFill>
+            </a:endParaRPr>
+          </a:p>
+        </p:txBody>
+      </p:sp>
+      <p:cxnSp>
+        <p:nvCxnSpPr>
+          <p:cNvPr id="53" name="Connector: Elbow 52">
+            <a:extLst>
+              <a:ext uri="{FF2B5EF4-FFF2-40B4-BE49-F238E27FC236}">
+                <a16:creationId xmlns:a16="http://schemas.microsoft.com/office/drawing/2014/main" id="{D7E49B6F-BBA9-A04D-812B-B593FCD6362E}"/>
+              </a:ext>
+            </a:extLst>
+          </p:cNvPr>
+          <p:cNvCxnSpPr>
+            <a:stCxn id="50" idx="1"/>
+            <a:endCxn id="46" idx="3"/>
+          </p:cNvCxnSpPr>
+          <p:nvPr/>
+        </p:nvCxnSpPr>
+        <p:spPr>
+          <a:xfrm rot="10800000" flipV="1">
+            <a:off x="3961833" y="3787924"/>
+            <a:ext cx="388273" cy="204862"/>
+          </a:xfrm>
+          <a:prstGeom prst="bentConnector3">
+            <a:avLst/>
+          </a:prstGeom>
+          <a:ln>
+            <a:tailEnd type="triangle"/>
+          </a:ln>
+        </p:spPr>
+        <p:style>
+          <a:lnRef idx="1">
+            <a:schemeClr val="accent1"/>
+          </a:lnRef>
+          <a:fillRef idx="0">
+            <a:schemeClr val="accent1"/>
+          </a:fillRef>
+          <a:effectRef idx="0">
+            <a:schemeClr val="accent1"/>
+          </a:effectRef>
+          <a:fontRef idx="minor">
+            <a:schemeClr val="tx1"/>
+          </a:fontRef>
+        </p:style>
+      </p:cxnSp>
+      <p:cxnSp>
+        <p:nvCxnSpPr>
+          <p:cNvPr id="56" name="Connector: Elbow 55">
+            <a:extLst>
+              <a:ext uri="{FF2B5EF4-FFF2-40B4-BE49-F238E27FC236}">
+                <a16:creationId xmlns:a16="http://schemas.microsoft.com/office/drawing/2014/main" id="{B76EB6A8-4500-9663-8B30-9A39B47FB0D9}"/>
+              </a:ext>
+            </a:extLst>
+          </p:cNvPr>
+          <p:cNvCxnSpPr>
+            <a:endCxn id="46" idx="1"/>
+          </p:cNvCxnSpPr>
+          <p:nvPr/>
+        </p:nvCxnSpPr>
+        <p:spPr>
+          <a:xfrm rot="5400000" flipH="1" flipV="1">
+            <a:off x="2436635" y="4043319"/>
+            <a:ext cx="416993" cy="315928"/>
+          </a:xfrm>
+          <a:prstGeom prst="bentConnector2">
+            <a:avLst/>
+          </a:prstGeom>
+          <a:ln w="19050">
+            <a:tailEnd type="triangle"/>
+          </a:ln>
+        </p:spPr>
+        <p:style>
+          <a:lnRef idx="1">
+            <a:schemeClr val="dk1"/>
+          </a:lnRef>
+          <a:fillRef idx="0">
+            <a:schemeClr val="dk1"/>
+          </a:fillRef>
+          <a:effectRef idx="0">
+            <a:schemeClr val="dk1"/>
+          </a:effectRef>
+          <a:fontRef idx="minor">
+            <a:schemeClr val="tx1"/>
+          </a:fontRef>
+        </p:style>
+      </p:cxnSp>
+      <p:cxnSp>
+        <p:nvCxnSpPr>
+          <p:cNvPr id="57" name="Straight Arrow Connector 56">
+            <a:extLst>
+              <a:ext uri="{FF2B5EF4-FFF2-40B4-BE49-F238E27FC236}">
+                <a16:creationId xmlns:a16="http://schemas.microsoft.com/office/drawing/2014/main" id="{E82D5735-4089-DEF6-777E-4643C634C7EE}"/>
+              </a:ext>
+            </a:extLst>
+          </p:cNvPr>
+          <p:cNvCxnSpPr>
+            <a:cxnSpLocks/>
+          </p:cNvCxnSpPr>
+          <p:nvPr/>
+        </p:nvCxnSpPr>
+        <p:spPr>
+          <a:xfrm flipV="1">
+            <a:off x="3121065" y="3602619"/>
+            <a:ext cx="0" cy="259362"/>
+          </a:xfrm>
+          <a:prstGeom prst="straightConnector1">
+            <a:avLst/>
+          </a:prstGeom>
+          <a:ln w="19050">
+            <a:tailEnd type="triangle"/>
+          </a:ln>
+        </p:spPr>
+        <p:style>
+          <a:lnRef idx="1">
+            <a:schemeClr val="dk1"/>
+          </a:lnRef>
+          <a:fillRef idx="0">
+            <a:schemeClr val="dk1"/>
+          </a:fillRef>
+          <a:effectRef idx="0">
+            <a:schemeClr val="dk1"/>
+          </a:effectRef>
+          <a:fontRef idx="minor">
+            <a:schemeClr val="tx1"/>
+          </a:fontRef>
+        </p:style>
+      </p:cxnSp>
+      <p:cxnSp>
+        <p:nvCxnSpPr>
+          <p:cNvPr id="59" name="Connector: Elbow 58">
+            <a:extLst>
+              <a:ext uri="{FF2B5EF4-FFF2-40B4-BE49-F238E27FC236}">
+                <a16:creationId xmlns:a16="http://schemas.microsoft.com/office/drawing/2014/main" id="{C191D577-54C9-F7A6-4E6B-85925BF167F7}"/>
+              </a:ext>
+            </a:extLst>
+          </p:cNvPr>
+          <p:cNvCxnSpPr>
+            <a:cxnSpLocks/>
+            <a:endCxn id="34" idx="3"/>
+          </p:cNvCxnSpPr>
+          <p:nvPr/>
+        </p:nvCxnSpPr>
+        <p:spPr>
+          <a:xfrm rot="10800000">
+            <a:off x="1747945" y="3566012"/>
+            <a:ext cx="1055157" cy="304231"/>
+          </a:xfrm>
+          <a:prstGeom prst="bentConnector3">
+            <a:avLst/>
+          </a:prstGeom>
+          <a:ln w="19050">
+            <a:tailEnd type="triangle"/>
+          </a:ln>
+        </p:spPr>
+        <p:style>
+          <a:lnRef idx="1">
+            <a:schemeClr val="dk1"/>
+          </a:lnRef>
+          <a:fillRef idx="0">
+            <a:schemeClr val="dk1"/>
+          </a:fillRef>
+          <a:effectRef idx="0">
+            <a:schemeClr val="dk1"/>
+          </a:effectRef>
+          <a:fontRef idx="minor">
+            <a:schemeClr val="tx1"/>
+          </a:fontRef>
+        </p:style>
+      </p:cxnSp>
+      <p:cxnSp>
+        <p:nvCxnSpPr>
+          <p:cNvPr id="62" name="Connector: Elbow 61">
+            <a:extLst>
+              <a:ext uri="{FF2B5EF4-FFF2-40B4-BE49-F238E27FC236}">
+                <a16:creationId xmlns:a16="http://schemas.microsoft.com/office/drawing/2014/main" id="{F24B144E-A755-64B9-854B-E7DC4FC08693}"/>
+              </a:ext>
+            </a:extLst>
+          </p:cNvPr>
+          <p:cNvCxnSpPr>
+            <a:cxnSpLocks/>
+            <a:stCxn id="33" idx="0"/>
+            <a:endCxn id="34" idx="2"/>
+          </p:cNvCxnSpPr>
+          <p:nvPr/>
+        </p:nvCxnSpPr>
+        <p:spPr>
+          <a:xfrm rot="16200000" flipV="1">
+            <a:off x="1366693" y="3676086"/>
+            <a:ext cx="706759" cy="760629"/>
+          </a:xfrm>
+          <a:prstGeom prst="bentConnector3">
+            <a:avLst>
+              <a:gd name="adj1" fmla="val 50000"/>
+            </a:avLst>
+          </a:prstGeom>
+          <a:ln w="19050">
+            <a:tailEnd type="triangle"/>
+          </a:ln>
+        </p:spPr>
+        <p:style>
+          <a:lnRef idx="1">
+            <a:schemeClr val="dk1"/>
+          </a:lnRef>
+          <a:fillRef idx="0">
+            <a:schemeClr val="dk1"/>
+          </a:fillRef>
+          <a:effectRef idx="0">
+            <a:schemeClr val="dk1"/>
+          </a:effectRef>
+          <a:fontRef idx="minor">
+            <a:schemeClr val="tx1"/>
+          </a:fontRef>
+        </p:style>
+      </p:cxnSp>
+      <p:pic>
+        <p:nvPicPr>
+          <p:cNvPr id="69" name="Picture 68">
+            <a:extLst>
+              <a:ext uri="{FF2B5EF4-FFF2-40B4-BE49-F238E27FC236}">
+                <a16:creationId xmlns:a16="http://schemas.microsoft.com/office/drawing/2014/main" id="{1C7C342C-5B86-8C57-2EC0-D962C4B791AB}"/>
+              </a:ext>
+            </a:extLst>
+          </p:cNvPr>
+          <p:cNvPicPr>
+            <a:picLocks noChangeAspect="1"/>
+          </p:cNvPicPr>
+          <p:nvPr/>
+        </p:nvPicPr>
+        <p:blipFill>
+          <a:blip r:embed="rId6"/>
+          <a:stretch>
+            <a:fillRect/>
+          </a:stretch>
+        </p:blipFill>
+        <p:spPr>
+          <a:xfrm>
+            <a:off x="7306341" y="3365494"/>
+            <a:ext cx="245699" cy="281620"/>
+          </a:xfrm>
+          <a:prstGeom prst="rect">
+            <a:avLst/>
+          </a:prstGeom>
+        </p:spPr>
+      </p:pic>
+      <p:cxnSp>
+        <p:nvCxnSpPr>
+          <p:cNvPr id="71" name="Straight Arrow Connector 70">
+            <a:extLst>
+              <a:ext uri="{FF2B5EF4-FFF2-40B4-BE49-F238E27FC236}">
+                <a16:creationId xmlns:a16="http://schemas.microsoft.com/office/drawing/2014/main" id="{E8A80C1D-E490-58A0-8E98-56D065B0A193}"/>
+              </a:ext>
+            </a:extLst>
+          </p:cNvPr>
+          <p:cNvCxnSpPr>
+            <a:cxnSpLocks/>
+          </p:cNvCxnSpPr>
+          <p:nvPr/>
+        </p:nvCxnSpPr>
+        <p:spPr>
+          <a:xfrm>
+            <a:off x="7445505" y="3718128"/>
+            <a:ext cx="0" cy="371106"/>
+          </a:xfrm>
+          <a:prstGeom prst="straightConnector1">
+            <a:avLst/>
+          </a:prstGeom>
+          <a:ln>
+            <a:tailEnd type="triangle"/>
+          </a:ln>
+        </p:spPr>
+        <p:style>
+          <a:lnRef idx="1">
+            <a:schemeClr val="accent1"/>
+          </a:lnRef>
+          <a:fillRef idx="0">
+            <a:schemeClr val="accent1"/>
+          </a:fillRef>
+          <a:effectRef idx="0">
+            <a:schemeClr val="accent1"/>
+          </a:effectRef>
+          <a:fontRef idx="minor">
+            <a:schemeClr val="tx1"/>
+          </a:fontRef>
+        </p:style>
+      </p:cxnSp>
+      <p:sp>
+        <p:nvSpPr>
+          <p:cNvPr id="72" name="TextBox 71">
+            <a:extLst>
+              <a:ext uri="{FF2B5EF4-FFF2-40B4-BE49-F238E27FC236}">
+                <a16:creationId xmlns:a16="http://schemas.microsoft.com/office/drawing/2014/main" id="{E81BE3F8-F035-E5A7-974A-A98AB655AC07}"/>
+              </a:ext>
+            </a:extLst>
+          </p:cNvPr>
+          <p:cNvSpPr txBox="1"/>
+          <p:nvPr/>
+        </p:nvSpPr>
+        <p:spPr>
+          <a:xfrm>
+            <a:off x="7568039" y="3236317"/>
+            <a:ext cx="1139667" cy="430887"/>
+          </a:xfrm>
+          <a:prstGeom prst="rect">
+            <a:avLst/>
+          </a:prstGeom>
+          <a:noFill/>
+        </p:spPr>
+        <p:txBody>
+          <a:bodyPr wrap="square" rtlCol="0">
+            <a:spAutoFit/>
+          </a:bodyPr>
+          <a:lstStyle/>
+          <a:p>
+            <a:r>
+              <a:rPr lang="en-US" sz="1100" dirty="0">
+                <a:solidFill>
+                  <a:srgbClr val="002060"/>
+                </a:solidFill>
+              </a:rPr>
+              <a:t>Probers’ config profile</a:t>
+            </a:r>
+            <a:endParaRPr lang="en-SG" sz="1100" dirty="0">
+              <a:solidFill>
+                <a:srgbClr val="002060"/>
+              </a:solidFill>
+            </a:endParaRPr>
+          </a:p>
+        </p:txBody>
+      </p:sp>
+      <p:pic>
+        <p:nvPicPr>
+          <p:cNvPr id="73" name="Picture 72">
+            <a:extLst>
+              <a:ext uri="{FF2B5EF4-FFF2-40B4-BE49-F238E27FC236}">
+                <a16:creationId xmlns:a16="http://schemas.microsoft.com/office/drawing/2014/main" id="{CBE0DA9A-95FF-CEAE-6942-24991EE229C9}"/>
+              </a:ext>
+            </a:extLst>
+          </p:cNvPr>
+          <p:cNvPicPr>
+            <a:picLocks noChangeAspect="1"/>
+          </p:cNvPicPr>
+          <p:nvPr/>
+        </p:nvPicPr>
+        <p:blipFill>
+          <a:blip r:embed="rId7"/>
+          <a:stretch>
+            <a:fillRect/>
+          </a:stretch>
+        </p:blipFill>
+        <p:spPr>
+          <a:xfrm>
+            <a:off x="6338654" y="2036066"/>
+            <a:ext cx="340086" cy="356554"/>
+          </a:xfrm>
+          <a:prstGeom prst="rect">
+            <a:avLst/>
+          </a:prstGeom>
+          <a:ln w="19050">
+            <a:solidFill>
+              <a:schemeClr val="tx1"/>
+            </a:solidFill>
+          </a:ln>
+        </p:spPr>
+      </p:pic>
+      <p:sp>
+        <p:nvSpPr>
+          <p:cNvPr id="74" name="Rectangle 73">
+            <a:extLst>
+              <a:ext uri="{FF2B5EF4-FFF2-40B4-BE49-F238E27FC236}">
+                <a16:creationId xmlns:a16="http://schemas.microsoft.com/office/drawing/2014/main" id="{EF7F7DAC-3D77-A242-CC17-4C911574C2DA}"/>
+              </a:ext>
+            </a:extLst>
+          </p:cNvPr>
+          <p:cNvSpPr/>
+          <p:nvPr/>
+        </p:nvSpPr>
+        <p:spPr>
+          <a:xfrm>
+            <a:off x="554609" y="1944622"/>
+            <a:ext cx="3231006" cy="953206"/>
+          </a:xfrm>
+          <a:prstGeom prst="rect">
+            <a:avLst/>
+          </a:prstGeom>
+          <a:noFill/>
+          <a:ln>
+            <a:prstDash val="sysDash"/>
+          </a:ln>
+        </p:spPr>
+        <p:style>
+          <a:lnRef idx="2">
+            <a:schemeClr val="accent1">
+              <a:shade val="50000"/>
+            </a:schemeClr>
+          </a:lnRef>
+          <a:fillRef idx="1">
+            <a:schemeClr val="accent1"/>
+          </a:fillRef>
+          <a:effectRef idx="0">
+            <a:schemeClr val="accent1"/>
+          </a:effectRef>
+          <a:fontRef idx="minor">
+            <a:schemeClr val="lt1"/>
+          </a:fontRef>
+        </p:style>
+        <p:txBody>
+          <a:bodyPr rtlCol="0" anchor="ctr"/>
+          <a:lstStyle/>
+          <a:p>
+            <a:pPr algn="ctr"/>
+            <a:endParaRPr lang="en-SG" dirty="0"/>
+          </a:p>
+        </p:txBody>
+      </p:sp>
+      <p:sp>
+        <p:nvSpPr>
+          <p:cNvPr id="76" name="TextBox 75">
+            <a:extLst>
+              <a:ext uri="{FF2B5EF4-FFF2-40B4-BE49-F238E27FC236}">
+                <a16:creationId xmlns:a16="http://schemas.microsoft.com/office/drawing/2014/main" id="{356ABD97-6561-CB73-8F6A-532F9C1A3BDA}"/>
+              </a:ext>
+            </a:extLst>
+          </p:cNvPr>
+          <p:cNvSpPr txBox="1"/>
+          <p:nvPr/>
+        </p:nvSpPr>
+        <p:spPr>
+          <a:xfrm>
+            <a:off x="6162041" y="1615809"/>
+            <a:ext cx="1641854" cy="276999"/>
+          </a:xfrm>
+          <a:prstGeom prst="rect">
+            <a:avLst/>
+          </a:prstGeom>
+          <a:noFill/>
+        </p:spPr>
+        <p:txBody>
+          <a:bodyPr wrap="square" rtlCol="0">
+            <a:spAutoFit/>
+          </a:bodyPr>
+          <a:lstStyle/>
+          <a:p>
+            <a:r>
+              <a:rPr lang="en-US" sz="1200" b="1" dirty="0">
+                <a:solidFill>
+                  <a:srgbClr val="002060"/>
+                </a:solidFill>
+              </a:rPr>
+              <a:t>Prober repository </a:t>
+            </a:r>
+            <a:endParaRPr lang="en-SG" sz="1200" b="1" dirty="0">
+              <a:solidFill>
+                <a:srgbClr val="002060"/>
+              </a:solidFill>
+            </a:endParaRPr>
+          </a:p>
+        </p:txBody>
+      </p:sp>
+      <p:sp>
+        <p:nvSpPr>
+          <p:cNvPr id="77" name="Rectangle 76">
+            <a:extLst>
+              <a:ext uri="{FF2B5EF4-FFF2-40B4-BE49-F238E27FC236}">
+                <a16:creationId xmlns:a16="http://schemas.microsoft.com/office/drawing/2014/main" id="{1940F5C5-40A2-6495-B0F7-3972FF443511}"/>
+              </a:ext>
+            </a:extLst>
+          </p:cNvPr>
+          <p:cNvSpPr/>
+          <p:nvPr/>
+        </p:nvSpPr>
+        <p:spPr>
+          <a:xfrm>
+            <a:off x="6767709" y="2054394"/>
+            <a:ext cx="1339208" cy="338225"/>
+          </a:xfrm>
+          <a:prstGeom prst="rect">
+            <a:avLst/>
+          </a:prstGeom>
+          <a:solidFill>
+            <a:schemeClr val="accent6">
+              <a:lumMod val="75000"/>
+            </a:schemeClr>
+          </a:solidFill>
+        </p:spPr>
+        <p:style>
+          <a:lnRef idx="2">
+            <a:schemeClr val="accent1">
+              <a:shade val="50000"/>
+            </a:schemeClr>
+          </a:lnRef>
+          <a:fillRef idx="1">
+            <a:schemeClr val="accent1"/>
+          </a:fillRef>
+          <a:effectRef idx="0">
+            <a:schemeClr val="accent1"/>
+          </a:effectRef>
+          <a:fontRef idx="minor">
+            <a:schemeClr val="lt1"/>
+          </a:fontRef>
+        </p:style>
+        <p:txBody>
+          <a:bodyPr rtlCol="0" anchor="ctr"/>
+          <a:lstStyle/>
+          <a:p>
+            <a:pPr algn="ctr"/>
+            <a:r>
+              <a:rPr lang="en-US" sz="1100" dirty="0"/>
+              <a:t>Network service Prober</a:t>
+            </a:r>
+            <a:endParaRPr lang="en-SG" sz="1100" dirty="0"/>
+          </a:p>
+        </p:txBody>
+      </p:sp>
+      <p:sp>
+        <p:nvSpPr>
+          <p:cNvPr id="78" name="Rectangle 77">
+            <a:extLst>
+              <a:ext uri="{FF2B5EF4-FFF2-40B4-BE49-F238E27FC236}">
+                <a16:creationId xmlns:a16="http://schemas.microsoft.com/office/drawing/2014/main" id="{8857931D-A5F0-7B87-9D15-A4DCF9A50C09}"/>
+              </a:ext>
+            </a:extLst>
+          </p:cNvPr>
+          <p:cNvSpPr/>
+          <p:nvPr/>
+        </p:nvSpPr>
+        <p:spPr>
+          <a:xfrm>
+            <a:off x="6766895" y="2543201"/>
+            <a:ext cx="1339208" cy="338225"/>
+          </a:xfrm>
+          <a:prstGeom prst="rect">
+            <a:avLst/>
+          </a:prstGeom>
+          <a:solidFill>
+            <a:schemeClr val="accent6">
+              <a:lumMod val="75000"/>
+            </a:schemeClr>
+          </a:solidFill>
+        </p:spPr>
+        <p:style>
+          <a:lnRef idx="2">
+            <a:schemeClr val="accent1">
+              <a:shade val="50000"/>
+            </a:schemeClr>
+          </a:lnRef>
+          <a:fillRef idx="1">
+            <a:schemeClr val="accent1"/>
+          </a:fillRef>
+          <a:effectRef idx="0">
+            <a:schemeClr val="accent1"/>
+          </a:effectRef>
+          <a:fontRef idx="minor">
+            <a:schemeClr val="lt1"/>
+          </a:fontRef>
+        </p:style>
+        <p:txBody>
+          <a:bodyPr rtlCol="0" anchor="ctr"/>
+          <a:lstStyle/>
+          <a:p>
+            <a:pPr algn="ctr"/>
+            <a:r>
+              <a:rPr lang="en-US" sz="1100" dirty="0"/>
+              <a:t>Local service Prober</a:t>
+            </a:r>
+            <a:endParaRPr lang="en-SG" sz="1100" dirty="0"/>
+          </a:p>
+        </p:txBody>
+      </p:sp>
+      <p:sp>
+        <p:nvSpPr>
+          <p:cNvPr id="79" name="Arrow: Right 78">
+            <a:extLst>
+              <a:ext uri="{FF2B5EF4-FFF2-40B4-BE49-F238E27FC236}">
+                <a16:creationId xmlns:a16="http://schemas.microsoft.com/office/drawing/2014/main" id="{08D70A98-BD22-09C0-5E75-19FE5FD7B62E}"/>
+              </a:ext>
+            </a:extLst>
+          </p:cNvPr>
+          <p:cNvSpPr/>
+          <p:nvPr/>
+        </p:nvSpPr>
+        <p:spPr>
+          <a:xfrm rot="5400000">
+            <a:off x="6409454" y="3446776"/>
+            <a:ext cx="877001" cy="215023"/>
+          </a:xfrm>
+          <a:prstGeom prst="rightArrow">
+            <a:avLst/>
+          </a:prstGeom>
+        </p:spPr>
+        <p:style>
+          <a:lnRef idx="2">
+            <a:schemeClr val="accent6">
+              <a:shade val="50000"/>
+            </a:schemeClr>
+          </a:lnRef>
+          <a:fillRef idx="1">
+            <a:schemeClr val="accent6"/>
+          </a:fillRef>
+          <a:effectRef idx="0">
+            <a:schemeClr val="accent6"/>
+          </a:effectRef>
+          <a:fontRef idx="minor">
+            <a:schemeClr val="lt1"/>
+          </a:fontRef>
+        </p:style>
+        <p:txBody>
+          <a:bodyPr rtlCol="0" anchor="ctr"/>
+          <a:lstStyle/>
+          <a:p>
+            <a:pPr algn="ctr"/>
+            <a:endParaRPr lang="en-SG"/>
+          </a:p>
+        </p:txBody>
+      </p:sp>
+      <p:cxnSp>
+        <p:nvCxnSpPr>
+          <p:cNvPr id="81" name="Straight Arrow Connector 80">
+            <a:extLst>
+              <a:ext uri="{FF2B5EF4-FFF2-40B4-BE49-F238E27FC236}">
+                <a16:creationId xmlns:a16="http://schemas.microsoft.com/office/drawing/2014/main" id="{B6B86357-A97C-B8EC-B635-C1A4F293CE8F}"/>
+              </a:ext>
+            </a:extLst>
+          </p:cNvPr>
+          <p:cNvCxnSpPr>
+            <a:cxnSpLocks/>
+          </p:cNvCxnSpPr>
+          <p:nvPr/>
+        </p:nvCxnSpPr>
+        <p:spPr>
+          <a:xfrm>
+            <a:off x="7724416" y="4245296"/>
+            <a:ext cx="1282424" cy="0"/>
+          </a:xfrm>
+          <a:prstGeom prst="straightConnector1">
+            <a:avLst/>
+          </a:prstGeom>
+          <a:ln>
+            <a:prstDash val="dash"/>
+            <a:tailEnd type="triangle"/>
+          </a:ln>
+        </p:spPr>
+        <p:style>
+          <a:lnRef idx="1">
+            <a:schemeClr val="accent1"/>
+          </a:lnRef>
+          <a:fillRef idx="0">
+            <a:schemeClr val="accent1"/>
+          </a:fillRef>
+          <a:effectRef idx="0">
+            <a:schemeClr val="accent1"/>
+          </a:effectRef>
+          <a:fontRef idx="minor">
+            <a:schemeClr val="tx1"/>
+          </a:fontRef>
+        </p:style>
+      </p:cxnSp>
+      <p:pic>
+        <p:nvPicPr>
+          <p:cNvPr id="83" name="Picture 22" descr="Download Free Icons Png - Rack Server Icon Png PNG Image with No Background  - PNGkey.com">
+            <a:extLst>
+              <a:ext uri="{FF2B5EF4-FFF2-40B4-BE49-F238E27FC236}">
+                <a16:creationId xmlns:a16="http://schemas.microsoft.com/office/drawing/2014/main" id="{F4211072-B674-3807-2654-FEBB4A13B5B1}"/>
+              </a:ext>
+            </a:extLst>
+          </p:cNvPr>
+          <p:cNvPicPr>
+            <a:picLocks noChangeAspect="1" noChangeArrowheads="1"/>
+          </p:cNvPicPr>
+          <p:nvPr/>
+        </p:nvPicPr>
+        <p:blipFill>
+          <a:blip r:embed="rId8">
+            <a:extLst>
+              <a:ext uri="{28A0092B-C50C-407E-A947-70E740481C1C}">
+                <a14:useLocalDpi xmlns:a14="http://schemas.microsoft.com/office/drawing/2010/main" val="0"/>
+              </a:ext>
+            </a:extLst>
+          </a:blip>
+          <a:srcRect/>
+          <a:stretch>
+            <a:fillRect/>
+          </a:stretch>
+        </p:blipFill>
+        <p:spPr bwMode="auto">
+          <a:xfrm>
+            <a:off x="9092279" y="3991939"/>
+            <a:ext cx="444385" cy="506713"/>
+          </a:xfrm>
+          <a:prstGeom prst="rect">
+            <a:avLst/>
+          </a:prstGeom>
+          <a:noFill/>
+          <a:extLst>
+            <a:ext uri="{909E8E84-426E-40DD-AFC4-6F175D3DCCD1}">
+              <a14:hiddenFill xmlns:a14="http://schemas.microsoft.com/office/drawing/2010/main">
+                <a:solidFill>
+                  <a:srgbClr val="FFFFFF"/>
+                </a:solidFill>
+              </a14:hiddenFill>
+            </a:ext>
+          </a:extLst>
+        </p:spPr>
+      </p:pic>
+      <p:sp>
+        <p:nvSpPr>
+          <p:cNvPr id="84" name="TextBox 83">
+            <a:extLst>
+              <a:ext uri="{FF2B5EF4-FFF2-40B4-BE49-F238E27FC236}">
+                <a16:creationId xmlns:a16="http://schemas.microsoft.com/office/drawing/2014/main" id="{17CFEA7F-3ABC-3F11-CA5B-B28915CDCA9C}"/>
+              </a:ext>
+            </a:extLst>
+          </p:cNvPr>
+          <p:cNvSpPr txBox="1"/>
+          <p:nvPr/>
+        </p:nvSpPr>
+        <p:spPr>
+          <a:xfrm>
+            <a:off x="8913149" y="4520094"/>
+            <a:ext cx="1641854" cy="461665"/>
+          </a:xfrm>
+          <a:prstGeom prst="rect">
+            <a:avLst/>
+          </a:prstGeom>
+          <a:noFill/>
+        </p:spPr>
+        <p:txBody>
+          <a:bodyPr wrap="square" rtlCol="0">
+            <a:spAutoFit/>
+          </a:bodyPr>
+          <a:lstStyle/>
+          <a:p>
+            <a:r>
+              <a:rPr lang="en-US" sz="1200" b="1" dirty="0">
+                <a:solidFill>
+                  <a:srgbClr val="002060"/>
+                </a:solidFill>
+              </a:rPr>
+              <a:t>Monitored cluster [check from inside]</a:t>
+            </a:r>
+            <a:endParaRPr lang="en-SG" sz="1200" b="1" dirty="0">
+              <a:solidFill>
+                <a:srgbClr val="002060"/>
+              </a:solidFill>
+            </a:endParaRPr>
+          </a:p>
+        </p:txBody>
+      </p:sp>
+      <p:sp>
+        <p:nvSpPr>
+          <p:cNvPr id="85" name="Rectangle 84">
+            <a:extLst>
+              <a:ext uri="{FF2B5EF4-FFF2-40B4-BE49-F238E27FC236}">
+                <a16:creationId xmlns:a16="http://schemas.microsoft.com/office/drawing/2014/main" id="{F1941F3B-696E-32AA-A4BE-7F55593D3FFA}"/>
+              </a:ext>
+            </a:extLst>
+          </p:cNvPr>
+          <p:cNvSpPr/>
+          <p:nvPr/>
+        </p:nvSpPr>
+        <p:spPr>
+          <a:xfrm>
+            <a:off x="6508697" y="4601839"/>
+            <a:ext cx="1213101" cy="296183"/>
+          </a:xfrm>
+          <a:prstGeom prst="rect">
+            <a:avLst/>
+          </a:prstGeom>
+        </p:spPr>
+        <p:style>
+          <a:lnRef idx="2">
+            <a:schemeClr val="accent1">
+              <a:shade val="50000"/>
+            </a:schemeClr>
+          </a:lnRef>
+          <a:fillRef idx="1">
+            <a:schemeClr val="accent1"/>
+          </a:fillRef>
+          <a:effectRef idx="0">
+            <a:schemeClr val="accent1"/>
+          </a:effectRef>
+          <a:fontRef idx="minor">
+            <a:schemeClr val="lt1"/>
+          </a:fontRef>
+        </p:style>
+        <p:txBody>
+          <a:bodyPr rtlCol="0" anchor="ctr"/>
+          <a:lstStyle/>
+          <a:p>
+            <a:r>
+              <a:rPr lang="en-US" sz="1100" b="1" dirty="0"/>
+              <a:t>Prober Agent </a:t>
+            </a:r>
+            <a:endParaRPr lang="en-SG" sz="1100" b="1" dirty="0"/>
+          </a:p>
+        </p:txBody>
+      </p:sp>
+      <p:sp>
+        <p:nvSpPr>
+          <p:cNvPr id="86" name="Rectangle 85">
+            <a:extLst>
+              <a:ext uri="{FF2B5EF4-FFF2-40B4-BE49-F238E27FC236}">
+                <a16:creationId xmlns:a16="http://schemas.microsoft.com/office/drawing/2014/main" id="{E763F1B4-44F9-012B-3918-6AB15C36B466}"/>
+              </a:ext>
+            </a:extLst>
+          </p:cNvPr>
+          <p:cNvSpPr/>
+          <p:nvPr/>
+        </p:nvSpPr>
+        <p:spPr>
+          <a:xfrm>
+            <a:off x="9174370" y="5566169"/>
+            <a:ext cx="1213101" cy="296183"/>
+          </a:xfrm>
+          <a:prstGeom prst="rect">
+            <a:avLst/>
+          </a:prstGeom>
+        </p:spPr>
+        <p:style>
+          <a:lnRef idx="2">
+            <a:schemeClr val="accent1">
+              <a:shade val="50000"/>
+            </a:schemeClr>
+          </a:lnRef>
+          <a:fillRef idx="1">
+            <a:schemeClr val="accent1"/>
+          </a:fillRef>
+          <a:effectRef idx="0">
+            <a:schemeClr val="accent1"/>
+          </a:effectRef>
+          <a:fontRef idx="minor">
+            <a:schemeClr val="lt1"/>
+          </a:fontRef>
+        </p:style>
+        <p:txBody>
+          <a:bodyPr rtlCol="0" anchor="ctr"/>
+          <a:lstStyle/>
+          <a:p>
+            <a:r>
+              <a:rPr lang="en-US" sz="1100" b="1" dirty="0"/>
+              <a:t>Prober Agent </a:t>
+            </a:r>
+            <a:endParaRPr lang="en-SG" sz="1100" b="1" dirty="0"/>
+          </a:p>
+        </p:txBody>
+      </p:sp>
+      <p:pic>
+        <p:nvPicPr>
+          <p:cNvPr id="87" name="Picture 22" descr="Download Free Icons Png - Rack Server Icon Png PNG Image with No Background  - PNGkey.com">
+            <a:extLst>
+              <a:ext uri="{FF2B5EF4-FFF2-40B4-BE49-F238E27FC236}">
+                <a16:creationId xmlns:a16="http://schemas.microsoft.com/office/drawing/2014/main" id="{E474459D-F5E7-251A-CEE6-C6AD80B5AB47}"/>
+              </a:ext>
+            </a:extLst>
+          </p:cNvPr>
+          <p:cNvPicPr>
+            <a:picLocks noChangeAspect="1" noChangeArrowheads="1"/>
+          </p:cNvPicPr>
+          <p:nvPr/>
+        </p:nvPicPr>
+        <p:blipFill>
+          <a:blip r:embed="rId8">
+            <a:extLst>
+              <a:ext uri="{28A0092B-C50C-407E-A947-70E740481C1C}">
+                <a14:useLocalDpi xmlns:a14="http://schemas.microsoft.com/office/drawing/2010/main" val="0"/>
+              </a:ext>
+            </a:extLst>
+          </a:blip>
+          <a:srcRect/>
+          <a:stretch>
+            <a:fillRect/>
+          </a:stretch>
+        </p:blipFill>
+        <p:spPr bwMode="auto">
+          <a:xfrm>
+            <a:off x="9133209" y="5031059"/>
+            <a:ext cx="444385" cy="506713"/>
+          </a:xfrm>
+          <a:prstGeom prst="rect">
+            <a:avLst/>
+          </a:prstGeom>
+          <a:noFill/>
+          <a:extLst>
+            <a:ext uri="{909E8E84-426E-40DD-AFC4-6F175D3DCCD1}">
+              <a14:hiddenFill xmlns:a14="http://schemas.microsoft.com/office/drawing/2010/main">
+                <a:solidFill>
+                  <a:srgbClr val="FFFFFF"/>
+                </a:solidFill>
+              </a14:hiddenFill>
+            </a:ext>
+          </a:extLst>
+        </p:spPr>
+      </p:pic>
+      <p:sp>
+        <p:nvSpPr>
+          <p:cNvPr id="88" name="TextBox 87">
+            <a:extLst>
+              <a:ext uri="{FF2B5EF4-FFF2-40B4-BE49-F238E27FC236}">
+                <a16:creationId xmlns:a16="http://schemas.microsoft.com/office/drawing/2014/main" id="{B9E190D5-9E38-8D24-991F-DF4854EAC400}"/>
+              </a:ext>
+            </a:extLst>
+          </p:cNvPr>
+          <p:cNvSpPr txBox="1"/>
+          <p:nvPr/>
+        </p:nvSpPr>
+        <p:spPr>
+          <a:xfrm>
+            <a:off x="9003735" y="3545670"/>
+            <a:ext cx="1530904" cy="461665"/>
+          </a:xfrm>
+          <a:prstGeom prst="rect">
+            <a:avLst/>
+          </a:prstGeom>
+          <a:noFill/>
+        </p:spPr>
+        <p:txBody>
+          <a:bodyPr wrap="square" rtlCol="0">
+            <a:spAutoFit/>
+          </a:bodyPr>
+          <a:lstStyle/>
+          <a:p>
+            <a:r>
+              <a:rPr lang="en-US" sz="1200" b="1" dirty="0">
+                <a:solidFill>
+                  <a:srgbClr val="002060"/>
+                </a:solidFill>
+              </a:rPr>
+              <a:t>Monitored cluster [check from outside ]</a:t>
+            </a:r>
+            <a:endParaRPr lang="en-SG" sz="1200" b="1" dirty="0">
+              <a:solidFill>
+                <a:srgbClr val="002060"/>
+              </a:solidFill>
+            </a:endParaRPr>
+          </a:p>
+        </p:txBody>
+      </p:sp>
+      <p:sp>
+        <p:nvSpPr>
+          <p:cNvPr id="92" name="TextBox 91">
+            <a:extLst>
+              <a:ext uri="{FF2B5EF4-FFF2-40B4-BE49-F238E27FC236}">
+                <a16:creationId xmlns:a16="http://schemas.microsoft.com/office/drawing/2014/main" id="{B774D43A-7E90-37EF-2515-0331122383F5}"/>
+              </a:ext>
+            </a:extLst>
+          </p:cNvPr>
+          <p:cNvSpPr txBox="1"/>
+          <p:nvPr/>
+        </p:nvSpPr>
+        <p:spPr>
+          <a:xfrm>
+            <a:off x="2309951" y="1547803"/>
+            <a:ext cx="1641854" cy="276999"/>
+          </a:xfrm>
+          <a:prstGeom prst="rect">
+            <a:avLst/>
+          </a:prstGeom>
+          <a:noFill/>
+        </p:spPr>
+        <p:txBody>
+          <a:bodyPr wrap="square" rtlCol="0">
+            <a:spAutoFit/>
+          </a:bodyPr>
+          <a:lstStyle/>
+          <a:p>
+            <a:r>
+              <a:rPr lang="en-US" sz="1200" b="1" dirty="0">
+                <a:solidFill>
+                  <a:srgbClr val="002060"/>
+                </a:solidFill>
+              </a:rPr>
+              <a:t>Monitor Hub</a:t>
+            </a:r>
+            <a:endParaRPr lang="en-SG" sz="1200" b="1" dirty="0">
+              <a:solidFill>
+                <a:srgbClr val="002060"/>
+              </a:solidFill>
+            </a:endParaRPr>
+          </a:p>
+        </p:txBody>
+      </p:sp>
+      <p:sp>
+        <p:nvSpPr>
+          <p:cNvPr id="94" name="Rectangle 93">
+            <a:extLst>
+              <a:ext uri="{FF2B5EF4-FFF2-40B4-BE49-F238E27FC236}">
+                <a16:creationId xmlns:a16="http://schemas.microsoft.com/office/drawing/2014/main" id="{D2F7A771-50A5-F5A6-8EEE-7881EC65D805}"/>
+              </a:ext>
+            </a:extLst>
+          </p:cNvPr>
+          <p:cNvSpPr/>
+          <p:nvPr/>
+        </p:nvSpPr>
+        <p:spPr>
+          <a:xfrm>
+            <a:off x="9006840" y="5003203"/>
+            <a:ext cx="1548163" cy="1004406"/>
+          </a:xfrm>
+          <a:prstGeom prst="rect">
+            <a:avLst/>
+          </a:prstGeom>
+          <a:noFill/>
+          <a:ln>
+            <a:prstDash val="sysDash"/>
+          </a:ln>
+        </p:spPr>
+        <p:style>
+          <a:lnRef idx="2">
+            <a:schemeClr val="accent1">
+              <a:shade val="50000"/>
+            </a:schemeClr>
+          </a:lnRef>
+          <a:fillRef idx="1">
+            <a:schemeClr val="accent1"/>
+          </a:fillRef>
+          <a:effectRef idx="0">
+            <a:schemeClr val="accent1"/>
+          </a:effectRef>
+          <a:fontRef idx="minor">
+            <a:schemeClr val="lt1"/>
+          </a:fontRef>
+        </p:style>
+        <p:txBody>
+          <a:bodyPr rtlCol="0" anchor="ctr"/>
+          <a:lstStyle/>
+          <a:p>
+            <a:pPr algn="ctr"/>
+            <a:endParaRPr lang="en-SG" dirty="0"/>
+          </a:p>
+        </p:txBody>
+      </p:sp>
+      <p:cxnSp>
+        <p:nvCxnSpPr>
+          <p:cNvPr id="97" name="Straight Arrow Connector 96">
+            <a:extLst>
+              <a:ext uri="{FF2B5EF4-FFF2-40B4-BE49-F238E27FC236}">
+                <a16:creationId xmlns:a16="http://schemas.microsoft.com/office/drawing/2014/main" id="{B65F77C1-0215-280B-2300-3337F6A6F592}"/>
+              </a:ext>
+            </a:extLst>
+          </p:cNvPr>
+          <p:cNvCxnSpPr>
+            <a:cxnSpLocks/>
+            <a:stCxn id="85" idx="3"/>
+          </p:cNvCxnSpPr>
+          <p:nvPr/>
+        </p:nvCxnSpPr>
+        <p:spPr>
+          <a:xfrm flipV="1">
+            <a:off x="7721798" y="4382695"/>
+            <a:ext cx="1281937" cy="367236"/>
+          </a:xfrm>
+          <a:prstGeom prst="straightConnector1">
+            <a:avLst/>
+          </a:prstGeom>
+          <a:ln>
+            <a:prstDash val="dash"/>
+            <a:tailEnd type="triangle"/>
+          </a:ln>
+        </p:spPr>
+        <p:style>
+          <a:lnRef idx="1">
+            <a:schemeClr val="accent1"/>
+          </a:lnRef>
+          <a:fillRef idx="0">
+            <a:schemeClr val="accent1"/>
+          </a:fillRef>
+          <a:effectRef idx="0">
+            <a:schemeClr val="accent1"/>
+          </a:effectRef>
+          <a:fontRef idx="minor">
+            <a:schemeClr val="tx1"/>
+          </a:fontRef>
+        </p:style>
+      </p:cxnSp>
+      <p:cxnSp>
+        <p:nvCxnSpPr>
+          <p:cNvPr id="101" name="Connector: Elbow 100">
+            <a:extLst>
+              <a:ext uri="{FF2B5EF4-FFF2-40B4-BE49-F238E27FC236}">
+                <a16:creationId xmlns:a16="http://schemas.microsoft.com/office/drawing/2014/main" id="{BD212BD0-A77F-A0BF-FB77-21126A4AB931}"/>
+              </a:ext>
+            </a:extLst>
+          </p:cNvPr>
+          <p:cNvCxnSpPr>
+            <a:cxnSpLocks/>
+            <a:stCxn id="86" idx="1"/>
+            <a:endCxn id="85" idx="2"/>
+          </p:cNvCxnSpPr>
+          <p:nvPr/>
+        </p:nvCxnSpPr>
+        <p:spPr>
+          <a:xfrm rot="10800000">
+            <a:off x="7115248" y="4898023"/>
+            <a:ext cx="2059122" cy="816239"/>
+          </a:xfrm>
+          <a:prstGeom prst="bentConnector2">
+            <a:avLst/>
+          </a:prstGeom>
+          <a:ln w="19050">
+            <a:tailEnd type="triangle"/>
+          </a:ln>
+        </p:spPr>
+        <p:style>
+          <a:lnRef idx="1">
+            <a:schemeClr val="dk1"/>
+          </a:lnRef>
+          <a:fillRef idx="0">
+            <a:schemeClr val="dk1"/>
+          </a:fillRef>
+          <a:effectRef idx="0">
+            <a:schemeClr val="dk1"/>
+          </a:effectRef>
+          <a:fontRef idx="minor">
+            <a:schemeClr val="tx1"/>
+          </a:fontRef>
+        </p:style>
+      </p:cxnSp>
+      <p:cxnSp>
+        <p:nvCxnSpPr>
+          <p:cNvPr id="104" name="Straight Arrow Connector 103">
+            <a:extLst>
+              <a:ext uri="{FF2B5EF4-FFF2-40B4-BE49-F238E27FC236}">
+                <a16:creationId xmlns:a16="http://schemas.microsoft.com/office/drawing/2014/main" id="{E515702B-165A-4E95-12C2-DF82D0310A2F}"/>
+              </a:ext>
+            </a:extLst>
+          </p:cNvPr>
+          <p:cNvCxnSpPr>
+            <a:cxnSpLocks/>
+          </p:cNvCxnSpPr>
+          <p:nvPr/>
+        </p:nvCxnSpPr>
+        <p:spPr>
+          <a:xfrm flipH="1" flipV="1">
+            <a:off x="4077506" y="4781473"/>
+            <a:ext cx="2431191" cy="0"/>
+          </a:xfrm>
+          <a:prstGeom prst="straightConnector1">
+            <a:avLst/>
+          </a:prstGeom>
+          <a:ln w="19050">
+            <a:tailEnd type="triangle"/>
+          </a:ln>
+        </p:spPr>
+        <p:style>
+          <a:lnRef idx="1">
+            <a:schemeClr val="dk1"/>
+          </a:lnRef>
+          <a:fillRef idx="0">
+            <a:schemeClr val="dk1"/>
+          </a:fillRef>
+          <a:effectRef idx="0">
+            <a:schemeClr val="dk1"/>
+          </a:effectRef>
+          <a:fontRef idx="minor">
+            <a:schemeClr val="tx1"/>
+          </a:fontRef>
+        </p:style>
+      </p:cxnSp>
+      <p:sp>
+        <p:nvSpPr>
+          <p:cNvPr id="109" name="TextBox 108">
+            <a:extLst>
+              <a:ext uri="{FF2B5EF4-FFF2-40B4-BE49-F238E27FC236}">
+                <a16:creationId xmlns:a16="http://schemas.microsoft.com/office/drawing/2014/main" id="{4995BDBE-6901-418B-AF80-586967217652}"/>
+              </a:ext>
+            </a:extLst>
+          </p:cNvPr>
+          <p:cNvSpPr txBox="1"/>
+          <p:nvPr/>
+        </p:nvSpPr>
+        <p:spPr>
+          <a:xfrm>
+            <a:off x="6873194" y="4278424"/>
+            <a:ext cx="347472" cy="369332"/>
+          </a:xfrm>
+          <a:prstGeom prst="rect">
+            <a:avLst/>
+          </a:prstGeom>
+          <a:noFill/>
+        </p:spPr>
+        <p:txBody>
+          <a:bodyPr wrap="square" rtlCol="0">
+            <a:spAutoFit/>
+          </a:bodyPr>
+          <a:lstStyle/>
+          <a:p>
+            <a:r>
+              <a:rPr lang="en-SG" dirty="0"/>
+              <a:t>…</a:t>
+            </a:r>
+          </a:p>
+        </p:txBody>
+      </p:sp>
+      <p:cxnSp>
+        <p:nvCxnSpPr>
+          <p:cNvPr id="113" name="Connector: Elbow 112">
+            <a:extLst>
+              <a:ext uri="{FF2B5EF4-FFF2-40B4-BE49-F238E27FC236}">
+                <a16:creationId xmlns:a16="http://schemas.microsoft.com/office/drawing/2014/main" id="{A6B9C4F7-6F3D-72C0-3CDF-73D5FF4DCF96}"/>
+              </a:ext>
+            </a:extLst>
+          </p:cNvPr>
+          <p:cNvCxnSpPr>
+            <a:cxnSpLocks/>
+            <a:stCxn id="38" idx="3"/>
+            <a:endCxn id="20" idx="1"/>
+          </p:cNvCxnSpPr>
+          <p:nvPr/>
+        </p:nvCxnSpPr>
+        <p:spPr>
+          <a:xfrm flipV="1">
+            <a:off x="4077506" y="4280521"/>
+            <a:ext cx="2422000" cy="352128"/>
+          </a:xfrm>
+          <a:prstGeom prst="bentConnector3">
+            <a:avLst>
+              <a:gd name="adj1" fmla="val 50000"/>
+            </a:avLst>
+          </a:prstGeom>
+          <a:ln w="19050">
+            <a:tailEnd type="triangle"/>
+          </a:ln>
+        </p:spPr>
+        <p:style>
+          <a:lnRef idx="1">
+            <a:schemeClr val="accent1"/>
+          </a:lnRef>
+          <a:fillRef idx="0">
+            <a:schemeClr val="accent1"/>
+          </a:fillRef>
+          <a:effectRef idx="0">
+            <a:schemeClr val="accent1"/>
+          </a:effectRef>
+          <a:fontRef idx="minor">
+            <a:schemeClr val="tx1"/>
+          </a:fontRef>
+        </p:style>
+      </p:cxnSp>
+      <p:pic>
+        <p:nvPicPr>
+          <p:cNvPr id="116" name="Picture 115">
+            <a:extLst>
+              <a:ext uri="{FF2B5EF4-FFF2-40B4-BE49-F238E27FC236}">
+                <a16:creationId xmlns:a16="http://schemas.microsoft.com/office/drawing/2014/main" id="{3816F655-A32E-1A7B-FC2E-AD490AAE92E4}"/>
+              </a:ext>
+            </a:extLst>
+          </p:cNvPr>
+          <p:cNvPicPr>
+            <a:picLocks noChangeAspect="1"/>
+          </p:cNvPicPr>
+          <p:nvPr/>
+        </p:nvPicPr>
+        <p:blipFill>
+          <a:blip r:embed="rId6"/>
+          <a:stretch>
+            <a:fillRect/>
+          </a:stretch>
+        </p:blipFill>
+        <p:spPr>
+          <a:xfrm>
+            <a:off x="9982485" y="5135460"/>
+            <a:ext cx="245699" cy="281620"/>
+          </a:xfrm>
+          <a:prstGeom prst="rect">
+            <a:avLst/>
+          </a:prstGeom>
+        </p:spPr>
+      </p:pic>
+      <p:sp>
+        <p:nvSpPr>
+          <p:cNvPr id="117" name="TextBox 116">
+            <a:extLst>
+              <a:ext uri="{FF2B5EF4-FFF2-40B4-BE49-F238E27FC236}">
+                <a16:creationId xmlns:a16="http://schemas.microsoft.com/office/drawing/2014/main" id="{0671960D-459F-BCE7-6573-7D04CF2FA4D1}"/>
+              </a:ext>
+            </a:extLst>
+          </p:cNvPr>
+          <p:cNvSpPr txBox="1"/>
+          <p:nvPr/>
+        </p:nvSpPr>
+        <p:spPr>
+          <a:xfrm>
+            <a:off x="10244183" y="5006283"/>
+            <a:ext cx="1139667" cy="430887"/>
+          </a:xfrm>
+          <a:prstGeom prst="rect">
+            <a:avLst/>
+          </a:prstGeom>
+          <a:noFill/>
+        </p:spPr>
+        <p:txBody>
+          <a:bodyPr wrap="square" rtlCol="0">
+            <a:spAutoFit/>
+          </a:bodyPr>
+          <a:lstStyle/>
+          <a:p>
+            <a:r>
+              <a:rPr lang="en-US" sz="1100" dirty="0">
+                <a:solidFill>
+                  <a:srgbClr val="002060"/>
+                </a:solidFill>
+              </a:rPr>
+              <a:t>Probers’ config profile</a:t>
+            </a:r>
+            <a:endParaRPr lang="en-SG" sz="1100" dirty="0">
+              <a:solidFill>
+                <a:srgbClr val="002060"/>
+              </a:solidFill>
+            </a:endParaRPr>
+          </a:p>
+        </p:txBody>
+      </p:sp>
+      <p:cxnSp>
+        <p:nvCxnSpPr>
+          <p:cNvPr id="118" name="Straight Arrow Connector 117">
+            <a:extLst>
+              <a:ext uri="{FF2B5EF4-FFF2-40B4-BE49-F238E27FC236}">
+                <a16:creationId xmlns:a16="http://schemas.microsoft.com/office/drawing/2014/main" id="{00A34DDA-3E26-499C-6F71-6B53A5967EB5}"/>
+              </a:ext>
+            </a:extLst>
+          </p:cNvPr>
+          <p:cNvCxnSpPr>
+            <a:cxnSpLocks/>
+            <a:stCxn id="116" idx="1"/>
+            <a:endCxn id="86" idx="0"/>
+          </p:cNvCxnSpPr>
+          <p:nvPr/>
+        </p:nvCxnSpPr>
+        <p:spPr>
+          <a:xfrm flipH="1">
+            <a:off x="9780921" y="5276270"/>
+            <a:ext cx="201564" cy="289899"/>
+          </a:xfrm>
+          <a:prstGeom prst="straightConnector1">
+            <a:avLst/>
+          </a:prstGeom>
+          <a:ln>
+            <a:tailEnd type="triangle"/>
+          </a:ln>
+        </p:spPr>
+        <p:style>
+          <a:lnRef idx="1">
+            <a:schemeClr val="accent1"/>
+          </a:lnRef>
+          <a:fillRef idx="0">
+            <a:schemeClr val="accent1"/>
+          </a:fillRef>
+          <a:effectRef idx="0">
+            <a:schemeClr val="accent1"/>
+          </a:effectRef>
+          <a:fontRef idx="minor">
+            <a:schemeClr val="tx1"/>
+          </a:fontRef>
+        </p:style>
+      </p:cxnSp>
+      <p:sp>
+        <p:nvSpPr>
+          <p:cNvPr id="121" name="TextBox 120">
+            <a:extLst>
+              <a:ext uri="{FF2B5EF4-FFF2-40B4-BE49-F238E27FC236}">
+                <a16:creationId xmlns:a16="http://schemas.microsoft.com/office/drawing/2014/main" id="{C7E1DB46-C7AF-AFDE-9146-521556EC0FD9}"/>
+              </a:ext>
+            </a:extLst>
+          </p:cNvPr>
+          <p:cNvSpPr txBox="1"/>
+          <p:nvPr/>
+        </p:nvSpPr>
+        <p:spPr>
+          <a:xfrm>
+            <a:off x="5238877" y="3984789"/>
+            <a:ext cx="888993" cy="261610"/>
+          </a:xfrm>
+          <a:prstGeom prst="rect">
+            <a:avLst/>
+          </a:prstGeom>
+          <a:noFill/>
+        </p:spPr>
+        <p:txBody>
+          <a:bodyPr wrap="square" rtlCol="0">
+            <a:spAutoFit/>
+          </a:bodyPr>
+          <a:lstStyle/>
+          <a:p>
+            <a:r>
+              <a:rPr lang="en-US" sz="1100" dirty="0">
+                <a:solidFill>
+                  <a:srgbClr val="002060"/>
+                </a:solidFill>
+              </a:rPr>
+              <a:t>Data fetch </a:t>
+            </a:r>
+            <a:endParaRPr lang="en-SG" sz="1100" dirty="0">
+              <a:solidFill>
+                <a:srgbClr val="002060"/>
+              </a:solidFill>
+            </a:endParaRPr>
+          </a:p>
+        </p:txBody>
+      </p:sp>
+      <p:sp>
+        <p:nvSpPr>
+          <p:cNvPr id="122" name="TextBox 121">
+            <a:extLst>
+              <a:ext uri="{FF2B5EF4-FFF2-40B4-BE49-F238E27FC236}">
+                <a16:creationId xmlns:a16="http://schemas.microsoft.com/office/drawing/2014/main" id="{3A747991-C2E3-6C66-9AFC-D8E650C11FF4}"/>
+              </a:ext>
+            </a:extLst>
+          </p:cNvPr>
+          <p:cNvSpPr txBox="1"/>
+          <p:nvPr/>
+        </p:nvSpPr>
+        <p:spPr>
+          <a:xfrm>
+            <a:off x="5264634" y="4813523"/>
+            <a:ext cx="1328190" cy="261610"/>
+          </a:xfrm>
+          <a:prstGeom prst="rect">
+            <a:avLst/>
+          </a:prstGeom>
+          <a:noFill/>
+        </p:spPr>
+        <p:txBody>
+          <a:bodyPr wrap="square" rtlCol="0">
+            <a:spAutoFit/>
+          </a:bodyPr>
+          <a:lstStyle/>
+          <a:p>
+            <a:r>
+              <a:rPr lang="en-US" sz="1100" dirty="0">
+                <a:solidFill>
+                  <a:srgbClr val="002060"/>
+                </a:solidFill>
+              </a:rPr>
+              <a:t>Direct Data report</a:t>
+            </a:r>
+            <a:endParaRPr lang="en-SG" sz="1100" dirty="0">
+              <a:solidFill>
+                <a:srgbClr val="002060"/>
+              </a:solidFill>
+            </a:endParaRPr>
+          </a:p>
+        </p:txBody>
+      </p:sp>
+      <p:sp>
+        <p:nvSpPr>
+          <p:cNvPr id="123" name="TextBox 122">
+            <a:extLst>
+              <a:ext uri="{FF2B5EF4-FFF2-40B4-BE49-F238E27FC236}">
+                <a16:creationId xmlns:a16="http://schemas.microsoft.com/office/drawing/2014/main" id="{D0852565-800A-7DAC-9884-177F06F7A495}"/>
+              </a:ext>
+            </a:extLst>
+          </p:cNvPr>
+          <p:cNvSpPr txBox="1"/>
+          <p:nvPr/>
+        </p:nvSpPr>
+        <p:spPr>
+          <a:xfrm>
+            <a:off x="7400033" y="5437170"/>
+            <a:ext cx="1328190" cy="261610"/>
+          </a:xfrm>
+          <a:prstGeom prst="rect">
+            <a:avLst/>
+          </a:prstGeom>
+          <a:noFill/>
+        </p:spPr>
+        <p:txBody>
+          <a:bodyPr wrap="square" rtlCol="0">
+            <a:spAutoFit/>
+          </a:bodyPr>
+          <a:lstStyle/>
+          <a:p>
+            <a:r>
+              <a:rPr lang="en-US" sz="1100" dirty="0">
+                <a:solidFill>
+                  <a:srgbClr val="002060"/>
+                </a:solidFill>
+              </a:rPr>
+              <a:t>Indirect Data report</a:t>
+            </a:r>
+            <a:endParaRPr lang="en-SG" sz="1100" dirty="0">
+              <a:solidFill>
+                <a:srgbClr val="002060"/>
+              </a:solidFill>
+            </a:endParaRPr>
+          </a:p>
+        </p:txBody>
+      </p:sp>
+    </p:spTree>
+    <p:extLst>
+      <p:ext uri="{BB962C8B-B14F-4D97-AF65-F5344CB8AC3E}">
+        <p14:creationId xmlns:p14="http://schemas.microsoft.com/office/powerpoint/2010/main" val="2428242299"/>
       </p:ext>
     </p:extLst>
   </p:cSld>

</xml_diff>

<commit_message>
Added the design document for the customer.
</commit_message>
<xml_diff>
--- a/doc/designDoc.pptx
+++ b/doc/designDoc.pptx
@@ -3800,7 +3800,7 @@
         </p:nvSpPr>
         <p:spPr>
           <a:xfrm>
-            <a:off x="1075174" y="2441749"/>
+            <a:off x="1075174" y="2120204"/>
             <a:ext cx="6702250" cy="4239649"/>
           </a:xfrm>
           <a:prstGeom prst="rect">
@@ -3849,7 +3849,7 @@
         </p:nvSpPr>
         <p:spPr>
           <a:xfrm>
-            <a:off x="3088533" y="2577400"/>
+            <a:off x="3088533" y="2255855"/>
             <a:ext cx="4365578" cy="2348016"/>
           </a:xfrm>
           <a:prstGeom prst="rect">
@@ -3899,7 +3899,7 @@
         </p:nvSpPr>
         <p:spPr>
           <a:xfrm>
-            <a:off x="1266850" y="2577400"/>
+            <a:off x="1266850" y="2255855"/>
             <a:ext cx="1446963" cy="381838"/>
           </a:xfrm>
           <a:prstGeom prst="rect">
@@ -3949,7 +3949,7 @@
         </p:nvSpPr>
         <p:spPr>
           <a:xfrm>
-            <a:off x="4431323" y="894304"/>
+            <a:off x="4431323" y="572759"/>
             <a:ext cx="4170065" cy="1306286"/>
           </a:xfrm>
           <a:prstGeom prst="rect">
@@ -3993,7 +3993,7 @@
         </p:nvSpPr>
         <p:spPr>
           <a:xfrm>
-            <a:off x="4543529" y="1200777"/>
+            <a:off x="4543529" y="879232"/>
             <a:ext cx="1274467" cy="316524"/>
           </a:xfrm>
           <a:prstGeom prst="rect">
@@ -4048,7 +4048,7 @@
         </p:nvSpPr>
         <p:spPr>
           <a:xfrm>
-            <a:off x="5979606" y="1200777"/>
+            <a:off x="5979606" y="879232"/>
             <a:ext cx="571919" cy="316524"/>
           </a:xfrm>
           <a:prstGeom prst="rect">
@@ -4103,7 +4103,7 @@
         </p:nvSpPr>
         <p:spPr>
           <a:xfrm>
-            <a:off x="6713135" y="1200777"/>
+            <a:off x="6713135" y="879232"/>
             <a:ext cx="571919" cy="316524"/>
           </a:xfrm>
           <a:prstGeom prst="rect">
@@ -4158,7 +4158,7 @@
         </p:nvSpPr>
         <p:spPr>
           <a:xfrm>
-            <a:off x="7622530" y="1200777"/>
+            <a:off x="7622530" y="879232"/>
             <a:ext cx="818105" cy="316524"/>
           </a:xfrm>
           <a:prstGeom prst="rect">
@@ -4213,7 +4213,7 @@
         </p:nvSpPr>
         <p:spPr>
           <a:xfrm>
-            <a:off x="7322344" y="1232158"/>
+            <a:off x="7322344" y="910613"/>
             <a:ext cx="347472" cy="369332"/>
           </a:xfrm>
           <a:prstGeom prst="rect">
@@ -4248,7 +4248,7 @@
         </p:nvSpPr>
         <p:spPr>
           <a:xfrm>
-            <a:off x="4543529" y="1757623"/>
+            <a:off x="4543529" y="1436078"/>
             <a:ext cx="818105" cy="316524"/>
           </a:xfrm>
           <a:prstGeom prst="rect">
@@ -4303,7 +4303,7 @@
         </p:nvSpPr>
         <p:spPr>
           <a:xfrm>
-            <a:off x="5492678" y="1757623"/>
+            <a:off x="5492678" y="1436078"/>
             <a:ext cx="973856" cy="316524"/>
           </a:xfrm>
           <a:prstGeom prst="rect">
@@ -4358,7 +4358,7 @@
         </p:nvSpPr>
         <p:spPr>
           <a:xfrm>
-            <a:off x="6845652" y="1733352"/>
+            <a:off x="6845652" y="1411807"/>
             <a:ext cx="571919" cy="316524"/>
           </a:xfrm>
           <a:prstGeom prst="rect">
@@ -4413,7 +4413,7 @@
         </p:nvSpPr>
         <p:spPr>
           <a:xfrm>
-            <a:off x="6498180" y="1754666"/>
+            <a:off x="6498180" y="1433121"/>
             <a:ext cx="347472" cy="369332"/>
           </a:xfrm>
           <a:prstGeom prst="rect">
@@ -4450,7 +4450,7 @@
         </p:nvCxnSpPr>
         <p:spPr>
           <a:xfrm flipH="1">
-            <a:off x="5180762" y="1517301"/>
+            <a:off x="5180762" y="1195756"/>
             <a:ext cx="1" cy="1306286"/>
           </a:xfrm>
           <a:prstGeom prst="straightConnector1">
@@ -4489,7 +4489,7 @@
         </p:nvCxnSpPr>
         <p:spPr>
           <a:xfrm flipH="1">
-            <a:off x="5492678" y="1517301"/>
+            <a:off x="5492678" y="1195756"/>
             <a:ext cx="772887" cy="1306286"/>
           </a:xfrm>
           <a:prstGeom prst="straightConnector1">
@@ -4530,7 +4530,7 @@
         </p:nvCxnSpPr>
         <p:spPr>
           <a:xfrm flipH="1">
-            <a:off x="5879121" y="1517301"/>
+            <a:off x="5879121" y="1195756"/>
             <a:ext cx="2152462" cy="1286190"/>
           </a:xfrm>
           <a:prstGeom prst="straightConnector1">
@@ -4569,7 +4569,7 @@
         </p:nvSpPr>
         <p:spPr>
           <a:xfrm>
-            <a:off x="4771709" y="2868805"/>
+            <a:off x="4771709" y="2547260"/>
             <a:ext cx="2032005" cy="316524"/>
           </a:xfrm>
           <a:prstGeom prst="rect">
@@ -4619,7 +4619,7 @@
         </p:nvCxnSpPr>
         <p:spPr>
           <a:xfrm>
-            <a:off x="4672484" y="2074147"/>
+            <a:off x="4672484" y="1752602"/>
             <a:ext cx="0" cy="1623646"/>
           </a:xfrm>
           <a:prstGeom prst="straightConnector1">
@@ -4658,7 +4658,7 @@
         </p:nvCxnSpPr>
         <p:spPr>
           <a:xfrm flipH="1">
-            <a:off x="5361634" y="1517301"/>
+            <a:off x="5361634" y="1195756"/>
             <a:ext cx="903931" cy="2080009"/>
           </a:xfrm>
           <a:prstGeom prst="straightConnector1">
@@ -4699,7 +4699,7 @@
         </p:nvCxnSpPr>
         <p:spPr>
           <a:xfrm flipH="1">
-            <a:off x="6249039" y="1517300"/>
+            <a:off x="6249039" y="1195755"/>
             <a:ext cx="1814190" cy="2180493"/>
           </a:xfrm>
           <a:prstGeom prst="straightConnector1">
@@ -4738,7 +4738,7 @@
         </p:nvSpPr>
         <p:spPr>
           <a:xfrm>
-            <a:off x="4629443" y="3739216"/>
+            <a:off x="4629443" y="3417671"/>
             <a:ext cx="2344112" cy="316524"/>
           </a:xfrm>
           <a:prstGeom prst="rect">
@@ -4788,7 +4788,7 @@
         </p:nvSpPr>
         <p:spPr>
           <a:xfrm>
-            <a:off x="4466171" y="866333"/>
+            <a:off x="4466171" y="544788"/>
             <a:ext cx="2724999" cy="276999"/>
           </a:xfrm>
           <a:prstGeom prst="rect">
@@ -4824,7 +4824,7 @@
         </p:nvSpPr>
         <p:spPr>
           <a:xfrm>
-            <a:off x="8858701" y="916535"/>
+            <a:off x="8858701" y="594990"/>
             <a:ext cx="3089065" cy="1306286"/>
           </a:xfrm>
           <a:prstGeom prst="rect">
@@ -4868,7 +4868,7 @@
         </p:nvSpPr>
         <p:spPr>
           <a:xfrm>
-            <a:off x="8948860" y="866333"/>
+            <a:off x="8948860" y="544788"/>
             <a:ext cx="2337544" cy="276999"/>
           </a:xfrm>
           <a:prstGeom prst="rect">
@@ -4904,7 +4904,7 @@
         </p:nvSpPr>
         <p:spPr>
           <a:xfrm>
-            <a:off x="9121282" y="1203904"/>
+            <a:off x="9121282" y="882359"/>
             <a:ext cx="571919" cy="316524"/>
           </a:xfrm>
           <a:prstGeom prst="rect">
@@ -4959,7 +4959,7 @@
         </p:nvSpPr>
         <p:spPr>
           <a:xfrm>
-            <a:off x="9865623" y="1203904"/>
+            <a:off x="9865623" y="882359"/>
             <a:ext cx="571919" cy="316524"/>
           </a:xfrm>
           <a:prstGeom prst="rect">
@@ -5014,7 +5014,7 @@
         </p:nvSpPr>
         <p:spPr>
           <a:xfrm>
-            <a:off x="10583312" y="1197175"/>
+            <a:off x="10583312" y="875630"/>
             <a:ext cx="571919" cy="316524"/>
           </a:xfrm>
           <a:prstGeom prst="rect">
@@ -5069,7 +5069,7 @@
         </p:nvSpPr>
         <p:spPr>
           <a:xfrm>
-            <a:off x="11286404" y="1203904"/>
+            <a:off x="11286404" y="882359"/>
             <a:ext cx="571919" cy="316524"/>
           </a:xfrm>
           <a:prstGeom prst="rect">
@@ -5124,7 +5124,7 @@
         </p:nvSpPr>
         <p:spPr>
           <a:xfrm>
-            <a:off x="9051827" y="1702247"/>
+            <a:off x="9051827" y="1380702"/>
             <a:ext cx="896785" cy="316524"/>
           </a:xfrm>
           <a:prstGeom prst="rect">
@@ -5179,7 +5179,7 @@
         </p:nvSpPr>
         <p:spPr>
           <a:xfrm>
-            <a:off x="10110431" y="1702247"/>
+            <a:off x="10110431" y="1380702"/>
             <a:ext cx="673637" cy="316524"/>
           </a:xfrm>
           <a:prstGeom prst="rect">
@@ -5234,7 +5234,7 @@
         </p:nvSpPr>
         <p:spPr>
           <a:xfrm>
-            <a:off x="10993184" y="1702247"/>
+            <a:off x="10993184" y="1380702"/>
             <a:ext cx="851753" cy="339354"/>
           </a:xfrm>
           <a:prstGeom prst="rect">
@@ -5289,7 +5289,7 @@
         </p:nvSpPr>
         <p:spPr>
           <a:xfrm>
-            <a:off x="5534866" y="3910484"/>
+            <a:off x="5534866" y="3588939"/>
             <a:ext cx="347472" cy="369332"/>
           </a:xfrm>
           <a:prstGeom prst="rect">
@@ -5324,7 +5324,7 @@
         </p:nvSpPr>
         <p:spPr>
           <a:xfrm>
-            <a:off x="4641543" y="4452759"/>
+            <a:off x="4641543" y="4131214"/>
             <a:ext cx="2344112" cy="316524"/>
           </a:xfrm>
           <a:prstGeom prst="rect">
@@ -5374,7 +5374,7 @@
         </p:nvSpPr>
         <p:spPr>
           <a:xfrm>
-            <a:off x="7622312" y="1742778"/>
+            <a:off x="7622312" y="1421233"/>
             <a:ext cx="788389" cy="316524"/>
           </a:xfrm>
           <a:prstGeom prst="rect">
@@ -5429,7 +5429,7 @@
         </p:nvCxnSpPr>
         <p:spPr>
           <a:xfrm flipH="1">
-            <a:off x="6803714" y="2074147"/>
+            <a:off x="6803714" y="1752602"/>
             <a:ext cx="1227869" cy="2378612"/>
           </a:xfrm>
           <a:prstGeom prst="straightConnector1">
@@ -5471,7 +5471,7 @@
         </p:nvCxnSpPr>
         <p:spPr>
           <a:xfrm flipH="1">
-            <a:off x="6597578" y="2049876"/>
+            <a:off x="6597578" y="1728331"/>
             <a:ext cx="534034" cy="2378612"/>
           </a:xfrm>
           <a:prstGeom prst="straightConnector1">
@@ -5513,7 +5513,7 @@
         </p:nvCxnSpPr>
         <p:spPr>
           <a:xfrm flipH="1">
-            <a:off x="5833448" y="2074147"/>
+            <a:off x="5833448" y="1752602"/>
             <a:ext cx="146158" cy="2354341"/>
           </a:xfrm>
           <a:prstGeom prst="straightConnector1">
@@ -5552,7 +5552,7 @@
         </p:nvSpPr>
         <p:spPr>
           <a:xfrm>
-            <a:off x="3244571" y="3289535"/>
+            <a:off x="3244571" y="2967990"/>
             <a:ext cx="908957" cy="307777"/>
           </a:xfrm>
           <a:prstGeom prst="rect">
@@ -5593,7 +5593,7 @@
         </p:nvSpPr>
         <p:spPr>
           <a:xfrm>
-            <a:off x="3218951" y="3756596"/>
+            <a:off x="3218951" y="3435051"/>
             <a:ext cx="1247219" cy="523220"/>
           </a:xfrm>
           <a:prstGeom prst="rect">
@@ -5634,7 +5634,7 @@
         </p:nvSpPr>
         <p:spPr>
           <a:xfrm>
-            <a:off x="3088533" y="2557305"/>
+            <a:off x="3088533" y="2235760"/>
             <a:ext cx="978483" cy="523220"/>
           </a:xfrm>
           <a:prstGeom prst="rect">
@@ -5674,7 +5674,7 @@
         </p:nvSpPr>
         <p:spPr>
           <a:xfrm>
-            <a:off x="7496080" y="3597310"/>
+            <a:off x="7496080" y="3275765"/>
             <a:ext cx="2222390" cy="159286"/>
           </a:xfrm>
           <a:prstGeom prst="rightArrow">
@@ -5720,7 +5720,7 @@
         </p:nvSpPr>
         <p:spPr>
           <a:xfrm>
-            <a:off x="3088533" y="5266207"/>
+            <a:off x="3088533" y="4944662"/>
             <a:ext cx="4365578" cy="354118"/>
           </a:xfrm>
           <a:prstGeom prst="rect">
@@ -5770,7 +5770,7 @@
         </p:nvSpPr>
         <p:spPr>
           <a:xfrm>
-            <a:off x="5187394" y="4847489"/>
+            <a:off x="5187394" y="4525944"/>
             <a:ext cx="347472" cy="369332"/>
           </a:xfrm>
           <a:prstGeom prst="rect">
@@ -5805,7 +5805,7 @@
         </p:nvSpPr>
         <p:spPr>
           <a:xfrm>
-            <a:off x="3091446" y="5273989"/>
+            <a:off x="3091446" y="4952444"/>
             <a:ext cx="1771956" cy="307777"/>
           </a:xfrm>
           <a:prstGeom prst="rect">
@@ -5845,7 +5845,7 @@
         </p:nvSpPr>
         <p:spPr>
           <a:xfrm>
-            <a:off x="7517923" y="5340699"/>
+            <a:off x="7517923" y="5019154"/>
             <a:ext cx="2200547" cy="159286"/>
           </a:xfrm>
           <a:prstGeom prst="rightArrow">
@@ -5891,7 +5891,7 @@
         </p:nvSpPr>
         <p:spPr>
           <a:xfrm>
-            <a:off x="7496080" y="5270685"/>
+            <a:off x="7496080" y="4949140"/>
             <a:ext cx="1987686" cy="159286"/>
           </a:xfrm>
           <a:prstGeom prst="rightArrow">
@@ -5945,7 +5945,7 @@
         </p:blipFill>
         <p:spPr>
           <a:xfrm>
-            <a:off x="9817628" y="3446902"/>
+            <a:off x="9817628" y="3125357"/>
             <a:ext cx="585606" cy="428417"/>
           </a:xfrm>
           <a:prstGeom prst="rect">
@@ -5980,7 +5980,7 @@
         </p:blipFill>
         <p:spPr>
           <a:xfrm>
-            <a:off x="9865623" y="5155753"/>
+            <a:off x="9865623" y="4834208"/>
             <a:ext cx="585606" cy="428417"/>
           </a:xfrm>
           <a:prstGeom prst="rect">
@@ -6007,7 +6007,7 @@
         </p:nvSpPr>
         <p:spPr>
           <a:xfrm>
-            <a:off x="3099574" y="5821155"/>
+            <a:off x="3099574" y="5499610"/>
             <a:ext cx="4365578" cy="317380"/>
           </a:xfrm>
           <a:prstGeom prst="rect">
@@ -6059,7 +6059,7 @@
         </p:nvSpPr>
         <p:spPr>
           <a:xfrm>
-            <a:off x="3099574" y="5822390"/>
+            <a:off x="3099574" y="5500845"/>
             <a:ext cx="1675694" cy="307777"/>
           </a:xfrm>
           <a:prstGeom prst="rect">
@@ -6101,7 +6101,7 @@
         </p:nvCxnSpPr>
         <p:spPr>
           <a:xfrm flipH="1">
-            <a:off x="6962263" y="1996023"/>
+            <a:off x="6962263" y="1674478"/>
             <a:ext cx="2365265" cy="4026956"/>
           </a:xfrm>
           <a:prstGeom prst="straightConnector1">
@@ -6147,7 +6147,7 @@
         </p:nvCxnSpPr>
         <p:spPr>
           <a:xfrm flipH="1">
-            <a:off x="7181858" y="2015880"/>
+            <a:off x="7181858" y="1694335"/>
             <a:ext cx="3275837" cy="4007099"/>
           </a:xfrm>
           <a:prstGeom prst="straightConnector1">
@@ -6191,7 +6191,7 @@
         </p:nvSpPr>
         <p:spPr>
           <a:xfrm>
-            <a:off x="1266850" y="3470191"/>
+            <a:off x="1266850" y="3148646"/>
             <a:ext cx="1446963" cy="381838"/>
           </a:xfrm>
           <a:prstGeom prst="rect">
@@ -6241,7 +6241,7 @@
         </p:nvSpPr>
         <p:spPr>
           <a:xfrm>
-            <a:off x="9692794" y="3129885"/>
+            <a:off x="9692794" y="2808340"/>
             <a:ext cx="939095" cy="261610"/>
           </a:xfrm>
           <a:prstGeom prst="rect">
@@ -6277,7 +6277,7 @@
         </p:nvSpPr>
         <p:spPr>
           <a:xfrm>
-            <a:off x="9674949" y="4839229"/>
+            <a:off x="9674949" y="4517684"/>
             <a:ext cx="939095" cy="261610"/>
           </a:xfrm>
           <a:prstGeom prst="rect">
@@ -6315,7 +6315,7 @@
         </p:nvCxnSpPr>
         <p:spPr>
           <a:xfrm flipH="1">
-            <a:off x="1990331" y="2959238"/>
+            <a:off x="1990331" y="2637693"/>
             <a:ext cx="1" cy="484185"/>
           </a:xfrm>
           <a:prstGeom prst="straightConnector1">
@@ -6355,7 +6355,7 @@
         </p:nvSpPr>
         <p:spPr>
           <a:xfrm>
-            <a:off x="72336" y="894304"/>
+            <a:off x="72336" y="572759"/>
             <a:ext cx="1375397" cy="353867"/>
           </a:xfrm>
           <a:prstGeom prst="rect">
@@ -6408,7 +6408,7 @@
         </p:nvCxnSpPr>
         <p:spPr>
           <a:xfrm flipH="1">
-            <a:off x="2713813" y="3653033"/>
+            <a:off x="2713813" y="3331488"/>
             <a:ext cx="348539" cy="8077"/>
           </a:xfrm>
           <a:prstGeom prst="straightConnector1">
@@ -6449,7 +6449,7 @@
         </p:nvCxnSpPr>
         <p:spPr>
           <a:xfrm flipH="1" flipV="1">
-            <a:off x="2605278" y="3940855"/>
+            <a:off x="2605278" y="3619310"/>
             <a:ext cx="457074" cy="1329830"/>
           </a:xfrm>
           <a:prstGeom prst="straightConnector1">
@@ -6490,7 +6490,7 @@
         </p:nvCxnSpPr>
         <p:spPr>
           <a:xfrm flipH="1" flipV="1">
-            <a:off x="2325648" y="3902269"/>
+            <a:off x="2325648" y="3580724"/>
             <a:ext cx="736704" cy="2095945"/>
           </a:xfrm>
           <a:prstGeom prst="straightConnector1">
@@ -6529,7 +6529,7 @@
         </p:nvSpPr>
         <p:spPr>
           <a:xfrm>
-            <a:off x="3081756" y="6285650"/>
+            <a:off x="3081756" y="5964105"/>
             <a:ext cx="4365578" cy="354118"/>
           </a:xfrm>
           <a:prstGeom prst="rect">
@@ -6579,7 +6579,7 @@
         </p:nvSpPr>
         <p:spPr>
           <a:xfrm>
-            <a:off x="3080790" y="6308059"/>
+            <a:off x="3080790" y="5986514"/>
             <a:ext cx="1675694" cy="307777"/>
           </a:xfrm>
           <a:prstGeom prst="rect">
@@ -6619,7 +6619,7 @@
         </p:nvSpPr>
         <p:spPr>
           <a:xfrm>
-            <a:off x="10015132" y="5863253"/>
+            <a:off x="10015132" y="5541708"/>
             <a:ext cx="1375397" cy="353867"/>
           </a:xfrm>
           <a:prstGeom prst="rect">
@@ -6672,7 +6672,7 @@
         </p:nvCxnSpPr>
         <p:spPr>
           <a:xfrm rot="16200000" flipH="1">
-            <a:off x="-193027" y="2201232"/>
+            <a:off x="-193027" y="1879687"/>
             <a:ext cx="2412939" cy="506815"/>
           </a:xfrm>
           <a:prstGeom prst="bentConnector2">
@@ -6711,7 +6711,7 @@
         </p:nvSpPr>
         <p:spPr>
           <a:xfrm>
-            <a:off x="10015132" y="6462709"/>
+            <a:off x="10015132" y="6141164"/>
             <a:ext cx="1375397" cy="353867"/>
           </a:xfrm>
           <a:prstGeom prst="rect">
@@ -6764,7 +6764,7 @@
         </p:nvCxnSpPr>
         <p:spPr>
           <a:xfrm flipV="1">
-            <a:off x="7465152" y="6040187"/>
+            <a:off x="7465152" y="5718642"/>
             <a:ext cx="2549980" cy="361909"/>
           </a:xfrm>
           <a:prstGeom prst="straightConnector1">
@@ -6806,7 +6806,7 @@
         </p:nvCxnSpPr>
         <p:spPr>
           <a:xfrm>
-            <a:off x="7465152" y="6518431"/>
+            <a:off x="7465152" y="6196886"/>
             <a:ext cx="2549980" cy="121212"/>
           </a:xfrm>
           <a:prstGeom prst="straightConnector1">
@@ -10083,7 +10083,7 @@
         </p:nvSpPr>
         <p:spPr>
           <a:xfrm>
-            <a:off x="1565397" y="5855736"/>
+            <a:off x="2228403" y="5272510"/>
             <a:ext cx="1069977" cy="261610"/>
           </a:xfrm>
           <a:prstGeom prst="rect">
@@ -10826,7 +10826,7 @@
         </p:blipFill>
         <p:spPr>
           <a:xfrm>
-            <a:off x="1783564" y="5262203"/>
+            <a:off x="1747944" y="5262203"/>
             <a:ext cx="511536" cy="600149"/>
           </a:xfrm>
           <a:prstGeom prst="rect">

</xml_diff>

<commit_message>
Update the design doc.
</commit_message>
<xml_diff>
--- a/doc/designDoc.pptx
+++ b/doc/designDoc.pptx
@@ -199,7 +199,7 @@
           <a:p>
             <a:fld id="{D869F5A2-FB33-43AA-9FB4-F58392D514B0}" type="datetimeFigureOut">
               <a:rPr lang="en-SG" smtClean="0"/>
-              <a:t>22/3/2023</a:t>
+              <a:t>2/4/2023</a:t>
             </a:fld>
             <a:endParaRPr lang="en-SG"/>
           </a:p>
@@ -700,7 +700,7 @@
           <a:p>
             <a:fld id="{7E4C12AF-1699-436B-92E4-CBB1E278C05C}" type="datetimeFigureOut">
               <a:rPr lang="en-SG" smtClean="0"/>
-              <a:t>22/3/2023</a:t>
+              <a:t>2/4/2023</a:t>
             </a:fld>
             <a:endParaRPr lang="en-SG"/>
           </a:p>
@@ -900,7 +900,7 @@
           <a:p>
             <a:fld id="{7E4C12AF-1699-436B-92E4-CBB1E278C05C}" type="datetimeFigureOut">
               <a:rPr lang="en-SG" smtClean="0"/>
-              <a:t>22/3/2023</a:t>
+              <a:t>2/4/2023</a:t>
             </a:fld>
             <a:endParaRPr lang="en-SG"/>
           </a:p>
@@ -1110,7 +1110,7 @@
           <a:p>
             <a:fld id="{7E4C12AF-1699-436B-92E4-CBB1E278C05C}" type="datetimeFigureOut">
               <a:rPr lang="en-SG" smtClean="0"/>
-              <a:t>22/3/2023</a:t>
+              <a:t>2/4/2023</a:t>
             </a:fld>
             <a:endParaRPr lang="en-SG"/>
           </a:p>
@@ -1310,7 +1310,7 @@
           <a:p>
             <a:fld id="{7E4C12AF-1699-436B-92E4-CBB1E278C05C}" type="datetimeFigureOut">
               <a:rPr lang="en-SG" smtClean="0"/>
-              <a:t>22/3/2023</a:t>
+              <a:t>2/4/2023</a:t>
             </a:fld>
             <a:endParaRPr lang="en-SG"/>
           </a:p>
@@ -1586,7 +1586,7 @@
           <a:p>
             <a:fld id="{7E4C12AF-1699-436B-92E4-CBB1E278C05C}" type="datetimeFigureOut">
               <a:rPr lang="en-SG" smtClean="0"/>
-              <a:t>22/3/2023</a:t>
+              <a:t>2/4/2023</a:t>
             </a:fld>
             <a:endParaRPr lang="en-SG"/>
           </a:p>
@@ -1854,7 +1854,7 @@
           <a:p>
             <a:fld id="{7E4C12AF-1699-436B-92E4-CBB1E278C05C}" type="datetimeFigureOut">
               <a:rPr lang="en-SG" smtClean="0"/>
-              <a:t>22/3/2023</a:t>
+              <a:t>2/4/2023</a:t>
             </a:fld>
             <a:endParaRPr lang="en-SG"/>
           </a:p>
@@ -2269,7 +2269,7 @@
           <a:p>
             <a:fld id="{7E4C12AF-1699-436B-92E4-CBB1E278C05C}" type="datetimeFigureOut">
               <a:rPr lang="en-SG" smtClean="0"/>
-              <a:t>22/3/2023</a:t>
+              <a:t>2/4/2023</a:t>
             </a:fld>
             <a:endParaRPr lang="en-SG"/>
           </a:p>
@@ -2411,7 +2411,7 @@
           <a:p>
             <a:fld id="{7E4C12AF-1699-436B-92E4-CBB1E278C05C}" type="datetimeFigureOut">
               <a:rPr lang="en-SG" smtClean="0"/>
-              <a:t>22/3/2023</a:t>
+              <a:t>2/4/2023</a:t>
             </a:fld>
             <a:endParaRPr lang="en-SG"/>
           </a:p>
@@ -2524,7 +2524,7 @@
           <a:p>
             <a:fld id="{7E4C12AF-1699-436B-92E4-CBB1E278C05C}" type="datetimeFigureOut">
               <a:rPr lang="en-SG" smtClean="0"/>
-              <a:t>22/3/2023</a:t>
+              <a:t>2/4/2023</a:t>
             </a:fld>
             <a:endParaRPr lang="en-SG"/>
           </a:p>
@@ -2837,7 +2837,7 @@
           <a:p>
             <a:fld id="{7E4C12AF-1699-436B-92E4-CBB1E278C05C}" type="datetimeFigureOut">
               <a:rPr lang="en-SG" smtClean="0"/>
-              <a:t>22/3/2023</a:t>
+              <a:t>2/4/2023</a:t>
             </a:fld>
             <a:endParaRPr lang="en-SG"/>
           </a:p>
@@ -3126,7 +3126,7 @@
           <a:p>
             <a:fld id="{7E4C12AF-1699-436B-92E4-CBB1E278C05C}" type="datetimeFigureOut">
               <a:rPr lang="en-SG" smtClean="0"/>
-              <a:t>22/3/2023</a:t>
+              <a:t>2/4/2023</a:t>
             </a:fld>
             <a:endParaRPr lang="en-SG"/>
           </a:p>
@@ -3369,7 +3369,7 @@
           <a:p>
             <a:fld id="{7E4C12AF-1699-436B-92E4-CBB1E278C05C}" type="datetimeFigureOut">
               <a:rPr lang="en-SG" smtClean="0"/>
-              <a:t>22/3/2023</a:t>
+              <a:t>2/4/2023</a:t>
             </a:fld>
             <a:endParaRPr lang="en-SG"/>
           </a:p>
@@ -9972,7 +9972,7 @@
         </p:blipFill>
         <p:spPr bwMode="auto">
           <a:xfrm>
-            <a:off x="650593" y="1697841"/>
+            <a:off x="650592" y="1525119"/>
             <a:ext cx="802247" cy="356554"/>
           </a:xfrm>
           <a:prstGeom prst="rect">
@@ -10156,7 +10156,7 @@
           <a:p>
             <a:r>
               <a:rPr lang="en-US" sz="1000" b="1" dirty="0"/>
-              <a:t>Network topology State Panel</a:t>
+              <a:t>Network Topology State Panel</a:t>
             </a:r>
             <a:endParaRPr lang="en-SG" sz="1000" b="1" dirty="0"/>
           </a:p>
@@ -10176,7 +10176,7 @@
         </p:nvSpPr>
         <p:spPr>
           <a:xfrm>
-            <a:off x="554609" y="1126861"/>
+            <a:off x="554608" y="954139"/>
             <a:ext cx="1176072" cy="230832"/>
           </a:xfrm>
           <a:prstGeom prst="rect">
@@ -10240,7 +10240,7 @@
         </p:blipFill>
         <p:spPr bwMode="auto">
           <a:xfrm>
-            <a:off x="885529" y="782944"/>
+            <a:off x="885528" y="610222"/>
             <a:ext cx="257116" cy="257116"/>
           </a:xfrm>
           <a:prstGeom prst="rect">
@@ -10405,7 +10405,7 @@
         </p:nvCxnSpPr>
         <p:spPr>
           <a:xfrm>
-            <a:off x="1062261" y="1399494"/>
+            <a:off x="1062260" y="1226772"/>
             <a:ext cx="0" cy="310113"/>
           </a:xfrm>
           <a:prstGeom prst="straightConnector1">
@@ -10444,7 +10444,7 @@
         </p:nvSpPr>
         <p:spPr>
           <a:xfrm>
-            <a:off x="1086726" y="789748"/>
+            <a:off x="1086725" y="617026"/>
             <a:ext cx="802249" cy="230832"/>
           </a:xfrm>
           <a:prstGeom prst="rect">
@@ -10488,7 +10488,7 @@
         </p:nvSpPr>
         <p:spPr>
           <a:xfrm>
-            <a:off x="2573700" y="2222178"/>
+            <a:off x="2963173" y="2241226"/>
             <a:ext cx="1077470" cy="448862"/>
           </a:xfrm>
           <a:prstGeom prst="rect">
@@ -10537,8 +10537,8 @@
         </p:nvSpPr>
         <p:spPr>
           <a:xfrm>
-            <a:off x="1940044" y="2233069"/>
-            <a:ext cx="547123" cy="448862"/>
+            <a:off x="1940044" y="2392619"/>
+            <a:ext cx="934160" cy="289312"/>
           </a:xfrm>
           <a:prstGeom prst="rect">
             <a:avLst/>
@@ -10635,8 +10635,8 @@
         </p:nvSpPr>
         <p:spPr>
           <a:xfrm>
-            <a:off x="931570" y="3429000"/>
-            <a:ext cx="816374" cy="274021"/>
+            <a:off x="885529" y="3429000"/>
+            <a:ext cx="862415" cy="392870"/>
           </a:xfrm>
           <a:prstGeom prst="rect">
             <a:avLst/>
@@ -10664,7 +10664,7 @@
           <a:p>
             <a:r>
               <a:rPr lang="en-US" sz="1100" b="1" dirty="0"/>
-              <a:t>Panel host </a:t>
+              <a:t>Ajax Panel manager</a:t>
             </a:r>
             <a:endParaRPr lang="en-SG" sz="1100" b="1" dirty="0"/>
           </a:p>
@@ -10688,8 +10688,8 @@
         </p:nvCxnSpPr>
         <p:spPr>
           <a:xfrm rot="5400000" flipH="1" flipV="1">
-            <a:off x="1403147" y="2618542"/>
-            <a:ext cx="747069" cy="873849"/>
+            <a:off x="1488396" y="2510273"/>
+            <a:ext cx="747069" cy="1090387"/>
           </a:xfrm>
           <a:prstGeom prst="bentConnector3">
             <a:avLst/>
@@ -11145,8 +11145,8 @@
         </p:nvCxnSpPr>
         <p:spPr>
           <a:xfrm rot="10800000">
-            <a:off x="1747945" y="3566012"/>
-            <a:ext cx="1055157" cy="304231"/>
+            <a:off x="1747945" y="3625436"/>
+            <a:ext cx="1055165" cy="244815"/>
           </a:xfrm>
           <a:prstGeom prst="bentConnector3">
             <a:avLst/>
@@ -11188,8 +11188,8 @@
         </p:nvCxnSpPr>
         <p:spPr>
           <a:xfrm rot="16200000" flipV="1">
-            <a:off x="1366693" y="3676086"/>
-            <a:ext cx="706759" cy="760629"/>
+            <a:off x="1414607" y="3724000"/>
+            <a:ext cx="587910" cy="783649"/>
           </a:xfrm>
           <a:prstGeom prst="bentConnector3">
             <a:avLst>
@@ -11379,8 +11379,8 @@
         </p:nvSpPr>
         <p:spPr>
           <a:xfrm>
-            <a:off x="554609" y="1944622"/>
-            <a:ext cx="3231006" cy="953206"/>
+            <a:off x="554608" y="1772881"/>
+            <a:ext cx="3688208" cy="1124947"/>
           </a:xfrm>
           <a:prstGeom prst="rect">
             <a:avLst/>
@@ -11951,8 +11951,8 @@
         </p:nvSpPr>
         <p:spPr>
           <a:xfrm>
-            <a:off x="2309951" y="1547803"/>
-            <a:ext cx="1641854" cy="276999"/>
+            <a:off x="3239973" y="1454189"/>
+            <a:ext cx="1051724" cy="276999"/>
           </a:xfrm>
           <a:prstGeom prst="rect">
             <a:avLst/>
@@ -12478,6 +12478,182 @@
                 </a:solidFill>
               </a:rPr>
               <a:t>Indirect Data report</a:t>
+            </a:r>
+            <a:endParaRPr lang="en-SG" sz="1100" dirty="0">
+              <a:solidFill>
+                <a:srgbClr val="002060"/>
+              </a:solidFill>
+            </a:endParaRPr>
+          </a:p>
+        </p:txBody>
+      </p:sp>
+      <p:sp>
+        <p:nvSpPr>
+          <p:cNvPr id="18" name="Rectangle 17">
+            <a:extLst>
+              <a:ext uri="{FF2B5EF4-FFF2-40B4-BE49-F238E27FC236}">
+                <a16:creationId xmlns:a16="http://schemas.microsoft.com/office/drawing/2014/main" id="{7FB703D3-332F-83A5-D8B5-5F503119A5D5}"/>
+              </a:ext>
+            </a:extLst>
+          </p:cNvPr>
+          <p:cNvSpPr/>
+          <p:nvPr/>
+        </p:nvSpPr>
+        <p:spPr>
+          <a:xfrm>
+            <a:off x="1950548" y="1860434"/>
+            <a:ext cx="934160" cy="289312"/>
+          </a:xfrm>
+          <a:prstGeom prst="rect">
+            <a:avLst/>
+          </a:prstGeom>
+        </p:spPr>
+        <p:style>
+          <a:lnRef idx="2">
+            <a:schemeClr val="accent1">
+              <a:shade val="50000"/>
+            </a:schemeClr>
+          </a:lnRef>
+          <a:fillRef idx="1">
+            <a:schemeClr val="accent1"/>
+          </a:fillRef>
+          <a:effectRef idx="0">
+            <a:schemeClr val="accent1"/>
+          </a:effectRef>
+          <a:fontRef idx="minor">
+            <a:schemeClr val="lt1"/>
+          </a:fontRef>
+        </p:style>
+        <p:txBody>
+          <a:bodyPr rtlCol="0" anchor="ctr"/>
+          <a:lstStyle/>
+          <a:p>
+            <a:r>
+              <a:rPr lang="en-US" sz="1000" b="1" dirty="0"/>
+              <a:t>State panel</a:t>
+            </a:r>
+            <a:endParaRPr lang="en-SG" sz="1000" b="1" dirty="0"/>
+          </a:p>
+        </p:txBody>
+      </p:sp>
+      <p:cxnSp>
+        <p:nvCxnSpPr>
+          <p:cNvPr id="21" name="Straight Arrow Connector 20">
+            <a:extLst>
+              <a:ext uri="{FF2B5EF4-FFF2-40B4-BE49-F238E27FC236}">
+                <a16:creationId xmlns:a16="http://schemas.microsoft.com/office/drawing/2014/main" id="{EACA7E86-2627-8BB7-F6F4-9FB08201344D}"/>
+              </a:ext>
+            </a:extLst>
+          </p:cNvPr>
+          <p:cNvCxnSpPr>
+            <a:cxnSpLocks/>
+          </p:cNvCxnSpPr>
+          <p:nvPr/>
+        </p:nvCxnSpPr>
+        <p:spPr>
+          <a:xfrm flipV="1">
+            <a:off x="2379605" y="2133257"/>
+            <a:ext cx="0" cy="259362"/>
+          </a:xfrm>
+          <a:prstGeom prst="straightConnector1">
+            <a:avLst/>
+          </a:prstGeom>
+          <a:ln w="19050">
+            <a:tailEnd type="triangle"/>
+          </a:ln>
+        </p:spPr>
+        <p:style>
+          <a:lnRef idx="1">
+            <a:schemeClr val="dk1"/>
+          </a:lnRef>
+          <a:fillRef idx="0">
+            <a:schemeClr val="dk1"/>
+          </a:fillRef>
+          <a:effectRef idx="0">
+            <a:schemeClr val="dk1"/>
+          </a:effectRef>
+          <a:fontRef idx="minor">
+            <a:schemeClr val="tx1"/>
+          </a:fontRef>
+        </p:style>
+      </p:cxnSp>
+      <p:cxnSp>
+        <p:nvCxnSpPr>
+          <p:cNvPr id="24" name="Straight Arrow Connector 23">
+            <a:extLst>
+              <a:ext uri="{FF2B5EF4-FFF2-40B4-BE49-F238E27FC236}">
+                <a16:creationId xmlns:a16="http://schemas.microsoft.com/office/drawing/2014/main" id="{3E90363E-8B0C-2D3E-7F08-9B59497D9D8A}"/>
+              </a:ext>
+            </a:extLst>
+          </p:cNvPr>
+          <p:cNvCxnSpPr>
+            <a:cxnSpLocks/>
+          </p:cNvCxnSpPr>
+          <p:nvPr/>
+        </p:nvCxnSpPr>
+        <p:spPr>
+          <a:xfrm>
+            <a:off x="1591668" y="2681111"/>
+            <a:ext cx="8804" cy="739480"/>
+          </a:xfrm>
+          <a:prstGeom prst="straightConnector1">
+            <a:avLst/>
+          </a:prstGeom>
+          <a:ln>
+            <a:prstDash val="dash"/>
+            <a:tailEnd type="triangle"/>
+          </a:ln>
+        </p:spPr>
+        <p:style>
+          <a:lnRef idx="1">
+            <a:schemeClr val="accent1"/>
+          </a:lnRef>
+          <a:fillRef idx="0">
+            <a:schemeClr val="accent1"/>
+          </a:fillRef>
+          <a:effectRef idx="0">
+            <a:schemeClr val="accent1"/>
+          </a:effectRef>
+          <a:fontRef idx="minor">
+            <a:schemeClr val="tx1"/>
+          </a:fontRef>
+        </p:style>
+      </p:cxnSp>
+      <p:sp>
+        <p:nvSpPr>
+          <p:cNvPr id="26" name="TextBox 25">
+            <a:extLst>
+              <a:ext uri="{FF2B5EF4-FFF2-40B4-BE49-F238E27FC236}">
+                <a16:creationId xmlns:a16="http://schemas.microsoft.com/office/drawing/2014/main" id="{D64F6CEC-F03D-6DC7-5A20-7B8C0608639B}"/>
+              </a:ext>
+            </a:extLst>
+          </p:cNvPr>
+          <p:cNvSpPr txBox="1"/>
+          <p:nvPr/>
+        </p:nvSpPr>
+        <p:spPr>
+          <a:xfrm>
+            <a:off x="1533139" y="3015853"/>
+            <a:ext cx="1021346" cy="430887"/>
+          </a:xfrm>
+          <a:prstGeom prst="rect">
+            <a:avLst/>
+          </a:prstGeom>
+          <a:noFill/>
+        </p:spPr>
+        <p:txBody>
+          <a:bodyPr wrap="square" rtlCol="0">
+            <a:spAutoFit/>
+          </a:bodyPr>
+          <a:lstStyle/>
+          <a:p>
+            <a:r>
+              <a:rPr lang="en-US" sz="1100" dirty="0">
+                <a:solidFill>
+                  <a:srgbClr val="002060"/>
+                </a:solidFill>
+              </a:rPr>
+              <a:t>Data  update request</a:t>
             </a:r>
             <a:endParaRPr lang="en-SG" sz="1100" dirty="0">
               <a:solidFill>

</xml_diff>

<commit_message>
Added the database for timeline.
</commit_message>
<xml_diff>
--- a/doc/designDoc.pptx
+++ b/doc/designDoc.pptx
@@ -5,12 +5,13 @@
     <p:sldMasterId id="2147483648" r:id="rId1"/>
   </p:sldMasterIdLst>
   <p:notesMasterIdLst>
-    <p:notesMasterId r:id="rId5"/>
+    <p:notesMasterId r:id="rId6"/>
   </p:notesMasterIdLst>
   <p:sldIdLst>
     <p:sldId id="256" r:id="rId2"/>
     <p:sldId id="257" r:id="rId3"/>
     <p:sldId id="258" r:id="rId4"/>
+    <p:sldId id="259" r:id="rId5"/>
   </p:sldIdLst>
   <p:sldSz cx="12192000" cy="6858000"/>
   <p:notesSz cx="6858000" cy="9144000"/>
@@ -199,7 +200,7 @@
           <a:p>
             <a:fld id="{D869F5A2-FB33-43AA-9FB4-F58392D514B0}" type="datetimeFigureOut">
               <a:rPr lang="en-SG" smtClean="0"/>
-              <a:t>2/4/2023</a:t>
+              <a:t>20/4/2023</a:t>
             </a:fld>
             <a:endParaRPr lang="en-SG"/>
           </a:p>
@@ -700,7 +701,7 @@
           <a:p>
             <a:fld id="{7E4C12AF-1699-436B-92E4-CBB1E278C05C}" type="datetimeFigureOut">
               <a:rPr lang="en-SG" smtClean="0"/>
-              <a:t>2/4/2023</a:t>
+              <a:t>20/4/2023</a:t>
             </a:fld>
             <a:endParaRPr lang="en-SG"/>
           </a:p>
@@ -900,7 +901,7 @@
           <a:p>
             <a:fld id="{7E4C12AF-1699-436B-92E4-CBB1E278C05C}" type="datetimeFigureOut">
               <a:rPr lang="en-SG" smtClean="0"/>
-              <a:t>2/4/2023</a:t>
+              <a:t>20/4/2023</a:t>
             </a:fld>
             <a:endParaRPr lang="en-SG"/>
           </a:p>
@@ -1110,7 +1111,7 @@
           <a:p>
             <a:fld id="{7E4C12AF-1699-436B-92E4-CBB1E278C05C}" type="datetimeFigureOut">
               <a:rPr lang="en-SG" smtClean="0"/>
-              <a:t>2/4/2023</a:t>
+              <a:t>20/4/2023</a:t>
             </a:fld>
             <a:endParaRPr lang="en-SG"/>
           </a:p>
@@ -1310,7 +1311,7 @@
           <a:p>
             <a:fld id="{7E4C12AF-1699-436B-92E4-CBB1E278C05C}" type="datetimeFigureOut">
               <a:rPr lang="en-SG" smtClean="0"/>
-              <a:t>2/4/2023</a:t>
+              <a:t>20/4/2023</a:t>
             </a:fld>
             <a:endParaRPr lang="en-SG"/>
           </a:p>
@@ -1586,7 +1587,7 @@
           <a:p>
             <a:fld id="{7E4C12AF-1699-436B-92E4-CBB1E278C05C}" type="datetimeFigureOut">
               <a:rPr lang="en-SG" smtClean="0"/>
-              <a:t>2/4/2023</a:t>
+              <a:t>20/4/2023</a:t>
             </a:fld>
             <a:endParaRPr lang="en-SG"/>
           </a:p>
@@ -1854,7 +1855,7 @@
           <a:p>
             <a:fld id="{7E4C12AF-1699-436B-92E4-CBB1E278C05C}" type="datetimeFigureOut">
               <a:rPr lang="en-SG" smtClean="0"/>
-              <a:t>2/4/2023</a:t>
+              <a:t>20/4/2023</a:t>
             </a:fld>
             <a:endParaRPr lang="en-SG"/>
           </a:p>
@@ -2269,7 +2270,7 @@
           <a:p>
             <a:fld id="{7E4C12AF-1699-436B-92E4-CBB1E278C05C}" type="datetimeFigureOut">
               <a:rPr lang="en-SG" smtClean="0"/>
-              <a:t>2/4/2023</a:t>
+              <a:t>20/4/2023</a:t>
             </a:fld>
             <a:endParaRPr lang="en-SG"/>
           </a:p>
@@ -2411,7 +2412,7 @@
           <a:p>
             <a:fld id="{7E4C12AF-1699-436B-92E4-CBB1E278C05C}" type="datetimeFigureOut">
               <a:rPr lang="en-SG" smtClean="0"/>
-              <a:t>2/4/2023</a:t>
+              <a:t>20/4/2023</a:t>
             </a:fld>
             <a:endParaRPr lang="en-SG"/>
           </a:p>
@@ -2524,7 +2525,7 @@
           <a:p>
             <a:fld id="{7E4C12AF-1699-436B-92E4-CBB1E278C05C}" type="datetimeFigureOut">
               <a:rPr lang="en-SG" smtClean="0"/>
-              <a:t>2/4/2023</a:t>
+              <a:t>20/4/2023</a:t>
             </a:fld>
             <a:endParaRPr lang="en-SG"/>
           </a:p>
@@ -2837,7 +2838,7 @@
           <a:p>
             <a:fld id="{7E4C12AF-1699-436B-92E4-CBB1E278C05C}" type="datetimeFigureOut">
               <a:rPr lang="en-SG" smtClean="0"/>
-              <a:t>2/4/2023</a:t>
+              <a:t>20/4/2023</a:t>
             </a:fld>
             <a:endParaRPr lang="en-SG"/>
           </a:p>
@@ -3126,7 +3127,7 @@
           <a:p>
             <a:fld id="{7E4C12AF-1699-436B-92E4-CBB1E278C05C}" type="datetimeFigureOut">
               <a:rPr lang="en-SG" smtClean="0"/>
-              <a:t>2/4/2023</a:t>
+              <a:t>20/4/2023</a:t>
             </a:fld>
             <a:endParaRPr lang="en-SG"/>
           </a:p>
@@ -3369,7 +3370,7 @@
           <a:p>
             <a:fld id="{7E4C12AF-1699-436B-92E4-CBB1E278C05C}" type="datetimeFigureOut">
               <a:rPr lang="en-SG" smtClean="0"/>
-              <a:t>2/4/2023</a:t>
+              <a:t>20/4/2023</a:t>
             </a:fld>
             <a:endParaRPr lang="en-SG"/>
           </a:p>
@@ -12667,6 +12668,165 @@
     <p:extLst>
       <p:ext uri="{BB962C8B-B14F-4D97-AF65-F5344CB8AC3E}">
         <p14:creationId xmlns:p14="http://schemas.microsoft.com/office/powerpoint/2010/main" val="2428242299"/>
+      </p:ext>
+    </p:extLst>
+  </p:cSld>
+  <p:clrMapOvr>
+    <a:masterClrMapping/>
+  </p:clrMapOvr>
+</p:sld>
+</file>
+
+<file path=ppt/slides/slide4.xml><?xml version="1.0" encoding="utf-8"?>
+<p:sld xmlns:a="http://schemas.openxmlformats.org/drawingml/2006/main" xmlns:r="http://schemas.openxmlformats.org/officeDocument/2006/relationships" xmlns:p="http://schemas.openxmlformats.org/presentationml/2006/main">
+  <p:cSld>
+    <p:spTree>
+      <p:nvGrpSpPr>
+        <p:cNvPr id="1" name=""/>
+        <p:cNvGrpSpPr/>
+        <p:nvPr/>
+      </p:nvGrpSpPr>
+      <p:grpSpPr>
+        <a:xfrm>
+          <a:off x="0" y="0"/>
+          <a:ext cx="0" cy="0"/>
+          <a:chOff x="0" y="0"/>
+          <a:chExt cx="0" cy="0"/>
+        </a:xfrm>
+      </p:grpSpPr>
+      <p:sp>
+        <p:nvSpPr>
+          <p:cNvPr id="4" name="Rectangle 3">
+            <a:extLst>
+              <a:ext uri="{FF2B5EF4-FFF2-40B4-BE49-F238E27FC236}">
+                <a16:creationId xmlns:a16="http://schemas.microsoft.com/office/drawing/2014/main" id="{384E6F0F-D982-B8E4-F4EE-B4FDB7ED7C0A}"/>
+              </a:ext>
+            </a:extLst>
+          </p:cNvPr>
+          <p:cNvSpPr/>
+          <p:nvPr/>
+        </p:nvSpPr>
+        <p:spPr>
+          <a:xfrm>
+            <a:off x="1317702" y="842689"/>
+            <a:ext cx="9556595" cy="4895386"/>
+          </a:xfrm>
+          <a:prstGeom prst="rect">
+            <a:avLst/>
+          </a:prstGeom>
+        </p:spPr>
+        <p:style>
+          <a:lnRef idx="2">
+            <a:schemeClr val="accent1">
+              <a:shade val="50000"/>
+            </a:schemeClr>
+          </a:lnRef>
+          <a:fillRef idx="1">
+            <a:schemeClr val="accent1"/>
+          </a:fillRef>
+          <a:effectRef idx="0">
+            <a:schemeClr val="accent1"/>
+          </a:effectRef>
+          <a:fontRef idx="minor">
+            <a:schemeClr val="lt1"/>
+          </a:fontRef>
+        </p:style>
+        <p:txBody>
+          <a:bodyPr rtlCol="0" anchor="ctr"/>
+          <a:lstStyle/>
+          <a:p>
+            <a:pPr algn="ctr"/>
+            <a:r>
+              <a:rPr lang="en-US" dirty="0"/>
+              <a:t> </a:t>
+            </a:r>
+            <a:endParaRPr lang="en-SG" dirty="0"/>
+          </a:p>
+        </p:txBody>
+      </p:sp>
+      <p:pic>
+        <p:nvPicPr>
+          <p:cNvPr id="6" name="Picture 5">
+            <a:extLst>
+              <a:ext uri="{FF2B5EF4-FFF2-40B4-BE49-F238E27FC236}">
+                <a16:creationId xmlns:a16="http://schemas.microsoft.com/office/drawing/2014/main" id="{6FD8A26A-8EB8-702D-9472-9A59E366B73D}"/>
+              </a:ext>
+            </a:extLst>
+          </p:cNvPr>
+          <p:cNvPicPr>
+            <a:picLocks noChangeAspect="1"/>
+          </p:cNvPicPr>
+          <p:nvPr/>
+        </p:nvPicPr>
+        <p:blipFill>
+          <a:blip r:embed="rId2"/>
+          <a:stretch>
+            <a:fillRect/>
+          </a:stretch>
+        </p:blipFill>
+        <p:spPr>
+          <a:xfrm>
+            <a:off x="4759514" y="3060574"/>
+            <a:ext cx="2331751" cy="2237453"/>
+          </a:xfrm>
+          <a:prstGeom prst="rect">
+            <a:avLst/>
+          </a:prstGeom>
+          <a:ln w="57150">
+            <a:solidFill>
+              <a:schemeClr val="tx1"/>
+            </a:solidFill>
+          </a:ln>
+        </p:spPr>
+      </p:pic>
+      <p:sp>
+        <p:nvSpPr>
+          <p:cNvPr id="7" name="TextBox 6">
+            <a:extLst>
+              <a:ext uri="{FF2B5EF4-FFF2-40B4-BE49-F238E27FC236}">
+                <a16:creationId xmlns:a16="http://schemas.microsoft.com/office/drawing/2014/main" id="{152E4431-7AA0-3FEB-2FA2-34D14EF92199}"/>
+              </a:ext>
+            </a:extLst>
+          </p:cNvPr>
+          <p:cNvSpPr txBox="1"/>
+          <p:nvPr/>
+        </p:nvSpPr>
+        <p:spPr>
+          <a:xfrm>
+            <a:off x="1838691" y="1376264"/>
+            <a:ext cx="8681602" cy="1015663"/>
+          </a:xfrm>
+          <a:prstGeom prst="rect">
+            <a:avLst/>
+          </a:prstGeom>
+          <a:noFill/>
+        </p:spPr>
+        <p:txBody>
+          <a:bodyPr wrap="square" rtlCol="0">
+            <a:spAutoFit/>
+          </a:bodyPr>
+          <a:lstStyle/>
+          <a:p>
+            <a:r>
+              <a:rPr lang="en-US" sz="6000" dirty="0">
+                <a:solidFill>
+                  <a:schemeClr val="bg1"/>
+                </a:solidFill>
+              </a:rPr>
+              <a:t>No Camera Or Video Input</a:t>
+            </a:r>
+            <a:endParaRPr lang="en-SG" sz="6000" dirty="0">
+              <a:solidFill>
+                <a:schemeClr val="bg1"/>
+              </a:solidFill>
+            </a:endParaRPr>
+          </a:p>
+        </p:txBody>
+      </p:sp>
+    </p:spTree>
+    <p:extLst>
+      <p:ext uri="{BB962C8B-B14F-4D97-AF65-F5344CB8AC3E}">
+        <p14:creationId xmlns:p14="http://schemas.microsoft.com/office/powerpoint/2010/main" val="1413959239"/>
       </p:ext>
     </p:extLst>
   </p:cSld>

</xml_diff>

<commit_message>
Update the design doc for version v0.1.3
</commit_message>
<xml_diff>
--- a/doc/designDoc.pptx
+++ b/doc/designDoc.pptx
@@ -200,7 +200,7 @@
           <a:p>
             <a:fld id="{D869F5A2-FB33-43AA-9FB4-F58392D514B0}" type="datetimeFigureOut">
               <a:rPr lang="en-SG" smtClean="0"/>
-              <a:t>20/4/2023</a:t>
+              <a:t>7/5/2023</a:t>
             </a:fld>
             <a:endParaRPr lang="en-SG"/>
           </a:p>
@@ -552,6 +552,90 @@
 </p:notes>
 </file>
 
+<file path=ppt/notesSlides/notesSlide2.xml><?xml version="1.0" encoding="utf-8"?>
+<p:notes xmlns:a="http://schemas.openxmlformats.org/drawingml/2006/main" xmlns:r="http://schemas.openxmlformats.org/officeDocument/2006/relationships" xmlns:p="http://schemas.openxmlformats.org/presentationml/2006/main">
+  <p:cSld>
+    <p:spTree>
+      <p:nvGrpSpPr>
+        <p:cNvPr id="1" name=""/>
+        <p:cNvGrpSpPr/>
+        <p:nvPr/>
+      </p:nvGrpSpPr>
+      <p:grpSpPr>
+        <a:xfrm>
+          <a:off x="0" y="0"/>
+          <a:ext cx="0" cy="0"/>
+          <a:chOff x="0" y="0"/>
+          <a:chExt cx="0" cy="0"/>
+        </a:xfrm>
+      </p:grpSpPr>
+      <p:sp>
+        <p:nvSpPr>
+          <p:cNvPr id="2" name="Slide Image Placeholder 1"/>
+          <p:cNvSpPr>
+            <a:spLocks noGrp="1" noRot="1" noChangeAspect="1"/>
+          </p:cNvSpPr>
+          <p:nvPr>
+            <p:ph type="sldImg"/>
+          </p:nvPr>
+        </p:nvSpPr>
+        <p:spPr/>
+      </p:sp>
+      <p:sp>
+        <p:nvSpPr>
+          <p:cNvPr id="3" name="Notes Placeholder 2"/>
+          <p:cNvSpPr>
+            <a:spLocks noGrp="1"/>
+          </p:cNvSpPr>
+          <p:nvPr>
+            <p:ph type="body" idx="1"/>
+          </p:nvPr>
+        </p:nvSpPr>
+        <p:spPr/>
+        <p:txBody>
+          <a:bodyPr/>
+          <a:lstStyle/>
+          <a:p>
+            <a:endParaRPr lang="en-SG" dirty="0"/>
+          </a:p>
+        </p:txBody>
+      </p:sp>
+      <p:sp>
+        <p:nvSpPr>
+          <p:cNvPr id="4" name="Slide Number Placeholder 3"/>
+          <p:cNvSpPr>
+            <a:spLocks noGrp="1"/>
+          </p:cNvSpPr>
+          <p:nvPr>
+            <p:ph type="sldNum" sz="quarter" idx="5"/>
+          </p:nvPr>
+        </p:nvSpPr>
+        <p:spPr/>
+        <p:txBody>
+          <a:bodyPr/>
+          <a:lstStyle/>
+          <a:p>
+            <a:fld id="{9D096D9A-D7DA-4E78-940A-EAFDA1F803BC}" type="slidenum">
+              <a:rPr lang="en-SG" smtClean="0"/>
+              <a:t>3</a:t>
+            </a:fld>
+            <a:endParaRPr lang="en-SG"/>
+          </a:p>
+        </p:txBody>
+      </p:sp>
+    </p:spTree>
+    <p:extLst>
+      <p:ext uri="{BB962C8B-B14F-4D97-AF65-F5344CB8AC3E}">
+        <p14:creationId xmlns:p14="http://schemas.microsoft.com/office/powerpoint/2010/main" val="188890864"/>
+      </p:ext>
+    </p:extLst>
+  </p:cSld>
+  <p:clrMapOvr>
+    <a:masterClrMapping/>
+  </p:clrMapOvr>
+</p:notes>
+</file>
+
 <file path=ppt/slideLayouts/slideLayout1.xml><?xml version="1.0" encoding="utf-8"?>
 <p:sldLayout xmlns:a="http://schemas.openxmlformats.org/drawingml/2006/main" xmlns:r="http://schemas.openxmlformats.org/officeDocument/2006/relationships" xmlns:p="http://schemas.openxmlformats.org/presentationml/2006/main" type="title" preserve="1">
   <p:cSld name="Title Slide">
@@ -701,7 +785,7 @@
           <a:p>
             <a:fld id="{7E4C12AF-1699-436B-92E4-CBB1E278C05C}" type="datetimeFigureOut">
               <a:rPr lang="en-SG" smtClean="0"/>
-              <a:t>20/4/2023</a:t>
+              <a:t>7/5/2023</a:t>
             </a:fld>
             <a:endParaRPr lang="en-SG"/>
           </a:p>
@@ -901,7 +985,7 @@
           <a:p>
             <a:fld id="{7E4C12AF-1699-436B-92E4-CBB1E278C05C}" type="datetimeFigureOut">
               <a:rPr lang="en-SG" smtClean="0"/>
-              <a:t>20/4/2023</a:t>
+              <a:t>7/5/2023</a:t>
             </a:fld>
             <a:endParaRPr lang="en-SG"/>
           </a:p>
@@ -1111,7 +1195,7 @@
           <a:p>
             <a:fld id="{7E4C12AF-1699-436B-92E4-CBB1E278C05C}" type="datetimeFigureOut">
               <a:rPr lang="en-SG" smtClean="0"/>
-              <a:t>20/4/2023</a:t>
+              <a:t>7/5/2023</a:t>
             </a:fld>
             <a:endParaRPr lang="en-SG"/>
           </a:p>
@@ -1311,7 +1395,7 @@
           <a:p>
             <a:fld id="{7E4C12AF-1699-436B-92E4-CBB1E278C05C}" type="datetimeFigureOut">
               <a:rPr lang="en-SG" smtClean="0"/>
-              <a:t>20/4/2023</a:t>
+              <a:t>7/5/2023</a:t>
             </a:fld>
             <a:endParaRPr lang="en-SG"/>
           </a:p>
@@ -1587,7 +1671,7 @@
           <a:p>
             <a:fld id="{7E4C12AF-1699-436B-92E4-CBB1E278C05C}" type="datetimeFigureOut">
               <a:rPr lang="en-SG" smtClean="0"/>
-              <a:t>20/4/2023</a:t>
+              <a:t>7/5/2023</a:t>
             </a:fld>
             <a:endParaRPr lang="en-SG"/>
           </a:p>
@@ -1855,7 +1939,7 @@
           <a:p>
             <a:fld id="{7E4C12AF-1699-436B-92E4-CBB1E278C05C}" type="datetimeFigureOut">
               <a:rPr lang="en-SG" smtClean="0"/>
-              <a:t>20/4/2023</a:t>
+              <a:t>7/5/2023</a:t>
             </a:fld>
             <a:endParaRPr lang="en-SG"/>
           </a:p>
@@ -2270,7 +2354,7 @@
           <a:p>
             <a:fld id="{7E4C12AF-1699-436B-92E4-CBB1E278C05C}" type="datetimeFigureOut">
               <a:rPr lang="en-SG" smtClean="0"/>
-              <a:t>20/4/2023</a:t>
+              <a:t>7/5/2023</a:t>
             </a:fld>
             <a:endParaRPr lang="en-SG"/>
           </a:p>
@@ -2412,7 +2496,7 @@
           <a:p>
             <a:fld id="{7E4C12AF-1699-436B-92E4-CBB1E278C05C}" type="datetimeFigureOut">
               <a:rPr lang="en-SG" smtClean="0"/>
-              <a:t>20/4/2023</a:t>
+              <a:t>7/5/2023</a:t>
             </a:fld>
             <a:endParaRPr lang="en-SG"/>
           </a:p>
@@ -2525,7 +2609,7 @@
           <a:p>
             <a:fld id="{7E4C12AF-1699-436B-92E4-CBB1E278C05C}" type="datetimeFigureOut">
               <a:rPr lang="en-SG" smtClean="0"/>
-              <a:t>20/4/2023</a:t>
+              <a:t>7/5/2023</a:t>
             </a:fld>
             <a:endParaRPr lang="en-SG"/>
           </a:p>
@@ -2838,7 +2922,7 @@
           <a:p>
             <a:fld id="{7E4C12AF-1699-436B-92E4-CBB1E278C05C}" type="datetimeFigureOut">
               <a:rPr lang="en-SG" smtClean="0"/>
-              <a:t>20/4/2023</a:t>
+              <a:t>7/5/2023</a:t>
             </a:fld>
             <a:endParaRPr lang="en-SG"/>
           </a:p>
@@ -3127,7 +3211,7 @@
           <a:p>
             <a:fld id="{7E4C12AF-1699-436B-92E4-CBB1E278C05C}" type="datetimeFigureOut">
               <a:rPr lang="en-SG" smtClean="0"/>
-              <a:t>20/4/2023</a:t>
+              <a:t>7/5/2023</a:t>
             </a:fld>
             <a:endParaRPr lang="en-SG"/>
           </a:p>
@@ -3370,7 +3454,7 @@
           <a:p>
             <a:fld id="{7E4C12AF-1699-436B-92E4-CBB1E278C05C}" type="datetimeFigureOut">
               <a:rPr lang="en-SG" smtClean="0"/>
-              <a:t>20/4/2023</a:t>
+              <a:t>7/5/2023</a:t>
             </a:fld>
             <a:endParaRPr lang="en-SG"/>
           </a:p>
@@ -9959,7 +10043,7 @@
           <p:nvPr/>
         </p:nvPicPr>
         <p:blipFill>
-          <a:blip r:embed="rId2">
+          <a:blip r:embed="rId3">
             <a:extLst>
               <a:ext uri="{28A0092B-C50C-407E-A947-70E740481C1C}">
                 <a14:useLocalDpi xmlns:a14="http://schemas.microsoft.com/office/drawing/2010/main" val="0"/>
@@ -10011,14 +10095,14 @@
           <p:nvPr/>
         </p:nvPicPr>
         <p:blipFill>
-          <a:blip r:embed="rId3"/>
+          <a:blip r:embed="rId4"/>
           <a:stretch>
             <a:fillRect/>
           </a:stretch>
         </p:blipFill>
         <p:spPr>
           <a:xfrm>
-            <a:off x="2792495" y="3020369"/>
+            <a:off x="3483120" y="3597787"/>
             <a:ext cx="607351" cy="600149"/>
           </a:xfrm>
           <a:prstGeom prst="rect">
@@ -10040,7 +10124,7 @@
         </p:nvSpPr>
         <p:spPr>
           <a:xfrm>
-            <a:off x="3365268" y="2981213"/>
+            <a:off x="3979936" y="3115645"/>
             <a:ext cx="1424476" cy="261610"/>
           </a:xfrm>
           <a:prstGeom prst="rect">
@@ -10084,7 +10168,7 @@
         </p:nvSpPr>
         <p:spPr>
           <a:xfrm>
-            <a:off x="2228403" y="5272510"/>
+            <a:off x="2151024" y="5853679"/>
             <a:ext cx="1069977" cy="261610"/>
           </a:xfrm>
           <a:prstGeom prst="rect">
@@ -10227,7 +10311,7 @@
           <p:nvPr/>
         </p:nvPicPr>
         <p:blipFill>
-          <a:blip r:embed="rId4">
+          <a:blip r:embed="rId5">
             <a:extLst>
               <a:ext uri="{28A0092B-C50C-407E-A947-70E740481C1C}">
                 <a14:useLocalDpi xmlns:a14="http://schemas.microsoft.com/office/drawing/2010/main" val="0"/>
@@ -10261,10 +10345,10 @@
       </p:pic>
       <p:cxnSp>
         <p:nvCxnSpPr>
-          <p:cNvPr id="17" name="Straight Arrow Connector 16">
-            <a:extLst>
-              <a:ext uri="{FF2B5EF4-FFF2-40B4-BE49-F238E27FC236}">
-                <a16:creationId xmlns:a16="http://schemas.microsoft.com/office/drawing/2014/main" id="{F01C3ECF-092D-7B88-7803-AA2E5F1AB329}"/>
+          <p:cNvPr id="19" name="Straight Arrow Connector 18">
+            <a:extLst>
+              <a:ext uri="{FF2B5EF4-FFF2-40B4-BE49-F238E27FC236}">
+                <a16:creationId xmlns:a16="http://schemas.microsoft.com/office/drawing/2014/main" id="{92FA5621-00CA-7595-3EE1-9ADE1B5BCCD7}"/>
               </a:ext>
             </a:extLst>
           </p:cNvPr>
@@ -10275,8 +10359,8 @@
         </p:nvCxnSpPr>
         <p:spPr>
           <a:xfrm flipV="1">
-            <a:off x="3102195" y="2732564"/>
-            <a:ext cx="0" cy="259362"/>
+            <a:off x="1051717" y="2760577"/>
+            <a:ext cx="0" cy="1224212"/>
           </a:xfrm>
           <a:prstGeom prst="straightConnector1">
             <a:avLst/>
@@ -10300,12 +10384,61 @@
           </a:fontRef>
         </p:style>
       </p:cxnSp>
+      <p:sp>
+        <p:nvSpPr>
+          <p:cNvPr id="20" name="Rectangle 19">
+            <a:extLst>
+              <a:ext uri="{FF2B5EF4-FFF2-40B4-BE49-F238E27FC236}">
+                <a16:creationId xmlns:a16="http://schemas.microsoft.com/office/drawing/2014/main" id="{6515EBA3-9885-200C-A7E3-BE221B2F8ED1}"/>
+              </a:ext>
+            </a:extLst>
+          </p:cNvPr>
+          <p:cNvSpPr/>
+          <p:nvPr/>
+        </p:nvSpPr>
+        <p:spPr>
+          <a:xfrm>
+            <a:off x="6499506" y="4132429"/>
+            <a:ext cx="1213101" cy="296183"/>
+          </a:xfrm>
+          <a:prstGeom prst="rect">
+            <a:avLst/>
+          </a:prstGeom>
+        </p:spPr>
+        <p:style>
+          <a:lnRef idx="2">
+            <a:schemeClr val="accent1">
+              <a:shade val="50000"/>
+            </a:schemeClr>
+          </a:lnRef>
+          <a:fillRef idx="1">
+            <a:schemeClr val="accent1"/>
+          </a:fillRef>
+          <a:effectRef idx="0">
+            <a:schemeClr val="accent1"/>
+          </a:effectRef>
+          <a:fontRef idx="minor">
+            <a:schemeClr val="lt1"/>
+          </a:fontRef>
+        </p:style>
+        <p:txBody>
+          <a:bodyPr rtlCol="0" anchor="ctr"/>
+          <a:lstStyle/>
+          <a:p>
+            <a:r>
+              <a:rPr lang="en-US" sz="1100" b="1" dirty="0"/>
+              <a:t>Prober Agent </a:t>
+            </a:r>
+            <a:endParaRPr lang="en-SG" sz="1100" b="1" dirty="0"/>
+          </a:p>
+        </p:txBody>
+      </p:sp>
       <p:cxnSp>
         <p:nvCxnSpPr>
-          <p:cNvPr id="19" name="Straight Arrow Connector 18">
-            <a:extLst>
-              <a:ext uri="{FF2B5EF4-FFF2-40B4-BE49-F238E27FC236}">
-                <a16:creationId xmlns:a16="http://schemas.microsoft.com/office/drawing/2014/main" id="{92FA5621-00CA-7595-3EE1-9ADE1B5BCCD7}"/>
+          <p:cNvPr id="22" name="Straight Arrow Connector 21">
+            <a:extLst>
+              <a:ext uri="{FF2B5EF4-FFF2-40B4-BE49-F238E27FC236}">
+                <a16:creationId xmlns:a16="http://schemas.microsoft.com/office/drawing/2014/main" id="{C8BE9C73-B15A-5847-0B9F-4926827DDAE5}"/>
               </a:ext>
             </a:extLst>
           </p:cNvPr>
@@ -10315,12 +10448,297 @@
           <p:nvPr/>
         </p:nvCxnSpPr>
         <p:spPr>
-          <a:xfrm flipV="1">
-            <a:off x="1051717" y="2760577"/>
-            <a:ext cx="0" cy="668423"/>
+          <a:xfrm>
+            <a:off x="1062260" y="1226772"/>
+            <a:ext cx="0" cy="310113"/>
           </a:xfrm>
           <a:prstGeom prst="straightConnector1">
             <a:avLst/>
+          </a:prstGeom>
+          <a:ln>
+            <a:tailEnd type="triangle"/>
+          </a:ln>
+        </p:spPr>
+        <p:style>
+          <a:lnRef idx="1">
+            <a:schemeClr val="accent1"/>
+          </a:lnRef>
+          <a:fillRef idx="0">
+            <a:schemeClr val="accent1"/>
+          </a:fillRef>
+          <a:effectRef idx="0">
+            <a:schemeClr val="accent1"/>
+          </a:effectRef>
+          <a:fontRef idx="minor">
+            <a:schemeClr val="tx1"/>
+          </a:fontRef>
+        </p:style>
+      </p:cxnSp>
+      <p:sp>
+        <p:nvSpPr>
+          <p:cNvPr id="23" name="TextBox 22">
+            <a:extLst>
+              <a:ext uri="{FF2B5EF4-FFF2-40B4-BE49-F238E27FC236}">
+                <a16:creationId xmlns:a16="http://schemas.microsoft.com/office/drawing/2014/main" id="{772CFBBF-D3D8-69BD-2CBC-15AABE2057F9}"/>
+              </a:ext>
+            </a:extLst>
+          </p:cNvPr>
+          <p:cNvSpPr txBox="1"/>
+          <p:nvPr/>
+        </p:nvSpPr>
+        <p:spPr>
+          <a:xfrm>
+            <a:off x="1086725" y="617026"/>
+            <a:ext cx="802249" cy="230832"/>
+          </a:xfrm>
+          <a:prstGeom prst="rect">
+            <a:avLst/>
+          </a:prstGeom>
+          <a:noFill/>
+        </p:spPr>
+        <p:txBody>
+          <a:bodyPr wrap="square" rtlCol="0">
+            <a:spAutoFit/>
+          </a:bodyPr>
+          <a:lstStyle/>
+          <a:p>
+            <a:r>
+              <a:rPr lang="en-US" sz="900" dirty="0">
+                <a:solidFill>
+                  <a:srgbClr val="002060"/>
+                </a:solidFill>
+              </a:rPr>
+              <a:t>User </a:t>
+            </a:r>
+            <a:endParaRPr lang="en-SG" sz="900" dirty="0">
+              <a:solidFill>
+                <a:srgbClr val="002060"/>
+              </a:solidFill>
+            </a:endParaRPr>
+          </a:p>
+        </p:txBody>
+      </p:sp>
+      <p:sp>
+        <p:nvSpPr>
+          <p:cNvPr id="30" name="Rectangle 29">
+            <a:extLst>
+              <a:ext uri="{FF2B5EF4-FFF2-40B4-BE49-F238E27FC236}">
+                <a16:creationId xmlns:a16="http://schemas.microsoft.com/office/drawing/2014/main" id="{3F1C0B48-1D42-45AA-B718-9586D847F45C}"/>
+              </a:ext>
+            </a:extLst>
+          </p:cNvPr>
+          <p:cNvSpPr/>
+          <p:nvPr/>
+        </p:nvSpPr>
+        <p:spPr>
+          <a:xfrm>
+            <a:off x="4367522" y="2177140"/>
+            <a:ext cx="1077470" cy="448862"/>
+          </a:xfrm>
+          <a:prstGeom prst="rect">
+            <a:avLst/>
+          </a:prstGeom>
+        </p:spPr>
+        <p:style>
+          <a:lnRef idx="2">
+            <a:schemeClr val="accent1">
+              <a:shade val="50000"/>
+            </a:schemeClr>
+          </a:lnRef>
+          <a:fillRef idx="1">
+            <a:schemeClr val="accent1"/>
+          </a:fillRef>
+          <a:effectRef idx="0">
+            <a:schemeClr val="accent1"/>
+          </a:effectRef>
+          <a:fontRef idx="minor">
+            <a:schemeClr val="lt1"/>
+          </a:fontRef>
+        </p:style>
+        <p:txBody>
+          <a:bodyPr rtlCol="0" anchor="ctr"/>
+          <a:lstStyle/>
+          <a:p>
+            <a:r>
+              <a:rPr lang="en-US" sz="1000" b="1" dirty="0"/>
+              <a:t>Grafana build-in plugin Panels</a:t>
+            </a:r>
+            <a:endParaRPr lang="en-SG" sz="1000" b="1" dirty="0"/>
+          </a:p>
+        </p:txBody>
+      </p:sp>
+      <p:sp>
+        <p:nvSpPr>
+          <p:cNvPr id="31" name="Rectangle 30">
+            <a:extLst>
+              <a:ext uri="{FF2B5EF4-FFF2-40B4-BE49-F238E27FC236}">
+                <a16:creationId xmlns:a16="http://schemas.microsoft.com/office/drawing/2014/main" id="{A87802A6-755C-A94D-FA55-D69223C1508E}"/>
+              </a:ext>
+            </a:extLst>
+          </p:cNvPr>
+          <p:cNvSpPr/>
+          <p:nvPr/>
+        </p:nvSpPr>
+        <p:spPr>
+          <a:xfrm>
+            <a:off x="1940044" y="2392619"/>
+            <a:ext cx="934160" cy="289312"/>
+          </a:xfrm>
+          <a:prstGeom prst="rect">
+            <a:avLst/>
+          </a:prstGeom>
+        </p:spPr>
+        <p:style>
+          <a:lnRef idx="2">
+            <a:schemeClr val="accent1">
+              <a:shade val="50000"/>
+            </a:schemeClr>
+          </a:lnRef>
+          <a:fillRef idx="1">
+            <a:schemeClr val="accent1"/>
+          </a:fillRef>
+          <a:effectRef idx="0">
+            <a:schemeClr val="accent1"/>
+          </a:effectRef>
+          <a:fontRef idx="minor">
+            <a:schemeClr val="lt1"/>
+          </a:fontRef>
+        </p:style>
+        <p:txBody>
+          <a:bodyPr rtlCol="0" anchor="ctr"/>
+          <a:lstStyle/>
+          <a:p>
+            <a:r>
+              <a:rPr lang="en-US" sz="1000" b="1" dirty="0"/>
+              <a:t>Ajax Panels</a:t>
+            </a:r>
+            <a:endParaRPr lang="en-SG" sz="1000" b="1" dirty="0"/>
+          </a:p>
+        </p:txBody>
+      </p:sp>
+      <p:sp>
+        <p:nvSpPr>
+          <p:cNvPr id="33" name="Rectangle 32">
+            <a:extLst>
+              <a:ext uri="{FF2B5EF4-FFF2-40B4-BE49-F238E27FC236}">
+                <a16:creationId xmlns:a16="http://schemas.microsoft.com/office/drawing/2014/main" id="{A28F8E92-1AA6-63F2-FA59-D9744C1A716B}"/>
+              </a:ext>
+            </a:extLst>
+          </p:cNvPr>
+          <p:cNvSpPr/>
+          <p:nvPr/>
+        </p:nvSpPr>
+        <p:spPr>
+          <a:xfrm>
+            <a:off x="1549693" y="4990949"/>
+            <a:ext cx="946628" cy="445739"/>
+          </a:xfrm>
+          <a:prstGeom prst="rect">
+            <a:avLst/>
+          </a:prstGeom>
+        </p:spPr>
+        <p:style>
+          <a:lnRef idx="2">
+            <a:schemeClr val="accent1">
+              <a:shade val="50000"/>
+            </a:schemeClr>
+          </a:lnRef>
+          <a:fillRef idx="1">
+            <a:schemeClr val="accent1"/>
+          </a:fillRef>
+          <a:effectRef idx="0">
+            <a:schemeClr val="accent1"/>
+          </a:effectRef>
+          <a:fontRef idx="minor">
+            <a:schemeClr val="lt1"/>
+          </a:fontRef>
+        </p:style>
+        <p:txBody>
+          <a:bodyPr rtlCol="0" anchor="ctr"/>
+          <a:lstStyle/>
+          <a:p>
+            <a:r>
+              <a:rPr lang="en-US" sz="1100" b="1" dirty="0"/>
+              <a:t>Data manager </a:t>
+            </a:r>
+            <a:endParaRPr lang="en-SG" sz="1100" b="1" dirty="0"/>
+          </a:p>
+        </p:txBody>
+      </p:sp>
+      <p:sp>
+        <p:nvSpPr>
+          <p:cNvPr id="34" name="Rectangle 33">
+            <a:extLst>
+              <a:ext uri="{FF2B5EF4-FFF2-40B4-BE49-F238E27FC236}">
+                <a16:creationId xmlns:a16="http://schemas.microsoft.com/office/drawing/2014/main" id="{AB40E8FF-C71C-A63C-A563-9311C2A83E6E}"/>
+              </a:ext>
+            </a:extLst>
+          </p:cNvPr>
+          <p:cNvSpPr/>
+          <p:nvPr/>
+        </p:nvSpPr>
+        <p:spPr>
+          <a:xfrm>
+            <a:off x="808150" y="4010169"/>
+            <a:ext cx="862415" cy="392870"/>
+          </a:xfrm>
+          <a:prstGeom prst="rect">
+            <a:avLst/>
+          </a:prstGeom>
+        </p:spPr>
+        <p:style>
+          <a:lnRef idx="2">
+            <a:schemeClr val="accent1">
+              <a:shade val="50000"/>
+            </a:schemeClr>
+          </a:lnRef>
+          <a:fillRef idx="1">
+            <a:schemeClr val="accent1"/>
+          </a:fillRef>
+          <a:effectRef idx="0">
+            <a:schemeClr val="accent1"/>
+          </a:effectRef>
+          <a:fontRef idx="minor">
+            <a:schemeClr val="lt1"/>
+          </a:fontRef>
+        </p:style>
+        <p:txBody>
+          <a:bodyPr rtlCol="0" anchor="ctr"/>
+          <a:lstStyle/>
+          <a:p>
+            <a:r>
+              <a:rPr lang="en-US" sz="1100" b="1" dirty="0"/>
+              <a:t>Ajax Panel manager</a:t>
+            </a:r>
+            <a:endParaRPr lang="en-SG" sz="1100" b="1" dirty="0"/>
+          </a:p>
+        </p:txBody>
+      </p:sp>
+      <p:cxnSp>
+        <p:nvCxnSpPr>
+          <p:cNvPr id="36" name="Connector: Elbow 35">
+            <a:extLst>
+              <a:ext uri="{FF2B5EF4-FFF2-40B4-BE49-F238E27FC236}">
+                <a16:creationId xmlns:a16="http://schemas.microsoft.com/office/drawing/2014/main" id="{A305D0D7-0717-3F6E-3321-9EDBAC646E3B}"/>
+              </a:ext>
+            </a:extLst>
+          </p:cNvPr>
+          <p:cNvCxnSpPr>
+            <a:cxnSpLocks/>
+            <a:stCxn id="34" idx="0"/>
+            <a:endCxn id="31" idx="2"/>
+          </p:cNvCxnSpPr>
+          <p:nvPr/>
+        </p:nvCxnSpPr>
+        <p:spPr>
+          <a:xfrm rot="5400000" flipH="1" flipV="1">
+            <a:off x="1159122" y="2762167"/>
+            <a:ext cx="1328238" cy="1167766"/>
+          </a:xfrm>
+          <a:prstGeom prst="bentConnector3">
+            <a:avLst>
+              <a:gd name="adj1" fmla="val 20615"/>
+            </a:avLst>
           </a:prstGeom>
           <a:ln w="19050">
             <a:tailEnd type="triangle"/>
@@ -10343,10 +10761,10 @@
       </p:cxnSp>
       <p:sp>
         <p:nvSpPr>
-          <p:cNvPr id="20" name="Rectangle 19">
-            <a:extLst>
-              <a:ext uri="{FF2B5EF4-FFF2-40B4-BE49-F238E27FC236}">
-                <a16:creationId xmlns:a16="http://schemas.microsoft.com/office/drawing/2014/main" id="{6515EBA3-9885-200C-A7E3-BE221B2F8ED1}"/>
+          <p:cNvPr id="38" name="Rectangle 37">
+            <a:extLst>
+              <a:ext uri="{FF2B5EF4-FFF2-40B4-BE49-F238E27FC236}">
+                <a16:creationId xmlns:a16="http://schemas.microsoft.com/office/drawing/2014/main" id="{3EA1AFEB-938E-D99F-AB1B-AB175C55925C}"/>
               </a:ext>
             </a:extLst>
           </p:cNvPr>
@@ -10355,8 +10773,8 @@
         </p:nvSpPr>
         <p:spPr>
           <a:xfrm>
-            <a:off x="6499506" y="4132429"/>
-            <a:ext cx="1213101" cy="296183"/>
+            <a:off x="3053499" y="4990948"/>
+            <a:ext cx="946628" cy="445739"/>
           </a:xfrm>
           <a:prstGeom prst="rect">
             <a:avLst/>
@@ -10384,379 +10802,6 @@
           <a:p>
             <a:r>
               <a:rPr lang="en-US" sz="1100" b="1" dirty="0"/>
-              <a:t>Prober Agent </a:t>
-            </a:r>
-            <a:endParaRPr lang="en-SG" sz="1100" b="1" dirty="0"/>
-          </a:p>
-        </p:txBody>
-      </p:sp>
-      <p:cxnSp>
-        <p:nvCxnSpPr>
-          <p:cNvPr id="22" name="Straight Arrow Connector 21">
-            <a:extLst>
-              <a:ext uri="{FF2B5EF4-FFF2-40B4-BE49-F238E27FC236}">
-                <a16:creationId xmlns:a16="http://schemas.microsoft.com/office/drawing/2014/main" id="{C8BE9C73-B15A-5847-0B9F-4926827DDAE5}"/>
-              </a:ext>
-            </a:extLst>
-          </p:cNvPr>
-          <p:cNvCxnSpPr>
-            <a:cxnSpLocks/>
-          </p:cNvCxnSpPr>
-          <p:nvPr/>
-        </p:nvCxnSpPr>
-        <p:spPr>
-          <a:xfrm>
-            <a:off x="1062260" y="1226772"/>
-            <a:ext cx="0" cy="310113"/>
-          </a:xfrm>
-          <a:prstGeom prst="straightConnector1">
-            <a:avLst/>
-          </a:prstGeom>
-          <a:ln>
-            <a:tailEnd type="triangle"/>
-          </a:ln>
-        </p:spPr>
-        <p:style>
-          <a:lnRef idx="1">
-            <a:schemeClr val="accent1"/>
-          </a:lnRef>
-          <a:fillRef idx="0">
-            <a:schemeClr val="accent1"/>
-          </a:fillRef>
-          <a:effectRef idx="0">
-            <a:schemeClr val="accent1"/>
-          </a:effectRef>
-          <a:fontRef idx="minor">
-            <a:schemeClr val="tx1"/>
-          </a:fontRef>
-        </p:style>
-      </p:cxnSp>
-      <p:sp>
-        <p:nvSpPr>
-          <p:cNvPr id="23" name="TextBox 22">
-            <a:extLst>
-              <a:ext uri="{FF2B5EF4-FFF2-40B4-BE49-F238E27FC236}">
-                <a16:creationId xmlns:a16="http://schemas.microsoft.com/office/drawing/2014/main" id="{772CFBBF-D3D8-69BD-2CBC-15AABE2057F9}"/>
-              </a:ext>
-            </a:extLst>
-          </p:cNvPr>
-          <p:cNvSpPr txBox="1"/>
-          <p:nvPr/>
-        </p:nvSpPr>
-        <p:spPr>
-          <a:xfrm>
-            <a:off x="1086725" y="617026"/>
-            <a:ext cx="802249" cy="230832"/>
-          </a:xfrm>
-          <a:prstGeom prst="rect">
-            <a:avLst/>
-          </a:prstGeom>
-          <a:noFill/>
-        </p:spPr>
-        <p:txBody>
-          <a:bodyPr wrap="square" rtlCol="0">
-            <a:spAutoFit/>
-          </a:bodyPr>
-          <a:lstStyle/>
-          <a:p>
-            <a:r>
-              <a:rPr lang="en-US" sz="900" dirty="0">
-                <a:solidFill>
-                  <a:srgbClr val="002060"/>
-                </a:solidFill>
-              </a:rPr>
-              <a:t>User </a:t>
-            </a:r>
-            <a:endParaRPr lang="en-SG" sz="900" dirty="0">
-              <a:solidFill>
-                <a:srgbClr val="002060"/>
-              </a:solidFill>
-            </a:endParaRPr>
-          </a:p>
-        </p:txBody>
-      </p:sp>
-      <p:sp>
-        <p:nvSpPr>
-          <p:cNvPr id="30" name="Rectangle 29">
-            <a:extLst>
-              <a:ext uri="{FF2B5EF4-FFF2-40B4-BE49-F238E27FC236}">
-                <a16:creationId xmlns:a16="http://schemas.microsoft.com/office/drawing/2014/main" id="{3F1C0B48-1D42-45AA-B718-9586D847F45C}"/>
-              </a:ext>
-            </a:extLst>
-          </p:cNvPr>
-          <p:cNvSpPr/>
-          <p:nvPr/>
-        </p:nvSpPr>
-        <p:spPr>
-          <a:xfrm>
-            <a:off x="2963173" y="2241226"/>
-            <a:ext cx="1077470" cy="448862"/>
-          </a:xfrm>
-          <a:prstGeom prst="rect">
-            <a:avLst/>
-          </a:prstGeom>
-        </p:spPr>
-        <p:style>
-          <a:lnRef idx="2">
-            <a:schemeClr val="accent1">
-              <a:shade val="50000"/>
-            </a:schemeClr>
-          </a:lnRef>
-          <a:fillRef idx="1">
-            <a:schemeClr val="accent1"/>
-          </a:fillRef>
-          <a:effectRef idx="0">
-            <a:schemeClr val="accent1"/>
-          </a:effectRef>
-          <a:fontRef idx="minor">
-            <a:schemeClr val="lt1"/>
-          </a:fontRef>
-        </p:style>
-        <p:txBody>
-          <a:bodyPr rtlCol="0" anchor="ctr"/>
-          <a:lstStyle/>
-          <a:p>
-            <a:r>
-              <a:rPr lang="en-US" sz="1000" b="1" dirty="0"/>
-              <a:t>Grafana build-in plugin Panels</a:t>
-            </a:r>
-            <a:endParaRPr lang="en-SG" sz="1000" b="1" dirty="0"/>
-          </a:p>
-        </p:txBody>
-      </p:sp>
-      <p:sp>
-        <p:nvSpPr>
-          <p:cNvPr id="31" name="Rectangle 30">
-            <a:extLst>
-              <a:ext uri="{FF2B5EF4-FFF2-40B4-BE49-F238E27FC236}">
-                <a16:creationId xmlns:a16="http://schemas.microsoft.com/office/drawing/2014/main" id="{A87802A6-755C-A94D-FA55-D69223C1508E}"/>
-              </a:ext>
-            </a:extLst>
-          </p:cNvPr>
-          <p:cNvSpPr/>
-          <p:nvPr/>
-        </p:nvSpPr>
-        <p:spPr>
-          <a:xfrm>
-            <a:off x="1940044" y="2392619"/>
-            <a:ext cx="934160" cy="289312"/>
-          </a:xfrm>
-          <a:prstGeom prst="rect">
-            <a:avLst/>
-          </a:prstGeom>
-        </p:spPr>
-        <p:style>
-          <a:lnRef idx="2">
-            <a:schemeClr val="accent1">
-              <a:shade val="50000"/>
-            </a:schemeClr>
-          </a:lnRef>
-          <a:fillRef idx="1">
-            <a:schemeClr val="accent1"/>
-          </a:fillRef>
-          <a:effectRef idx="0">
-            <a:schemeClr val="accent1"/>
-          </a:effectRef>
-          <a:fontRef idx="minor">
-            <a:schemeClr val="lt1"/>
-          </a:fontRef>
-        </p:style>
-        <p:txBody>
-          <a:bodyPr rtlCol="0" anchor="ctr"/>
-          <a:lstStyle/>
-          <a:p>
-            <a:r>
-              <a:rPr lang="en-US" sz="1000" b="1" dirty="0"/>
-              <a:t>Ajax Panels</a:t>
-            </a:r>
-            <a:endParaRPr lang="en-SG" sz="1000" b="1" dirty="0"/>
-          </a:p>
-        </p:txBody>
-      </p:sp>
-      <p:sp>
-        <p:nvSpPr>
-          <p:cNvPr id="33" name="Rectangle 32">
-            <a:extLst>
-              <a:ext uri="{FF2B5EF4-FFF2-40B4-BE49-F238E27FC236}">
-                <a16:creationId xmlns:a16="http://schemas.microsoft.com/office/drawing/2014/main" id="{A28F8E92-1AA6-63F2-FA59-D9744C1A716B}"/>
-              </a:ext>
-            </a:extLst>
-          </p:cNvPr>
-          <p:cNvSpPr/>
-          <p:nvPr/>
-        </p:nvSpPr>
-        <p:spPr>
-          <a:xfrm>
-            <a:off x="1627072" y="4409780"/>
-            <a:ext cx="946628" cy="445739"/>
-          </a:xfrm>
-          <a:prstGeom prst="rect">
-            <a:avLst/>
-          </a:prstGeom>
-        </p:spPr>
-        <p:style>
-          <a:lnRef idx="2">
-            <a:schemeClr val="accent1">
-              <a:shade val="50000"/>
-            </a:schemeClr>
-          </a:lnRef>
-          <a:fillRef idx="1">
-            <a:schemeClr val="accent1"/>
-          </a:fillRef>
-          <a:effectRef idx="0">
-            <a:schemeClr val="accent1"/>
-          </a:effectRef>
-          <a:fontRef idx="minor">
-            <a:schemeClr val="lt1"/>
-          </a:fontRef>
-        </p:style>
-        <p:txBody>
-          <a:bodyPr rtlCol="0" anchor="ctr"/>
-          <a:lstStyle/>
-          <a:p>
-            <a:r>
-              <a:rPr lang="en-US" sz="1100" b="1" dirty="0"/>
-              <a:t>Data manager </a:t>
-            </a:r>
-            <a:endParaRPr lang="en-SG" sz="1100" b="1" dirty="0"/>
-          </a:p>
-        </p:txBody>
-      </p:sp>
-      <p:sp>
-        <p:nvSpPr>
-          <p:cNvPr id="34" name="Rectangle 33">
-            <a:extLst>
-              <a:ext uri="{FF2B5EF4-FFF2-40B4-BE49-F238E27FC236}">
-                <a16:creationId xmlns:a16="http://schemas.microsoft.com/office/drawing/2014/main" id="{AB40E8FF-C71C-A63C-A563-9311C2A83E6E}"/>
-              </a:ext>
-            </a:extLst>
-          </p:cNvPr>
-          <p:cNvSpPr/>
-          <p:nvPr/>
-        </p:nvSpPr>
-        <p:spPr>
-          <a:xfrm>
-            <a:off x="885529" y="3429000"/>
-            <a:ext cx="862415" cy="392870"/>
-          </a:xfrm>
-          <a:prstGeom prst="rect">
-            <a:avLst/>
-          </a:prstGeom>
-        </p:spPr>
-        <p:style>
-          <a:lnRef idx="2">
-            <a:schemeClr val="accent1">
-              <a:shade val="50000"/>
-            </a:schemeClr>
-          </a:lnRef>
-          <a:fillRef idx="1">
-            <a:schemeClr val="accent1"/>
-          </a:fillRef>
-          <a:effectRef idx="0">
-            <a:schemeClr val="accent1"/>
-          </a:effectRef>
-          <a:fontRef idx="minor">
-            <a:schemeClr val="lt1"/>
-          </a:fontRef>
-        </p:style>
-        <p:txBody>
-          <a:bodyPr rtlCol="0" anchor="ctr"/>
-          <a:lstStyle/>
-          <a:p>
-            <a:r>
-              <a:rPr lang="en-US" sz="1100" b="1" dirty="0"/>
-              <a:t>Ajax Panel manager</a:t>
-            </a:r>
-            <a:endParaRPr lang="en-SG" sz="1100" b="1" dirty="0"/>
-          </a:p>
-        </p:txBody>
-      </p:sp>
-      <p:cxnSp>
-        <p:nvCxnSpPr>
-          <p:cNvPr id="36" name="Connector: Elbow 35">
-            <a:extLst>
-              <a:ext uri="{FF2B5EF4-FFF2-40B4-BE49-F238E27FC236}">
-                <a16:creationId xmlns:a16="http://schemas.microsoft.com/office/drawing/2014/main" id="{A305D0D7-0717-3F6E-3321-9EDBAC646E3B}"/>
-              </a:ext>
-            </a:extLst>
-          </p:cNvPr>
-          <p:cNvCxnSpPr>
-            <a:cxnSpLocks/>
-            <a:stCxn id="34" idx="0"/>
-            <a:endCxn id="31" idx="2"/>
-          </p:cNvCxnSpPr>
-          <p:nvPr/>
-        </p:nvCxnSpPr>
-        <p:spPr>
-          <a:xfrm rot="5400000" flipH="1" flipV="1">
-            <a:off x="1488396" y="2510273"/>
-            <a:ext cx="747069" cy="1090387"/>
-          </a:xfrm>
-          <a:prstGeom prst="bentConnector3">
-            <a:avLst/>
-          </a:prstGeom>
-          <a:ln w="19050">
-            <a:tailEnd type="triangle"/>
-          </a:ln>
-        </p:spPr>
-        <p:style>
-          <a:lnRef idx="1">
-            <a:schemeClr val="dk1"/>
-          </a:lnRef>
-          <a:fillRef idx="0">
-            <a:schemeClr val="dk1"/>
-          </a:fillRef>
-          <a:effectRef idx="0">
-            <a:schemeClr val="dk1"/>
-          </a:effectRef>
-          <a:fontRef idx="minor">
-            <a:schemeClr val="tx1"/>
-          </a:fontRef>
-        </p:style>
-      </p:cxnSp>
-      <p:sp>
-        <p:nvSpPr>
-          <p:cNvPr id="38" name="Rectangle 37">
-            <a:extLst>
-              <a:ext uri="{FF2B5EF4-FFF2-40B4-BE49-F238E27FC236}">
-                <a16:creationId xmlns:a16="http://schemas.microsoft.com/office/drawing/2014/main" id="{3EA1AFEB-938E-D99F-AB1B-AB175C55925C}"/>
-              </a:ext>
-            </a:extLst>
-          </p:cNvPr>
-          <p:cNvSpPr/>
-          <p:nvPr/>
-        </p:nvSpPr>
-        <p:spPr>
-          <a:xfrm>
-            <a:off x="3130878" y="4409779"/>
-            <a:ext cx="946628" cy="445739"/>
-          </a:xfrm>
-          <a:prstGeom prst="rect">
-            <a:avLst/>
-          </a:prstGeom>
-        </p:spPr>
-        <p:style>
-          <a:lnRef idx="2">
-            <a:schemeClr val="accent1">
-              <a:shade val="50000"/>
-            </a:schemeClr>
-          </a:lnRef>
-          <a:fillRef idx="1">
-            <a:schemeClr val="accent1"/>
-          </a:fillRef>
-          <a:effectRef idx="0">
-            <a:schemeClr val="accent1"/>
-          </a:effectRef>
-          <a:fontRef idx="minor">
-            <a:schemeClr val="lt1"/>
-          </a:fontRef>
-        </p:style>
-        <p:txBody>
-          <a:bodyPr rtlCol="0" anchor="ctr"/>
-          <a:lstStyle/>
-          <a:p>
-            <a:r>
-              <a:rPr lang="en-US" sz="1100" b="1" dirty="0"/>
               <a:t>Comm manager</a:t>
             </a:r>
             <a:endParaRPr lang="en-SG" sz="1100" b="1" dirty="0"/>
@@ -10780,7 +10825,7 @@
         </p:nvCxnSpPr>
         <p:spPr>
           <a:xfrm flipH="1" flipV="1">
-            <a:off x="2573700" y="4626664"/>
+            <a:off x="2496321" y="5207833"/>
             <a:ext cx="557178" cy="5985"/>
           </a:xfrm>
           <a:prstGeom prst="straightConnector1">
@@ -10820,14 +10865,14 @@
           <p:nvPr/>
         </p:nvPicPr>
         <p:blipFill>
-          <a:blip r:embed="rId5"/>
+          <a:blip r:embed="rId6"/>
           <a:stretch>
             <a:fillRect/>
           </a:stretch>
         </p:blipFill>
         <p:spPr>
           <a:xfrm>
-            <a:off x="1747944" y="5262203"/>
+            <a:off x="1670565" y="5843372"/>
             <a:ext cx="511536" cy="600149"/>
           </a:xfrm>
           <a:prstGeom prst="rect">
@@ -10856,7 +10901,7 @@
         </p:nvCxnSpPr>
         <p:spPr>
           <a:xfrm>
-            <a:off x="2030188" y="4888347"/>
+            <a:off x="1952809" y="5469516"/>
             <a:ext cx="0" cy="355568"/>
           </a:xfrm>
           <a:prstGeom prst="straightConnector1">
@@ -10896,7 +10941,7 @@
         </p:nvSpPr>
         <p:spPr>
           <a:xfrm>
-            <a:off x="2803095" y="3861981"/>
+            <a:off x="2725716" y="4443150"/>
             <a:ext cx="1158737" cy="261610"/>
           </a:xfrm>
           <a:prstGeom prst="rect">
@@ -10946,14 +10991,14 @@
           <p:nvPr/>
         </p:nvPicPr>
         <p:blipFill>
-          <a:blip r:embed="rId6"/>
+          <a:blip r:embed="rId7"/>
           <a:stretch>
             <a:fillRect/>
           </a:stretch>
         </p:blipFill>
         <p:spPr>
           <a:xfrm>
-            <a:off x="4350105" y="3647114"/>
+            <a:off x="4272726" y="4228283"/>
             <a:ext cx="245699" cy="281620"/>
           </a:xfrm>
           <a:prstGeom prst="rect">
@@ -10975,7 +11020,7 @@
         </p:nvSpPr>
         <p:spPr>
           <a:xfrm>
-            <a:off x="3935226" y="3216227"/>
+            <a:off x="4205094" y="3615178"/>
             <a:ext cx="1424476" cy="430887"/>
           </a:xfrm>
           <a:prstGeom prst="rect">
@@ -11022,7 +11067,7 @@
         </p:nvCxnSpPr>
         <p:spPr>
           <a:xfrm rot="10800000" flipV="1">
-            <a:off x="3961833" y="3787924"/>
+            <a:off x="3884454" y="4369093"/>
             <a:ext cx="388273" cy="204862"/>
           </a:xfrm>
           <a:prstGeom prst="bentConnector3">
@@ -11063,7 +11108,7 @@
         </p:nvCxnSpPr>
         <p:spPr>
           <a:xfrm rot="5400000" flipH="1" flipV="1">
-            <a:off x="2436635" y="4043319"/>
+            <a:off x="2359256" y="4624488"/>
             <a:ext cx="416993" cy="315928"/>
           </a:xfrm>
           <a:prstGeom prst="bentConnector2">
@@ -11104,7 +11149,7 @@
         </p:nvCxnSpPr>
         <p:spPr>
           <a:xfrm flipV="1">
-            <a:off x="3121065" y="3602619"/>
+            <a:off x="3768515" y="4169250"/>
             <a:ext cx="0" cy="259362"/>
           </a:xfrm>
           <a:prstGeom prst="straightConnector1">
@@ -11146,7 +11191,7 @@
         </p:nvCxnSpPr>
         <p:spPr>
           <a:xfrm rot="10800000">
-            <a:off x="1747945" y="3625436"/>
+            <a:off x="1670566" y="4206605"/>
             <a:ext cx="1055165" cy="244815"/>
           </a:xfrm>
           <a:prstGeom prst="bentConnector3">
@@ -11189,7 +11234,7 @@
         </p:nvCxnSpPr>
         <p:spPr>
           <a:xfrm rot="16200000" flipV="1">
-            <a:off x="1414607" y="3724000"/>
+            <a:off x="1337228" y="4305169"/>
             <a:ext cx="587910" cy="783649"/>
           </a:xfrm>
           <a:prstGeom prst="bentConnector3">
@@ -11231,7 +11276,7 @@
           <p:nvPr/>
         </p:nvPicPr>
         <p:blipFill>
-          <a:blip r:embed="rId6"/>
+          <a:blip r:embed="rId7"/>
           <a:stretch>
             <a:fillRect/>
           </a:stretch>
@@ -11346,7 +11391,7 @@
           <p:nvPr/>
         </p:nvPicPr>
         <p:blipFill>
-          <a:blip r:embed="rId7"/>
+          <a:blip r:embed="rId8"/>
           <a:stretch>
             <a:fillRect/>
           </a:stretch>
@@ -11380,8 +11425,8 @@
         </p:nvSpPr>
         <p:spPr>
           <a:xfrm>
-            <a:off x="554608" y="1772881"/>
-            <a:ext cx="3688208" cy="1124947"/>
+            <a:off x="554607" y="1772881"/>
+            <a:ext cx="5181821" cy="1124947"/>
           </a:xfrm>
           <a:prstGeom prst="rect">
             <a:avLst/>
@@ -11673,7 +11718,7 @@
           <p:nvPr/>
         </p:nvPicPr>
         <p:blipFill>
-          <a:blip r:embed="rId8">
+          <a:blip r:embed="rId9">
             <a:extLst>
               <a:ext uri="{28A0092B-C50C-407E-A947-70E740481C1C}">
                 <a14:useLocalDpi xmlns:a14="http://schemas.microsoft.com/office/drawing/2010/main" val="0"/>
@@ -11862,7 +11907,7 @@
           <p:nvPr/>
         </p:nvPicPr>
         <p:blipFill>
-          <a:blip r:embed="rId8">
+          <a:blip r:embed="rId9">
             <a:extLst>
               <a:ext uri="{28A0092B-C50C-407E-A947-70E740481C1C}">
                 <a14:useLocalDpi xmlns:a14="http://schemas.microsoft.com/office/drawing/2010/main" val="0"/>
@@ -12118,47 +12163,6 @@
           </a:fontRef>
         </p:style>
       </p:cxnSp>
-      <p:cxnSp>
-        <p:nvCxnSpPr>
-          <p:cNvPr id="104" name="Straight Arrow Connector 103">
-            <a:extLst>
-              <a:ext uri="{FF2B5EF4-FFF2-40B4-BE49-F238E27FC236}">
-                <a16:creationId xmlns:a16="http://schemas.microsoft.com/office/drawing/2014/main" id="{E515702B-165A-4E95-12C2-DF82D0310A2F}"/>
-              </a:ext>
-            </a:extLst>
-          </p:cNvPr>
-          <p:cNvCxnSpPr>
-            <a:cxnSpLocks/>
-          </p:cNvCxnSpPr>
-          <p:nvPr/>
-        </p:nvCxnSpPr>
-        <p:spPr>
-          <a:xfrm flipH="1" flipV="1">
-            <a:off x="4077506" y="4781473"/>
-            <a:ext cx="2431191" cy="0"/>
-          </a:xfrm>
-          <a:prstGeom prst="straightConnector1">
-            <a:avLst/>
-          </a:prstGeom>
-          <a:ln w="19050">
-            <a:tailEnd type="triangle"/>
-          </a:ln>
-        </p:spPr>
-        <p:style>
-          <a:lnRef idx="1">
-            <a:schemeClr val="dk1"/>
-          </a:lnRef>
-          <a:fillRef idx="0">
-            <a:schemeClr val="dk1"/>
-          </a:fillRef>
-          <a:effectRef idx="0">
-            <a:schemeClr val="dk1"/>
-          </a:effectRef>
-          <a:fontRef idx="minor">
-            <a:schemeClr val="tx1"/>
-          </a:fontRef>
-        </p:style>
-      </p:cxnSp>
       <p:sp>
         <p:nvSpPr>
           <p:cNvPr id="109" name="TextBox 108">
@@ -12212,8 +12216,8 @@
         </p:nvCxnSpPr>
         <p:spPr>
           <a:xfrm flipV="1">
-            <a:off x="4077506" y="4280521"/>
-            <a:ext cx="2422000" cy="352128"/>
+            <a:off x="4000127" y="4280521"/>
+            <a:ext cx="2499379" cy="933297"/>
           </a:xfrm>
           <a:prstGeom prst="bentConnector3">
             <a:avLst>
@@ -12254,7 +12258,7 @@
           <p:nvPr/>
         </p:nvPicPr>
         <p:blipFill>
-          <a:blip r:embed="rId6"/>
+          <a:blip r:embed="rId7"/>
           <a:stretch>
             <a:fillRect/>
           </a:stretch>
@@ -12414,7 +12418,7 @@
         </p:nvSpPr>
         <p:spPr>
           <a:xfrm>
-            <a:off x="5264634" y="4813523"/>
+            <a:off x="4889731" y="5437170"/>
             <a:ext cx="1328190" cy="261610"/>
           </a:xfrm>
           <a:prstGeom prst="rect">
@@ -12594,8 +12598,8 @@
         </p:nvCxnSpPr>
         <p:spPr>
           <a:xfrm>
-            <a:off x="1591668" y="2681111"/>
-            <a:ext cx="8804" cy="739480"/>
+            <a:off x="1508041" y="2649103"/>
+            <a:ext cx="6390" cy="1358232"/>
           </a:xfrm>
           <a:prstGeom prst="straightConnector1">
             <a:avLst/>
@@ -12664,6 +12668,411 @@
           </a:p>
         </p:txBody>
       </p:sp>
+      <p:cxnSp>
+        <p:nvCxnSpPr>
+          <p:cNvPr id="15" name="Connector: Elbow 14">
+            <a:extLst>
+              <a:ext uri="{FF2B5EF4-FFF2-40B4-BE49-F238E27FC236}">
+                <a16:creationId xmlns:a16="http://schemas.microsoft.com/office/drawing/2014/main" id="{7BD0B877-FF5F-00B0-435D-99D543B437BC}"/>
+              </a:ext>
+            </a:extLst>
+          </p:cNvPr>
+          <p:cNvCxnSpPr>
+            <a:cxnSpLocks/>
+          </p:cNvCxnSpPr>
+          <p:nvPr/>
+        </p:nvCxnSpPr>
+        <p:spPr>
+          <a:xfrm rot="10800000" flipV="1">
+            <a:off x="4040643" y="4770164"/>
+            <a:ext cx="2445972" cy="591746"/>
+          </a:xfrm>
+          <a:prstGeom prst="bentConnector3">
+            <a:avLst>
+              <a:gd name="adj1" fmla="val 40426"/>
+            </a:avLst>
+          </a:prstGeom>
+          <a:ln w="19050">
+            <a:tailEnd type="triangle"/>
+          </a:ln>
+        </p:spPr>
+        <p:style>
+          <a:lnRef idx="1">
+            <a:schemeClr val="dk1"/>
+          </a:lnRef>
+          <a:fillRef idx="0">
+            <a:schemeClr val="dk1"/>
+          </a:fillRef>
+          <a:effectRef idx="0">
+            <a:schemeClr val="dk1"/>
+          </a:effectRef>
+          <a:fontRef idx="minor">
+            <a:schemeClr val="tx1"/>
+          </a:fontRef>
+        </p:style>
+      </p:cxnSp>
+      <p:sp>
+        <p:nvSpPr>
+          <p:cNvPr id="28" name="Rectangle 27">
+            <a:extLst>
+              <a:ext uri="{FF2B5EF4-FFF2-40B4-BE49-F238E27FC236}">
+                <a16:creationId xmlns:a16="http://schemas.microsoft.com/office/drawing/2014/main" id="{64B07B4F-4E3F-D523-3A78-2EE5AE21740E}"/>
+              </a:ext>
+            </a:extLst>
+          </p:cNvPr>
+          <p:cNvSpPr/>
+          <p:nvPr/>
+        </p:nvSpPr>
+        <p:spPr>
+          <a:xfrm>
+            <a:off x="80623" y="4981759"/>
+            <a:ext cx="1169463" cy="706889"/>
+          </a:xfrm>
+          <a:prstGeom prst="rect">
+            <a:avLst/>
+          </a:prstGeom>
+        </p:spPr>
+        <p:style>
+          <a:lnRef idx="2">
+            <a:schemeClr val="accent1">
+              <a:shade val="50000"/>
+            </a:schemeClr>
+          </a:lnRef>
+          <a:fillRef idx="1">
+            <a:schemeClr val="accent1"/>
+          </a:fillRef>
+          <a:effectRef idx="0">
+            <a:schemeClr val="accent1"/>
+          </a:effectRef>
+          <a:fontRef idx="minor">
+            <a:schemeClr val="lt1"/>
+          </a:fontRef>
+        </p:style>
+        <p:txBody>
+          <a:bodyPr rtlCol="0" anchor="ctr"/>
+          <a:lstStyle/>
+          <a:p>
+            <a:r>
+              <a:rPr lang="en-US" sz="1100" b="1" dirty="0"/>
+              <a:t>Simulation data generation and demo data repeat module </a:t>
+            </a:r>
+            <a:endParaRPr lang="en-SG" sz="1100" b="1" dirty="0"/>
+          </a:p>
+        </p:txBody>
+      </p:sp>
+      <p:cxnSp>
+        <p:nvCxnSpPr>
+          <p:cNvPr id="32" name="Connector: Elbow 31">
+            <a:extLst>
+              <a:ext uri="{FF2B5EF4-FFF2-40B4-BE49-F238E27FC236}">
+                <a16:creationId xmlns:a16="http://schemas.microsoft.com/office/drawing/2014/main" id="{ED6BB400-3EB1-BC96-D303-493BDE445A98}"/>
+              </a:ext>
+            </a:extLst>
+          </p:cNvPr>
+          <p:cNvCxnSpPr>
+            <a:stCxn id="42" idx="1"/>
+            <a:endCxn id="28" idx="2"/>
+          </p:cNvCxnSpPr>
+          <p:nvPr/>
+        </p:nvCxnSpPr>
+        <p:spPr>
+          <a:xfrm rot="10800000">
+            <a:off x="665355" y="5688649"/>
+            <a:ext cx="1005210" cy="454799"/>
+          </a:xfrm>
+          <a:prstGeom prst="bentConnector2">
+            <a:avLst/>
+          </a:prstGeom>
+          <a:ln>
+            <a:headEnd type="none" w="med" len="med"/>
+            <a:tailEnd type="triangle" w="med" len="med"/>
+          </a:ln>
+        </p:spPr>
+        <p:style>
+          <a:lnRef idx="1">
+            <a:schemeClr val="dk1"/>
+          </a:lnRef>
+          <a:fillRef idx="0">
+            <a:schemeClr val="dk1"/>
+          </a:fillRef>
+          <a:effectRef idx="0">
+            <a:schemeClr val="dk1"/>
+          </a:effectRef>
+          <a:fontRef idx="minor">
+            <a:schemeClr val="tx1"/>
+          </a:fontRef>
+        </p:style>
+      </p:cxnSp>
+      <p:cxnSp>
+        <p:nvCxnSpPr>
+          <p:cNvPr id="35" name="Straight Arrow Connector 34">
+            <a:extLst>
+              <a:ext uri="{FF2B5EF4-FFF2-40B4-BE49-F238E27FC236}">
+                <a16:creationId xmlns:a16="http://schemas.microsoft.com/office/drawing/2014/main" id="{89A5F289-CBE7-EBC7-9F99-CB500C4D8017}"/>
+              </a:ext>
+            </a:extLst>
+          </p:cNvPr>
+          <p:cNvCxnSpPr>
+            <a:cxnSpLocks/>
+            <a:endCxn id="33" idx="1"/>
+          </p:cNvCxnSpPr>
+          <p:nvPr/>
+        </p:nvCxnSpPr>
+        <p:spPr>
+          <a:xfrm>
+            <a:off x="1250086" y="5205444"/>
+            <a:ext cx="299607" cy="8375"/>
+          </a:xfrm>
+          <a:prstGeom prst="straightConnector1">
+            <a:avLst/>
+          </a:prstGeom>
+          <a:ln w="19050">
+            <a:tailEnd type="triangle"/>
+          </a:ln>
+        </p:spPr>
+        <p:style>
+          <a:lnRef idx="1">
+            <a:schemeClr val="dk1"/>
+          </a:lnRef>
+          <a:fillRef idx="0">
+            <a:schemeClr val="dk1"/>
+          </a:fillRef>
+          <a:effectRef idx="0">
+            <a:schemeClr val="dk1"/>
+          </a:effectRef>
+          <a:fontRef idx="minor">
+            <a:schemeClr val="tx1"/>
+          </a:fontRef>
+        </p:style>
+      </p:cxnSp>
+      <p:sp>
+        <p:nvSpPr>
+          <p:cNvPr id="47" name="Rectangle 46">
+            <a:extLst>
+              <a:ext uri="{FF2B5EF4-FFF2-40B4-BE49-F238E27FC236}">
+                <a16:creationId xmlns:a16="http://schemas.microsoft.com/office/drawing/2014/main" id="{B4C37793-78A1-977E-D12F-C21FB7FF0E70}"/>
+              </a:ext>
+            </a:extLst>
+          </p:cNvPr>
+          <p:cNvSpPr/>
+          <p:nvPr/>
+        </p:nvSpPr>
+        <p:spPr>
+          <a:xfrm>
+            <a:off x="3336159" y="2382515"/>
+            <a:ext cx="780542" cy="313023"/>
+          </a:xfrm>
+          <a:prstGeom prst="rect">
+            <a:avLst/>
+          </a:prstGeom>
+        </p:spPr>
+        <p:style>
+          <a:lnRef idx="2">
+            <a:schemeClr val="accent1">
+              <a:shade val="50000"/>
+            </a:schemeClr>
+          </a:lnRef>
+          <a:fillRef idx="1">
+            <a:schemeClr val="accent1"/>
+          </a:fillRef>
+          <a:effectRef idx="0">
+            <a:schemeClr val="accent1"/>
+          </a:effectRef>
+          <a:fontRef idx="minor">
+            <a:schemeClr val="lt1"/>
+          </a:fontRef>
+        </p:style>
+        <p:txBody>
+          <a:bodyPr rtlCol="0" anchor="ctr"/>
+          <a:lstStyle/>
+          <a:p>
+            <a:r>
+              <a:rPr lang="en-US" sz="1000" b="1" dirty="0"/>
+              <a:t>Internal Timeline </a:t>
+            </a:r>
+            <a:endParaRPr lang="en-SG" sz="1000" b="1" dirty="0"/>
+          </a:p>
+        </p:txBody>
+      </p:sp>
+      <p:cxnSp>
+        <p:nvCxnSpPr>
+          <p:cNvPr id="48" name="Connector: Elbow 47">
+            <a:extLst>
+              <a:ext uri="{FF2B5EF4-FFF2-40B4-BE49-F238E27FC236}">
+                <a16:creationId xmlns:a16="http://schemas.microsoft.com/office/drawing/2014/main" id="{F12DB9E7-C982-18B0-5500-66CF2A560D34}"/>
+              </a:ext>
+            </a:extLst>
+          </p:cNvPr>
+          <p:cNvCxnSpPr>
+            <a:cxnSpLocks/>
+            <a:stCxn id="5" idx="0"/>
+            <a:endCxn id="30" idx="2"/>
+          </p:cNvCxnSpPr>
+          <p:nvPr/>
+        </p:nvCxnSpPr>
+        <p:spPr>
+          <a:xfrm rot="5400000" flipH="1" flipV="1">
+            <a:off x="3860634" y="2552165"/>
+            <a:ext cx="971785" cy="1119461"/>
+          </a:xfrm>
+          <a:prstGeom prst="bentConnector3">
+            <a:avLst>
+              <a:gd name="adj1" fmla="val 50000"/>
+            </a:avLst>
+          </a:prstGeom>
+          <a:ln w="19050">
+            <a:tailEnd type="triangle"/>
+          </a:ln>
+        </p:spPr>
+        <p:style>
+          <a:lnRef idx="1">
+            <a:schemeClr val="dk1"/>
+          </a:lnRef>
+          <a:fillRef idx="0">
+            <a:schemeClr val="dk1"/>
+          </a:fillRef>
+          <a:effectRef idx="0">
+            <a:schemeClr val="dk1"/>
+          </a:effectRef>
+          <a:fontRef idx="minor">
+            <a:schemeClr val="tx1"/>
+          </a:fontRef>
+        </p:style>
+      </p:cxnSp>
+      <p:sp>
+        <p:nvSpPr>
+          <p:cNvPr id="58" name="Rectangle 57">
+            <a:extLst>
+              <a:ext uri="{FF2B5EF4-FFF2-40B4-BE49-F238E27FC236}">
+                <a16:creationId xmlns:a16="http://schemas.microsoft.com/office/drawing/2014/main" id="{37A596E2-97C5-6AD6-4B81-5E4CC592BD56}"/>
+              </a:ext>
+            </a:extLst>
+          </p:cNvPr>
+          <p:cNvSpPr/>
+          <p:nvPr/>
+        </p:nvSpPr>
+        <p:spPr>
+          <a:xfrm>
+            <a:off x="3277475" y="1886419"/>
+            <a:ext cx="780542" cy="313023"/>
+          </a:xfrm>
+          <a:prstGeom prst="rect">
+            <a:avLst/>
+          </a:prstGeom>
+        </p:spPr>
+        <p:style>
+          <a:lnRef idx="2">
+            <a:schemeClr val="accent1">
+              <a:shade val="50000"/>
+            </a:schemeClr>
+          </a:lnRef>
+          <a:fillRef idx="1">
+            <a:schemeClr val="accent1"/>
+          </a:fillRef>
+          <a:effectRef idx="0">
+            <a:schemeClr val="accent1"/>
+          </a:effectRef>
+          <a:fontRef idx="minor">
+            <a:schemeClr val="lt1"/>
+          </a:fontRef>
+        </p:style>
+        <p:txBody>
+          <a:bodyPr rtlCol="0" anchor="ctr"/>
+          <a:lstStyle/>
+          <a:p>
+            <a:r>
+              <a:rPr lang="en-US" sz="1000" b="1" dirty="0"/>
+              <a:t>Public Timeline </a:t>
+            </a:r>
+            <a:endParaRPr lang="en-SG" sz="1000" b="1" dirty="0"/>
+          </a:p>
+        </p:txBody>
+      </p:sp>
+      <p:cxnSp>
+        <p:nvCxnSpPr>
+          <p:cNvPr id="60" name="Straight Arrow Connector 59">
+            <a:extLst>
+              <a:ext uri="{FF2B5EF4-FFF2-40B4-BE49-F238E27FC236}">
+                <a16:creationId xmlns:a16="http://schemas.microsoft.com/office/drawing/2014/main" id="{39EB15A1-749C-263A-664F-ABA494D9AA55}"/>
+              </a:ext>
+            </a:extLst>
+          </p:cNvPr>
+          <p:cNvCxnSpPr>
+            <a:cxnSpLocks/>
+            <a:stCxn id="31" idx="3"/>
+            <a:endCxn id="47" idx="1"/>
+          </p:cNvCxnSpPr>
+          <p:nvPr/>
+        </p:nvCxnSpPr>
+        <p:spPr>
+          <a:xfrm>
+            <a:off x="2874204" y="2537275"/>
+            <a:ext cx="461955" cy="1752"/>
+          </a:xfrm>
+          <a:prstGeom prst="straightConnector1">
+            <a:avLst/>
+          </a:prstGeom>
+          <a:ln w="19050">
+            <a:tailEnd type="triangle"/>
+          </a:ln>
+        </p:spPr>
+        <p:style>
+          <a:lnRef idx="1">
+            <a:schemeClr val="dk1"/>
+          </a:lnRef>
+          <a:fillRef idx="0">
+            <a:schemeClr val="dk1"/>
+          </a:fillRef>
+          <a:effectRef idx="0">
+            <a:schemeClr val="dk1"/>
+          </a:effectRef>
+          <a:fontRef idx="minor">
+            <a:schemeClr val="tx1"/>
+          </a:fontRef>
+        </p:style>
+      </p:cxnSp>
+      <p:cxnSp>
+        <p:nvCxnSpPr>
+          <p:cNvPr id="65" name="Straight Arrow Connector 64">
+            <a:extLst>
+              <a:ext uri="{FF2B5EF4-FFF2-40B4-BE49-F238E27FC236}">
+                <a16:creationId xmlns:a16="http://schemas.microsoft.com/office/drawing/2014/main" id="{597A5BE2-33B9-37D9-B5B4-B6C75C8A48FE}"/>
+              </a:ext>
+            </a:extLst>
+          </p:cNvPr>
+          <p:cNvCxnSpPr>
+            <a:cxnSpLocks/>
+            <a:endCxn id="58" idx="1"/>
+          </p:cNvCxnSpPr>
+          <p:nvPr/>
+        </p:nvCxnSpPr>
+        <p:spPr>
+          <a:xfrm flipV="1">
+            <a:off x="2862544" y="2042931"/>
+            <a:ext cx="414931" cy="379927"/>
+          </a:xfrm>
+          <a:prstGeom prst="straightConnector1">
+            <a:avLst/>
+          </a:prstGeom>
+          <a:ln w="19050">
+            <a:tailEnd type="triangle"/>
+          </a:ln>
+        </p:spPr>
+        <p:style>
+          <a:lnRef idx="1">
+            <a:schemeClr val="dk1"/>
+          </a:lnRef>
+          <a:fillRef idx="0">
+            <a:schemeClr val="dk1"/>
+          </a:fillRef>
+          <a:effectRef idx="0">
+            <a:schemeClr val="dk1"/>
+          </a:effectRef>
+          <a:fontRef idx="minor">
+            <a:schemeClr val="tx1"/>
+          </a:fontRef>
+        </p:style>
+      </p:cxnSp>
     </p:spTree>
     <p:extLst>
       <p:ext uri="{BB962C8B-B14F-4D97-AF65-F5344CB8AC3E}">

</xml_diff>